<commit_message>
updated meta constraints + added essence counters
</commit_message>
<xml_diff>
--- a/Assets/How to Play/Instructions.pptx
+++ b/Assets/How to Play/Instructions.pptx
@@ -4683,7 +4683,7 @@
         <p:spPr>
           <a:xfrm>
             <a:off x="731777" y="1092296"/>
-            <a:ext cx="10106985" cy="2976122"/>
+            <a:ext cx="10516447" cy="2976122"/>
           </a:xfrm>
           <a:prstGeom prst="rect">
             <a:avLst/>
@@ -4884,13 +4884,13 @@
           <a:p>
             <a:r>
               <a:rPr lang="en-US" dirty="0"/>
-              <a:t>Eventually, both alchemical laws will also apply to the number of essences each experiment has</a:t>
+              <a:t>Eventually, both alchemical laws will also apply to the number of essences each active experiment has</a:t>
             </a:r>
           </a:p>
           <a:p>
             <a:r>
               <a:rPr lang="en-US" dirty="0"/>
-              <a:t>In other words, two experiments can not have the same number of essences and one experiment can not have more than all the other ones combined</a:t>
+              <a:t>In other words, two active experiments can not have the same number of essences and one experiment can not have more essences than all the other active experiments combined</a:t>
             </a:r>
           </a:p>
           <a:p>

</xml_diff>

<commit_message>
meta kudu no longer counts inactive
</commit_message>
<xml_diff>
--- a/Assets/How to Play/Instructions.pptx
+++ b/Assets/How to Play/Instructions.pptx
@@ -271,7 +271,7 @@
           <a:p>
             <a:fld id="{62B14E49-696A-4F24-B720-C8B44559A9DA}" type="datetimeFigureOut">
               <a:rPr lang="en-US" smtClean="0"/>
-              <a:t>8/10/2023</a:t>
+              <a:t>8/16/2023</a:t>
             </a:fld>
             <a:endParaRPr lang="en-US"/>
           </a:p>
@@ -441,7 +441,7 @@
           <a:p>
             <a:fld id="{62B14E49-696A-4F24-B720-C8B44559A9DA}" type="datetimeFigureOut">
               <a:rPr lang="en-US" smtClean="0"/>
-              <a:t>8/10/2023</a:t>
+              <a:t>8/16/2023</a:t>
             </a:fld>
             <a:endParaRPr lang="en-US"/>
           </a:p>
@@ -621,7 +621,7 @@
           <a:p>
             <a:fld id="{62B14E49-696A-4F24-B720-C8B44559A9DA}" type="datetimeFigureOut">
               <a:rPr lang="en-US" smtClean="0"/>
-              <a:t>8/10/2023</a:t>
+              <a:t>8/16/2023</a:t>
             </a:fld>
             <a:endParaRPr lang="en-US"/>
           </a:p>
@@ -791,7 +791,7 @@
           <a:p>
             <a:fld id="{62B14E49-696A-4F24-B720-C8B44559A9DA}" type="datetimeFigureOut">
               <a:rPr lang="en-US" smtClean="0"/>
-              <a:t>8/10/2023</a:t>
+              <a:t>8/16/2023</a:t>
             </a:fld>
             <a:endParaRPr lang="en-US"/>
           </a:p>
@@ -1055,7 +1055,7 @@
           <a:p>
             <a:fld id="{62B14E49-696A-4F24-B720-C8B44559A9DA}" type="datetimeFigureOut">
               <a:rPr lang="en-US" smtClean="0"/>
-              <a:t>8/10/2023</a:t>
+              <a:t>8/16/2023</a:t>
             </a:fld>
             <a:endParaRPr lang="en-US"/>
           </a:p>
@@ -1343,7 +1343,7 @@
           <a:p>
             <a:fld id="{62B14E49-696A-4F24-B720-C8B44559A9DA}" type="datetimeFigureOut">
               <a:rPr lang="en-US" smtClean="0"/>
-              <a:t>8/10/2023</a:t>
+              <a:t>8/16/2023</a:t>
             </a:fld>
             <a:endParaRPr lang="en-US"/>
           </a:p>
@@ -1772,7 +1772,7 @@
           <a:p>
             <a:fld id="{62B14E49-696A-4F24-B720-C8B44559A9DA}" type="datetimeFigureOut">
               <a:rPr lang="en-US" smtClean="0"/>
-              <a:t>8/10/2023</a:t>
+              <a:t>8/16/2023</a:t>
             </a:fld>
             <a:endParaRPr lang="en-US"/>
           </a:p>
@@ -1890,7 +1890,7 @@
           <a:p>
             <a:fld id="{62B14E49-696A-4F24-B720-C8B44559A9DA}" type="datetimeFigureOut">
               <a:rPr lang="en-US" smtClean="0"/>
-              <a:t>8/10/2023</a:t>
+              <a:t>8/16/2023</a:t>
             </a:fld>
             <a:endParaRPr lang="en-US"/>
           </a:p>
@@ -1985,7 +1985,7 @@
           <a:p>
             <a:fld id="{62B14E49-696A-4F24-B720-C8B44559A9DA}" type="datetimeFigureOut">
               <a:rPr lang="en-US" smtClean="0"/>
-              <a:t>8/10/2023</a:t>
+              <a:t>8/16/2023</a:t>
             </a:fld>
             <a:endParaRPr lang="en-US"/>
           </a:p>
@@ -2341,7 +2341,7 @@
           <a:p>
             <a:fld id="{62B14E49-696A-4F24-B720-C8B44559A9DA}" type="datetimeFigureOut">
               <a:rPr lang="en-US" smtClean="0"/>
-              <a:t>8/10/2023</a:t>
+              <a:t>8/16/2023</a:t>
             </a:fld>
             <a:endParaRPr lang="en-US"/>
           </a:p>
@@ -2644,7 +2644,7 @@
           <a:p>
             <a:fld id="{62B14E49-696A-4F24-B720-C8B44559A9DA}" type="datetimeFigureOut">
               <a:rPr lang="en-US" smtClean="0"/>
-              <a:t>8/10/2023</a:t>
+              <a:t>8/16/2023</a:t>
             </a:fld>
             <a:endParaRPr lang="en-US"/>
           </a:p>
@@ -2857,7 +2857,7 @@
           <a:p>
             <a:fld id="{62B14E49-696A-4F24-B720-C8B44559A9DA}" type="datetimeFigureOut">
               <a:rPr lang="en-US" smtClean="0"/>
-              <a:t>8/10/2023</a:t>
+              <a:t>8/16/2023</a:t>
             </a:fld>
             <a:endParaRPr lang="en-US"/>
           </a:p>

</xml_diff>

<commit_message>
More flexible grid + shorter columns
</commit_message>
<xml_diff>
--- a/Assets/How to Play/Instructions.pptx
+++ b/Assets/How to Play/Instructions.pptx
@@ -271,7 +271,7 @@
           <a:p>
             <a:fld id="{62B14E49-696A-4F24-B720-C8B44559A9DA}" type="datetimeFigureOut">
               <a:rPr lang="en-US" smtClean="0"/>
-              <a:t>8/16/2023</a:t>
+              <a:t>8/17/2023</a:t>
             </a:fld>
             <a:endParaRPr lang="en-US"/>
           </a:p>
@@ -441,7 +441,7 @@
           <a:p>
             <a:fld id="{62B14E49-696A-4F24-B720-C8B44559A9DA}" type="datetimeFigureOut">
               <a:rPr lang="en-US" smtClean="0"/>
-              <a:t>8/16/2023</a:t>
+              <a:t>8/17/2023</a:t>
             </a:fld>
             <a:endParaRPr lang="en-US"/>
           </a:p>
@@ -621,7 +621,7 @@
           <a:p>
             <a:fld id="{62B14E49-696A-4F24-B720-C8B44559A9DA}" type="datetimeFigureOut">
               <a:rPr lang="en-US" smtClean="0"/>
-              <a:t>8/16/2023</a:t>
+              <a:t>8/17/2023</a:t>
             </a:fld>
             <a:endParaRPr lang="en-US"/>
           </a:p>
@@ -791,7 +791,7 @@
           <a:p>
             <a:fld id="{62B14E49-696A-4F24-B720-C8B44559A9DA}" type="datetimeFigureOut">
               <a:rPr lang="en-US" smtClean="0"/>
-              <a:t>8/16/2023</a:t>
+              <a:t>8/17/2023</a:t>
             </a:fld>
             <a:endParaRPr lang="en-US"/>
           </a:p>
@@ -1055,7 +1055,7 @@
           <a:p>
             <a:fld id="{62B14E49-696A-4F24-B720-C8B44559A9DA}" type="datetimeFigureOut">
               <a:rPr lang="en-US" smtClean="0"/>
-              <a:t>8/16/2023</a:t>
+              <a:t>8/17/2023</a:t>
             </a:fld>
             <a:endParaRPr lang="en-US"/>
           </a:p>
@@ -1343,7 +1343,7 @@
           <a:p>
             <a:fld id="{62B14E49-696A-4F24-B720-C8B44559A9DA}" type="datetimeFigureOut">
               <a:rPr lang="en-US" smtClean="0"/>
-              <a:t>8/16/2023</a:t>
+              <a:t>8/17/2023</a:t>
             </a:fld>
             <a:endParaRPr lang="en-US"/>
           </a:p>
@@ -1772,7 +1772,7 @@
           <a:p>
             <a:fld id="{62B14E49-696A-4F24-B720-C8B44559A9DA}" type="datetimeFigureOut">
               <a:rPr lang="en-US" smtClean="0"/>
-              <a:t>8/16/2023</a:t>
+              <a:t>8/17/2023</a:t>
             </a:fld>
             <a:endParaRPr lang="en-US"/>
           </a:p>
@@ -1890,7 +1890,7 @@
           <a:p>
             <a:fld id="{62B14E49-696A-4F24-B720-C8B44559A9DA}" type="datetimeFigureOut">
               <a:rPr lang="en-US" smtClean="0"/>
-              <a:t>8/16/2023</a:t>
+              <a:t>8/17/2023</a:t>
             </a:fld>
             <a:endParaRPr lang="en-US"/>
           </a:p>
@@ -1985,7 +1985,7 @@
           <a:p>
             <a:fld id="{62B14E49-696A-4F24-B720-C8B44559A9DA}" type="datetimeFigureOut">
               <a:rPr lang="en-US" smtClean="0"/>
-              <a:t>8/16/2023</a:t>
+              <a:t>8/17/2023</a:t>
             </a:fld>
             <a:endParaRPr lang="en-US"/>
           </a:p>
@@ -2341,7 +2341,7 @@
           <a:p>
             <a:fld id="{62B14E49-696A-4F24-B720-C8B44559A9DA}" type="datetimeFigureOut">
               <a:rPr lang="en-US" smtClean="0"/>
-              <a:t>8/16/2023</a:t>
+              <a:t>8/17/2023</a:t>
             </a:fld>
             <a:endParaRPr lang="en-US"/>
           </a:p>
@@ -2644,7 +2644,7 @@
           <a:p>
             <a:fld id="{62B14E49-696A-4F24-B720-C8B44559A9DA}" type="datetimeFigureOut">
               <a:rPr lang="en-US" smtClean="0"/>
-              <a:t>8/16/2023</a:t>
+              <a:t>8/17/2023</a:t>
             </a:fld>
             <a:endParaRPr lang="en-US"/>
           </a:p>
@@ -2857,7 +2857,7 @@
           <a:p>
             <a:fld id="{62B14E49-696A-4F24-B720-C8B44559A9DA}" type="datetimeFigureOut">
               <a:rPr lang="en-US" smtClean="0"/>
-              <a:t>8/16/2023</a:t>
+              <a:t>8/17/2023</a:t>
             </a:fld>
             <a:endParaRPr lang="en-US"/>
           </a:p>
@@ -3670,7 +3670,7 @@
         </p:nvSpPr>
         <p:spPr>
           <a:xfrm>
-            <a:off x="615109" y="3109368"/>
+            <a:off x="724371" y="2734287"/>
             <a:ext cx="11710930" cy="461665"/>
           </a:xfrm>
           <a:prstGeom prst="rect">
@@ -3690,7 +3690,7 @@
             </a:r>
             <a:r>
               <a:rPr lang="en-US" sz="2400" dirty="0"/>
-              <a:t>:  Exactly 16 of each element are distributed among the research board  </a:t>
+              <a:t>:  Exactly 13 instances of each element is distributed among the essences</a:t>
             </a:r>
           </a:p>
         </p:txBody>
@@ -3717,7 +3717,7 @@
         </p:blipFill>
         <p:spPr>
           <a:xfrm>
-            <a:off x="1766798" y="1981506"/>
+            <a:off x="1766798" y="1721800"/>
             <a:ext cx="914400" cy="904875"/>
           </a:xfrm>
           <a:prstGeom prst="rect">
@@ -3739,7 +3739,7 @@
         </p:nvSpPr>
         <p:spPr>
           <a:xfrm>
-            <a:off x="2873612" y="2001484"/>
+            <a:off x="2873612" y="1741778"/>
             <a:ext cx="2964463" cy="369332"/>
           </a:xfrm>
           <a:prstGeom prst="rect">
@@ -3800,7 +3800,7 @@
           <a:p>
             <a:r>
               <a:rPr lang="en-US" sz="2200" dirty="0"/>
-              <a:t>not following any  uniform distribution</a:t>
+              <a:t>There is no guaranteed amount for any letter</a:t>
             </a:r>
           </a:p>
         </p:txBody>
@@ -3827,7 +3827,7 @@
         </p:blipFill>
         <p:spPr>
           <a:xfrm>
-            <a:off x="5808655" y="1981506"/>
+            <a:off x="5808655" y="1721800"/>
             <a:ext cx="914400" cy="895350"/>
           </a:xfrm>
           <a:prstGeom prst="rect">
@@ -3894,6 +3894,42 @@
                 </a:effectLst>
               </a:rPr>
               <a:t>Goal:</a:t>
+            </a:r>
+          </a:p>
+        </p:txBody>
+      </p:sp>
+      <p:sp>
+        <p:nvSpPr>
+          <p:cNvPr id="2" name="TextBox 1">
+            <a:extLst>
+              <a:ext uri="{FF2B5EF4-FFF2-40B4-BE49-F238E27FC236}">
+                <a16:creationId xmlns:a16="http://schemas.microsoft.com/office/drawing/2014/main" id="{FAA58F0C-2C66-34F6-864B-851E74371F30}"/>
+              </a:ext>
+            </a:extLst>
+          </p:cNvPr>
+          <p:cNvSpPr txBox="1"/>
+          <p:nvPr/>
+        </p:nvSpPr>
+        <p:spPr>
+          <a:xfrm>
+            <a:off x="1019787" y="3249852"/>
+            <a:ext cx="8487770" cy="461665"/>
+          </a:xfrm>
+          <a:prstGeom prst="rect">
+            <a:avLst/>
+          </a:prstGeom>
+          <a:noFill/>
+        </p:spPr>
+        <p:txBody>
+          <a:bodyPr wrap="square" rtlCol="0">
+            <a:spAutoFit/>
+          </a:bodyPr>
+          <a:lstStyle/>
+          <a:p>
+            <a:pPr algn="ctr"/>
+            <a:r>
+              <a:rPr lang="en-US" sz="2400" dirty="0"/>
+              <a:t>Element Types</a:t>
             </a:r>
           </a:p>
         </p:txBody>
@@ -4944,8 +4980,8 @@
         </p:nvSpPr>
         <p:spPr>
           <a:xfrm>
-            <a:off x="665676" y="772806"/>
-            <a:ext cx="10106985" cy="2336703"/>
+            <a:off x="676693" y="434415"/>
+            <a:ext cx="10106985" cy="2906450"/>
           </a:xfrm>
           <a:prstGeom prst="rect">
             <a:avLst/>
@@ -5149,7 +5185,7 @@
           <a:p>
             <a:r>
               <a:rPr lang="en-US" dirty="0"/>
-              <a:t>Essences can also be placed in storage.</a:t>
+              <a:t>Essences can be freely placed in or out of storage.</a:t>
             </a:r>
           </a:p>
           <a:p>
@@ -5162,6 +5198,12 @@
             <a:r>
               <a:rPr lang="en-US" dirty="0"/>
               <a:t>Storage has a capacity of 8</a:t>
+            </a:r>
+          </a:p>
+          <a:p>
+            <a:r>
+              <a:rPr lang="en-US" dirty="0"/>
+              <a:t>Storage starts with 1 random essence </a:t>
             </a:r>
           </a:p>
         </p:txBody>
@@ -5180,7 +5222,7 @@
         </p:nvSpPr>
         <p:spPr>
           <a:xfrm>
-            <a:off x="1774680" y="168966"/>
+            <a:off x="1677679" y="0"/>
             <a:ext cx="2252861" cy="923330"/>
           </a:xfrm>
           <a:prstGeom prst="rect">
@@ -5233,7 +5275,7 @@
         </p:nvSpPr>
         <p:spPr>
           <a:xfrm>
-            <a:off x="1419339" y="2923268"/>
+            <a:off x="1419339" y="3163553"/>
             <a:ext cx="2511201" cy="923330"/>
           </a:xfrm>
           <a:prstGeom prst="rect">
@@ -5283,7 +5325,7 @@
         </p:nvSpPr>
         <p:spPr>
           <a:xfrm>
-            <a:off x="818076" y="3242758"/>
+            <a:off x="851127" y="3517135"/>
             <a:ext cx="10106985" cy="3215966"/>
           </a:xfrm>
           <a:prstGeom prst="rect">

</xml_diff>

<commit_message>
removed meta-experiment threshold + inline victory
</commit_message>
<xml_diff>
--- a/Assets/How to Play/Instructions.pptx
+++ b/Assets/How to Play/Instructions.pptx
@@ -271,7 +271,7 @@
           <a:p>
             <a:fld id="{62B14E49-696A-4F24-B720-C8B44559A9DA}" type="datetimeFigureOut">
               <a:rPr lang="en-US" smtClean="0"/>
-              <a:t>8/17/2023</a:t>
+              <a:t>8/20/2023</a:t>
             </a:fld>
             <a:endParaRPr lang="en-US"/>
           </a:p>
@@ -441,7 +441,7 @@
           <a:p>
             <a:fld id="{62B14E49-696A-4F24-B720-C8B44559A9DA}" type="datetimeFigureOut">
               <a:rPr lang="en-US" smtClean="0"/>
-              <a:t>8/17/2023</a:t>
+              <a:t>8/20/2023</a:t>
             </a:fld>
             <a:endParaRPr lang="en-US"/>
           </a:p>
@@ -621,7 +621,7 @@
           <a:p>
             <a:fld id="{62B14E49-696A-4F24-B720-C8B44559A9DA}" type="datetimeFigureOut">
               <a:rPr lang="en-US" smtClean="0"/>
-              <a:t>8/17/2023</a:t>
+              <a:t>8/20/2023</a:t>
             </a:fld>
             <a:endParaRPr lang="en-US"/>
           </a:p>
@@ -791,7 +791,7 @@
           <a:p>
             <a:fld id="{62B14E49-696A-4F24-B720-C8B44559A9DA}" type="datetimeFigureOut">
               <a:rPr lang="en-US" smtClean="0"/>
-              <a:t>8/17/2023</a:t>
+              <a:t>8/20/2023</a:t>
             </a:fld>
             <a:endParaRPr lang="en-US"/>
           </a:p>
@@ -1055,7 +1055,7 @@
           <a:p>
             <a:fld id="{62B14E49-696A-4F24-B720-C8B44559A9DA}" type="datetimeFigureOut">
               <a:rPr lang="en-US" smtClean="0"/>
-              <a:t>8/17/2023</a:t>
+              <a:t>8/20/2023</a:t>
             </a:fld>
             <a:endParaRPr lang="en-US"/>
           </a:p>
@@ -1343,7 +1343,7 @@
           <a:p>
             <a:fld id="{62B14E49-696A-4F24-B720-C8B44559A9DA}" type="datetimeFigureOut">
               <a:rPr lang="en-US" smtClean="0"/>
-              <a:t>8/17/2023</a:t>
+              <a:t>8/20/2023</a:t>
             </a:fld>
             <a:endParaRPr lang="en-US"/>
           </a:p>
@@ -1772,7 +1772,7 @@
           <a:p>
             <a:fld id="{62B14E49-696A-4F24-B720-C8B44559A9DA}" type="datetimeFigureOut">
               <a:rPr lang="en-US" smtClean="0"/>
-              <a:t>8/17/2023</a:t>
+              <a:t>8/20/2023</a:t>
             </a:fld>
             <a:endParaRPr lang="en-US"/>
           </a:p>
@@ -1890,7 +1890,7 @@
           <a:p>
             <a:fld id="{62B14E49-696A-4F24-B720-C8B44559A9DA}" type="datetimeFigureOut">
               <a:rPr lang="en-US" smtClean="0"/>
-              <a:t>8/17/2023</a:t>
+              <a:t>8/20/2023</a:t>
             </a:fld>
             <a:endParaRPr lang="en-US"/>
           </a:p>
@@ -1985,7 +1985,7 @@
           <a:p>
             <a:fld id="{62B14E49-696A-4F24-B720-C8B44559A9DA}" type="datetimeFigureOut">
               <a:rPr lang="en-US" smtClean="0"/>
-              <a:t>8/17/2023</a:t>
+              <a:t>8/20/2023</a:t>
             </a:fld>
             <a:endParaRPr lang="en-US"/>
           </a:p>
@@ -2341,7 +2341,7 @@
           <a:p>
             <a:fld id="{62B14E49-696A-4F24-B720-C8B44559A9DA}" type="datetimeFigureOut">
               <a:rPr lang="en-US" smtClean="0"/>
-              <a:t>8/17/2023</a:t>
+              <a:t>8/20/2023</a:t>
             </a:fld>
             <a:endParaRPr lang="en-US"/>
           </a:p>
@@ -2644,7 +2644,7 @@
           <a:p>
             <a:fld id="{62B14E49-696A-4F24-B720-C8B44559A9DA}" type="datetimeFigureOut">
               <a:rPr lang="en-US" smtClean="0"/>
-              <a:t>8/17/2023</a:t>
+              <a:t>8/20/2023</a:t>
             </a:fld>
             <a:endParaRPr lang="en-US"/>
           </a:p>
@@ -2857,7 +2857,7 @@
           <a:p>
             <a:fld id="{62B14E49-696A-4F24-B720-C8B44559A9DA}" type="datetimeFigureOut">
               <a:rPr lang="en-US" smtClean="0"/>
-              <a:t>8/17/2023</a:t>
+              <a:t>8/20/2023</a:t>
             </a:fld>
             <a:endParaRPr lang="en-US"/>
           </a:p>
@@ -3352,6 +3352,13 @@
             <a:schemeClr val="lt1"/>
           </a:fontRef>
         </p:style>
+        <p:txBody>
+          <a:bodyPr/>
+          <a:lstStyle/>
+          <a:p>
+            <a:endParaRPr lang="en-US"/>
+          </a:p>
+        </p:txBody>
       </p:sp>
       <p:sp>
         <p:nvSpPr>
@@ -3690,7 +3697,7 @@
             </a:r>
             <a:r>
               <a:rPr lang="en-US" sz="2400" dirty="0"/>
-              <a:t>:  Exactly 13 instances of each element is distributed among the essences</a:t>
+              <a:t>:  Exactly 13 instances of each element is distributed among the board</a:t>
             </a:r>
           </a:p>
         </p:txBody>
@@ -3999,35 +4006,6 @@
           </a:p>
         </p:txBody>
       </p:sp>
-      <p:pic>
-        <p:nvPicPr>
-          <p:cNvPr id="5" name="Picture 4">
-            <a:extLst>
-              <a:ext uri="{FF2B5EF4-FFF2-40B4-BE49-F238E27FC236}">
-                <a16:creationId xmlns:a16="http://schemas.microsoft.com/office/drawing/2014/main" id="{1C751CCE-F057-D8AD-C0AE-91DA2FFAD0A1}"/>
-              </a:ext>
-            </a:extLst>
-          </p:cNvPr>
-          <p:cNvPicPr>
-            <a:picLocks noChangeAspect="1"/>
-          </p:cNvPicPr>
-          <p:nvPr/>
-        </p:nvPicPr>
-        <p:blipFill rotWithShape="1">
-          <a:blip r:embed="rId2"/>
-          <a:srcRect l="2695" t="943" r="2695" b="1279"/>
-          <a:stretch/>
-        </p:blipFill>
-        <p:spPr>
-          <a:xfrm>
-            <a:off x="8420782" y="1420717"/>
-            <a:ext cx="2876879" cy="4016566"/>
-          </a:xfrm>
-          <a:prstGeom prst="rect">
-            <a:avLst/>
-          </a:prstGeom>
-        </p:spPr>
-      </p:pic>
       <p:sp>
         <p:nvSpPr>
           <p:cNvPr id="6" name="TextBox 5">
@@ -4128,13 +4106,13 @@
           <p:nvPr/>
         </p:nvPicPr>
         <p:blipFill>
-          <a:blip r:embed="rId3">
+          <a:blip r:embed="rId2">
             <a:extLst>
               <a:ext uri="{28A0092B-C50C-407E-A947-70E740481C1C}">
                 <a14:useLocalDpi xmlns:a14="http://schemas.microsoft.com/office/drawing/2010/main" val="0"/>
               </a:ext>
               <a:ext uri="{96DAC541-7B7A-43D3-8B79-37D633B846F1}">
-                <asvg:svgBlip xmlns:asvg="http://schemas.microsoft.com/office/drawing/2016/SVG/main" r:embed="rId4"/>
+                <asvg:svgBlip xmlns:asvg="http://schemas.microsoft.com/office/drawing/2016/SVG/main" r:embed="rId3"/>
               </a:ext>
             </a:extLst>
           </a:blip>
@@ -4197,6 +4175,36 @@
           </a:p>
         </p:txBody>
       </p:sp>
+      <p:pic>
+        <p:nvPicPr>
+          <p:cNvPr id="4" name="Picture 3">
+            <a:extLst>
+              <a:ext uri="{FF2B5EF4-FFF2-40B4-BE49-F238E27FC236}">
+                <a16:creationId xmlns:a16="http://schemas.microsoft.com/office/drawing/2014/main" id="{29FF4842-CF19-D446-4884-2E41568AA443}"/>
+              </a:ext>
+            </a:extLst>
+          </p:cNvPr>
+          <p:cNvPicPr>
+            <a:picLocks noChangeAspect="1"/>
+          </p:cNvPicPr>
+          <p:nvPr/>
+        </p:nvPicPr>
+        <p:blipFill>
+          <a:blip r:embed="rId4"/>
+          <a:stretch>
+            <a:fillRect/>
+          </a:stretch>
+        </p:blipFill>
+        <p:spPr>
+          <a:xfrm>
+            <a:off x="8434853" y="1931124"/>
+            <a:ext cx="3136926" cy="3641075"/>
+          </a:xfrm>
+          <a:prstGeom prst="rect">
+            <a:avLst/>
+          </a:prstGeom>
+        </p:spPr>
+      </p:pic>
     </p:spTree>
     <p:extLst>
       <p:ext uri="{BB962C8B-B14F-4D97-AF65-F5344CB8AC3E}">
@@ -4630,25 +4638,7 @@
           <a:p>
             <a:r>
               <a:rPr lang="en-US" dirty="0"/>
-              <a:t>These constraints do not apply until…</a:t>
-            </a:r>
-          </a:p>
-          <a:p>
-            <a:r>
-              <a:rPr lang="en-US" dirty="0"/>
-              <a:t>You have at least 3 active experiments</a:t>
-            </a:r>
-          </a:p>
-          <a:p>
-            <a:r>
-              <a:rPr lang="en-US" dirty="0"/>
-              <a:t>			OR</a:t>
-            </a:r>
-          </a:p>
-          <a:p>
-            <a:r>
-              <a:rPr lang="en-US" dirty="0"/>
-              <a:t>There are at least 20 essences in your active experiments</a:t>
+              <a:t>These constraints do not apply until there are at least 20 essences in your active experiments</a:t>
             </a:r>
           </a:p>
         </p:txBody>

</xml_diff>

<commit_message>
practice experiments part 1
</commit_message>
<xml_diff>
--- a/Assets/How to Play/Instructions.pptx
+++ b/Assets/How to Play/Instructions.pptx
@@ -7,9 +7,11 @@
   <p:sldIdLst>
     <p:sldId id="258" r:id="rId2"/>
     <p:sldId id="256" r:id="rId3"/>
-    <p:sldId id="259" r:id="rId4"/>
-    <p:sldId id="260" r:id="rId5"/>
-    <p:sldId id="261" r:id="rId6"/>
+    <p:sldId id="261" r:id="rId4"/>
+    <p:sldId id="264" r:id="rId5"/>
+    <p:sldId id="260" r:id="rId6"/>
+    <p:sldId id="259" r:id="rId7"/>
+    <p:sldId id="262" r:id="rId8"/>
   </p:sldIdLst>
   <p:sldSz cx="12192000" cy="6858000"/>
   <p:notesSz cx="6858000" cy="9144000"/>
@@ -271,7 +273,7 @@
           <a:p>
             <a:fld id="{62B14E49-696A-4F24-B720-C8B44559A9DA}" type="datetimeFigureOut">
               <a:rPr lang="en-US" smtClean="0"/>
-              <a:t>9/12/2023</a:t>
+              <a:t>9/13/2023</a:t>
             </a:fld>
             <a:endParaRPr lang="en-US"/>
           </a:p>
@@ -441,7 +443,7 @@
           <a:p>
             <a:fld id="{62B14E49-696A-4F24-B720-C8B44559A9DA}" type="datetimeFigureOut">
               <a:rPr lang="en-US" smtClean="0"/>
-              <a:t>9/12/2023</a:t>
+              <a:t>9/13/2023</a:t>
             </a:fld>
             <a:endParaRPr lang="en-US"/>
           </a:p>
@@ -621,7 +623,7 @@
           <a:p>
             <a:fld id="{62B14E49-696A-4F24-B720-C8B44559A9DA}" type="datetimeFigureOut">
               <a:rPr lang="en-US" smtClean="0"/>
-              <a:t>9/12/2023</a:t>
+              <a:t>9/13/2023</a:t>
             </a:fld>
             <a:endParaRPr lang="en-US"/>
           </a:p>
@@ -791,7 +793,7 @@
           <a:p>
             <a:fld id="{62B14E49-696A-4F24-B720-C8B44559A9DA}" type="datetimeFigureOut">
               <a:rPr lang="en-US" smtClean="0"/>
-              <a:t>9/12/2023</a:t>
+              <a:t>9/13/2023</a:t>
             </a:fld>
             <a:endParaRPr lang="en-US"/>
           </a:p>
@@ -1055,7 +1057,7 @@
           <a:p>
             <a:fld id="{62B14E49-696A-4F24-B720-C8B44559A9DA}" type="datetimeFigureOut">
               <a:rPr lang="en-US" smtClean="0"/>
-              <a:t>9/12/2023</a:t>
+              <a:t>9/13/2023</a:t>
             </a:fld>
             <a:endParaRPr lang="en-US"/>
           </a:p>
@@ -1343,7 +1345,7 @@
           <a:p>
             <a:fld id="{62B14E49-696A-4F24-B720-C8B44559A9DA}" type="datetimeFigureOut">
               <a:rPr lang="en-US" smtClean="0"/>
-              <a:t>9/12/2023</a:t>
+              <a:t>9/13/2023</a:t>
             </a:fld>
             <a:endParaRPr lang="en-US"/>
           </a:p>
@@ -1772,7 +1774,7 @@
           <a:p>
             <a:fld id="{62B14E49-696A-4F24-B720-C8B44559A9DA}" type="datetimeFigureOut">
               <a:rPr lang="en-US" smtClean="0"/>
-              <a:t>9/12/2023</a:t>
+              <a:t>9/13/2023</a:t>
             </a:fld>
             <a:endParaRPr lang="en-US"/>
           </a:p>
@@ -1890,7 +1892,7 @@
           <a:p>
             <a:fld id="{62B14E49-696A-4F24-B720-C8B44559A9DA}" type="datetimeFigureOut">
               <a:rPr lang="en-US" smtClean="0"/>
-              <a:t>9/12/2023</a:t>
+              <a:t>9/13/2023</a:t>
             </a:fld>
             <a:endParaRPr lang="en-US"/>
           </a:p>
@@ -1985,7 +1987,7 @@
           <a:p>
             <a:fld id="{62B14E49-696A-4F24-B720-C8B44559A9DA}" type="datetimeFigureOut">
               <a:rPr lang="en-US" smtClean="0"/>
-              <a:t>9/12/2023</a:t>
+              <a:t>9/13/2023</a:t>
             </a:fld>
             <a:endParaRPr lang="en-US"/>
           </a:p>
@@ -2341,7 +2343,7 @@
           <a:p>
             <a:fld id="{62B14E49-696A-4F24-B720-C8B44559A9DA}" type="datetimeFigureOut">
               <a:rPr lang="en-US" smtClean="0"/>
-              <a:t>9/12/2023</a:t>
+              <a:t>9/13/2023</a:t>
             </a:fld>
             <a:endParaRPr lang="en-US"/>
           </a:p>
@@ -2644,7 +2646,7 @@
           <a:p>
             <a:fld id="{62B14E49-696A-4F24-B720-C8B44559A9DA}" type="datetimeFigureOut">
               <a:rPr lang="en-US" smtClean="0"/>
-              <a:t>9/12/2023</a:t>
+              <a:t>9/13/2023</a:t>
             </a:fld>
             <a:endParaRPr lang="en-US"/>
           </a:p>
@@ -2857,7 +2859,7 @@
           <a:p>
             <a:fld id="{62B14E49-696A-4F24-B720-C8B44559A9DA}" type="datetimeFigureOut">
               <a:rPr lang="en-US" smtClean="0"/>
-              <a:t>9/12/2023</a:t>
+              <a:t>9/13/2023</a:t>
             </a:fld>
             <a:endParaRPr lang="en-US"/>
           </a:p>
@@ -3437,8 +3439,8 @@
         </p:nvSpPr>
         <p:spPr>
           <a:xfrm>
-            <a:off x="2253931" y="827117"/>
-            <a:ext cx="11710930" cy="923330"/>
+            <a:off x="4906095" y="2223914"/>
+            <a:ext cx="7303418" cy="2246769"/>
           </a:xfrm>
           <a:prstGeom prst="rect">
             <a:avLst/>
@@ -3452,402 +3454,31 @@
           <a:lstStyle/>
           <a:p>
             <a:r>
-              <a:rPr lang="en-US" dirty="0"/>
-              <a:t>Place all essences into active experiments</a:t>
-            </a:r>
-          </a:p>
-          <a:p>
-            <a:r>
-              <a:rPr lang="en-US" dirty="0"/>
-              <a:t>(to win there  must be no essences in research, storage or inactive experiments)</a:t>
-            </a:r>
-          </a:p>
-          <a:p>
-            <a:r>
-              <a:rPr lang="en-US" dirty="0"/>
+              <a:rPr lang="en-US" sz="2800" dirty="0"/>
+              <a:t>Place all tiles into active experiments</a:t>
+            </a:r>
+          </a:p>
+          <a:p>
+            <a:r>
+              <a:rPr lang="en-US" sz="2800" dirty="0"/>
+              <a:t>(to win there  must be no tiles in research, storage or inactive experiments)</a:t>
+            </a:r>
+          </a:p>
+          <a:p>
+            <a:endParaRPr lang="en-US" sz="2800" dirty="0"/>
+          </a:p>
+          <a:p>
+            <a:r>
+              <a:rPr lang="en-US" sz="2800" dirty="0"/>
               <a:t>Your final setup must follow all </a:t>
             </a:r>
             <a:r>
-              <a:rPr lang="en-US" i="1" dirty="0"/>
+              <a:rPr lang="en-US" sz="2800" i="1" dirty="0"/>
               <a:t>alchemical laws</a:t>
             </a:r>
           </a:p>
         </p:txBody>
       </p:sp>
-      <p:pic>
-        <p:nvPicPr>
-          <p:cNvPr id="21" name="Graphic 20">
-            <a:extLst>
-              <a:ext uri="{FF2B5EF4-FFF2-40B4-BE49-F238E27FC236}">
-                <a16:creationId xmlns:a16="http://schemas.microsoft.com/office/drawing/2014/main" id="{C3E67CED-D21E-933C-AF98-5CF4BAC94A9D}"/>
-              </a:ext>
-            </a:extLst>
-          </p:cNvPr>
-          <p:cNvPicPr>
-            <a:picLocks noChangeAspect="1"/>
-          </p:cNvPicPr>
-          <p:nvPr/>
-        </p:nvPicPr>
-        <p:blipFill>
-          <a:blip r:embed="rId2">
-            <a:extLst>
-              <a:ext uri="{28A0092B-C50C-407E-A947-70E740481C1C}">
-                <a14:useLocalDpi xmlns:a14="http://schemas.microsoft.com/office/drawing/2010/main" val="0"/>
-              </a:ext>
-              <a:ext uri="{96DAC541-7B7A-43D3-8B79-37D633B846F1}">
-                <asvg:svgBlip xmlns:asvg="http://schemas.microsoft.com/office/drawing/2016/SVG/main" r:embed="rId3"/>
-              </a:ext>
-            </a:extLst>
-          </a:blip>
-          <a:stretch>
-            <a:fillRect/>
-          </a:stretch>
-        </p:blipFill>
-        <p:spPr>
-          <a:xfrm>
-            <a:off x="5031711" y="4162590"/>
-            <a:ext cx="1234144" cy="1234144"/>
-          </a:xfrm>
-          <a:prstGeom prst="rect">
-            <a:avLst/>
-          </a:prstGeom>
-        </p:spPr>
-      </p:pic>
-      <p:pic>
-        <p:nvPicPr>
-          <p:cNvPr id="23" name="Graphic 22">
-            <a:extLst>
-              <a:ext uri="{FF2B5EF4-FFF2-40B4-BE49-F238E27FC236}">
-                <a16:creationId xmlns:a16="http://schemas.microsoft.com/office/drawing/2014/main" id="{B3563C3E-7418-0EF7-0D08-D42272B5787B}"/>
-              </a:ext>
-            </a:extLst>
-          </p:cNvPr>
-          <p:cNvPicPr>
-            <a:picLocks noChangeAspect="1"/>
-          </p:cNvPicPr>
-          <p:nvPr/>
-        </p:nvPicPr>
-        <p:blipFill>
-          <a:blip r:embed="rId4">
-            <a:extLst>
-              <a:ext uri="{28A0092B-C50C-407E-A947-70E740481C1C}">
-                <a14:useLocalDpi xmlns:a14="http://schemas.microsoft.com/office/drawing/2010/main" val="0"/>
-              </a:ext>
-              <a:ext uri="{96DAC541-7B7A-43D3-8B79-37D633B846F1}">
-                <asvg:svgBlip xmlns:asvg="http://schemas.microsoft.com/office/drawing/2016/SVG/main" r:embed="rId5"/>
-              </a:ext>
-            </a:extLst>
-          </a:blip>
-          <a:stretch>
-            <a:fillRect/>
-          </a:stretch>
-        </p:blipFill>
-        <p:spPr>
-          <a:xfrm>
-            <a:off x="6875252" y="4166254"/>
-            <a:ext cx="1234144" cy="1234144"/>
-          </a:xfrm>
-          <a:prstGeom prst="rect">
-            <a:avLst/>
-          </a:prstGeom>
-        </p:spPr>
-      </p:pic>
-      <p:pic>
-        <p:nvPicPr>
-          <p:cNvPr id="27" name="Graphic 26">
-            <a:extLst>
-              <a:ext uri="{FF2B5EF4-FFF2-40B4-BE49-F238E27FC236}">
-                <a16:creationId xmlns:a16="http://schemas.microsoft.com/office/drawing/2014/main" id="{8722689C-D302-A0EB-B409-F85576A3690E}"/>
-              </a:ext>
-            </a:extLst>
-          </p:cNvPr>
-          <p:cNvPicPr>
-            <a:picLocks noChangeAspect="1"/>
-          </p:cNvPicPr>
-          <p:nvPr/>
-        </p:nvPicPr>
-        <p:blipFill>
-          <a:blip r:embed="rId6">
-            <a:extLst>
-              <a:ext uri="{28A0092B-C50C-407E-A947-70E740481C1C}">
-                <a14:useLocalDpi xmlns:a14="http://schemas.microsoft.com/office/drawing/2010/main" val="0"/>
-              </a:ext>
-              <a:ext uri="{96DAC541-7B7A-43D3-8B79-37D633B846F1}">
-                <asvg:svgBlip xmlns:asvg="http://schemas.microsoft.com/office/drawing/2016/SVG/main" r:embed="rId7"/>
-              </a:ext>
-            </a:extLst>
-          </a:blip>
-          <a:stretch>
-            <a:fillRect/>
-          </a:stretch>
-        </p:blipFill>
-        <p:spPr>
-          <a:xfrm>
-            <a:off x="8640845" y="4198716"/>
-            <a:ext cx="1234144" cy="1234144"/>
-          </a:xfrm>
-          <a:prstGeom prst="rect">
-            <a:avLst/>
-          </a:prstGeom>
-        </p:spPr>
-      </p:pic>
-      <p:pic>
-        <p:nvPicPr>
-          <p:cNvPr id="29" name="Graphic 28">
-            <a:extLst>
-              <a:ext uri="{FF2B5EF4-FFF2-40B4-BE49-F238E27FC236}">
-                <a16:creationId xmlns:a16="http://schemas.microsoft.com/office/drawing/2014/main" id="{7FB66106-F2B7-E813-8B20-BBE3D940944A}"/>
-              </a:ext>
-            </a:extLst>
-          </p:cNvPr>
-          <p:cNvPicPr>
-            <a:picLocks noChangeAspect="1"/>
-          </p:cNvPicPr>
-          <p:nvPr/>
-        </p:nvPicPr>
-        <p:blipFill>
-          <a:blip r:embed="rId8">
-            <a:extLst>
-              <a:ext uri="{28A0092B-C50C-407E-A947-70E740481C1C}">
-                <a14:useLocalDpi xmlns:a14="http://schemas.microsoft.com/office/drawing/2010/main" val="0"/>
-              </a:ext>
-              <a:ext uri="{96DAC541-7B7A-43D3-8B79-37D633B846F1}">
-                <asvg:svgBlip xmlns:asvg="http://schemas.microsoft.com/office/drawing/2016/SVG/main" r:embed="rId9"/>
-              </a:ext>
-            </a:extLst>
-          </a:blip>
-          <a:stretch>
-            <a:fillRect/>
-          </a:stretch>
-        </p:blipFill>
-        <p:spPr>
-          <a:xfrm>
-            <a:off x="3266118" y="4198716"/>
-            <a:ext cx="1234144" cy="1234144"/>
-          </a:xfrm>
-          <a:prstGeom prst="rect">
-            <a:avLst/>
-          </a:prstGeom>
-        </p:spPr>
-      </p:pic>
-      <p:pic>
-        <p:nvPicPr>
-          <p:cNvPr id="31" name="Graphic 30">
-            <a:extLst>
-              <a:ext uri="{FF2B5EF4-FFF2-40B4-BE49-F238E27FC236}">
-                <a16:creationId xmlns:a16="http://schemas.microsoft.com/office/drawing/2014/main" id="{62A9D694-98DA-6A53-D159-A0CAE60F7C3C}"/>
-              </a:ext>
-            </a:extLst>
-          </p:cNvPr>
-          <p:cNvPicPr>
-            <a:picLocks noChangeAspect="1"/>
-          </p:cNvPicPr>
-          <p:nvPr/>
-        </p:nvPicPr>
-        <p:blipFill>
-          <a:blip r:embed="rId10">
-            <a:extLst>
-              <a:ext uri="{28A0092B-C50C-407E-A947-70E740481C1C}">
-                <a14:useLocalDpi xmlns:a14="http://schemas.microsoft.com/office/drawing/2010/main" val="0"/>
-              </a:ext>
-              <a:ext uri="{96DAC541-7B7A-43D3-8B79-37D633B846F1}">
-                <asvg:svgBlip xmlns:asvg="http://schemas.microsoft.com/office/drawing/2016/SVG/main" r:embed="rId11"/>
-              </a:ext>
-            </a:extLst>
-          </a:blip>
-          <a:stretch>
-            <a:fillRect/>
-          </a:stretch>
-        </p:blipFill>
-        <p:spPr>
-          <a:xfrm>
-            <a:off x="1460188" y="4187368"/>
-            <a:ext cx="1236554" cy="1236554"/>
-          </a:xfrm>
-          <a:prstGeom prst="rect">
-            <a:avLst/>
-          </a:prstGeom>
-        </p:spPr>
-      </p:pic>
-      <p:sp>
-        <p:nvSpPr>
-          <p:cNvPr id="32" name="TextBox 31">
-            <a:extLst>
-              <a:ext uri="{FF2B5EF4-FFF2-40B4-BE49-F238E27FC236}">
-                <a16:creationId xmlns:a16="http://schemas.microsoft.com/office/drawing/2014/main" id="{A24B0FF2-1988-7A9F-BAE6-51E3E6DE25AB}"/>
-              </a:ext>
-            </a:extLst>
-          </p:cNvPr>
-          <p:cNvSpPr txBox="1"/>
-          <p:nvPr/>
-        </p:nvSpPr>
-        <p:spPr>
-          <a:xfrm>
-            <a:off x="724371" y="3131924"/>
-            <a:ext cx="11710930" cy="461665"/>
-          </a:xfrm>
-          <a:prstGeom prst="rect">
-            <a:avLst/>
-          </a:prstGeom>
-          <a:noFill/>
-        </p:spPr>
-        <p:txBody>
-          <a:bodyPr wrap="square" rtlCol="0">
-            <a:spAutoFit/>
-          </a:bodyPr>
-          <a:lstStyle/>
-          <a:p>
-            <a:r>
-              <a:rPr lang="en-US" sz="2400" b="1" dirty="0"/>
-              <a:t>ELEMENT</a:t>
-            </a:r>
-            <a:r>
-              <a:rPr lang="en-US" sz="2400" dirty="0"/>
-              <a:t>:  Exactly 10 instances of each element are distributed among the board</a:t>
-            </a:r>
-          </a:p>
-        </p:txBody>
-      </p:sp>
-      <p:pic>
-        <p:nvPicPr>
-          <p:cNvPr id="34" name="Picture 33">
-            <a:extLst>
-              <a:ext uri="{FF2B5EF4-FFF2-40B4-BE49-F238E27FC236}">
-                <a16:creationId xmlns:a16="http://schemas.microsoft.com/office/drawing/2014/main" id="{C56A6214-433D-04B1-61B9-4C1F2F719348}"/>
-              </a:ext>
-            </a:extLst>
-          </p:cNvPr>
-          <p:cNvPicPr>
-            <a:picLocks noChangeAspect="1"/>
-          </p:cNvPicPr>
-          <p:nvPr/>
-        </p:nvPicPr>
-        <p:blipFill>
-          <a:blip r:embed="rId12"/>
-          <a:stretch>
-            <a:fillRect/>
-          </a:stretch>
-        </p:blipFill>
-        <p:spPr>
-          <a:xfrm>
-            <a:off x="2968790" y="2244355"/>
-            <a:ext cx="914400" cy="904875"/>
-          </a:xfrm>
-          <a:prstGeom prst="rect">
-            <a:avLst/>
-          </a:prstGeom>
-        </p:spPr>
-      </p:pic>
-      <p:sp>
-        <p:nvSpPr>
-          <p:cNvPr id="35" name="TextBox 34">
-            <a:extLst>
-              <a:ext uri="{FF2B5EF4-FFF2-40B4-BE49-F238E27FC236}">
-                <a16:creationId xmlns:a16="http://schemas.microsoft.com/office/drawing/2014/main" id="{3BDCD63F-A255-8658-9E93-FBFC39CEC6D0}"/>
-              </a:ext>
-            </a:extLst>
-          </p:cNvPr>
-          <p:cNvSpPr txBox="1"/>
-          <p:nvPr/>
-        </p:nvSpPr>
-        <p:spPr>
-          <a:xfrm>
-            <a:off x="4166551" y="2502892"/>
-            <a:ext cx="2964463" cy="369332"/>
-          </a:xfrm>
-          <a:prstGeom prst="rect">
-            <a:avLst/>
-          </a:prstGeom>
-          <a:noFill/>
-        </p:spPr>
-        <p:txBody>
-          <a:bodyPr wrap="square" rtlCol="0">
-            <a:spAutoFit/>
-          </a:bodyPr>
-          <a:lstStyle/>
-          <a:p>
-            <a:r>
-              <a:rPr lang="en-US" dirty="0"/>
-              <a:t>Essences have 2 attributes</a:t>
-            </a:r>
-          </a:p>
-        </p:txBody>
-      </p:sp>
-      <p:sp>
-        <p:nvSpPr>
-          <p:cNvPr id="36" name="TextBox 35">
-            <a:extLst>
-              <a:ext uri="{FF2B5EF4-FFF2-40B4-BE49-F238E27FC236}">
-                <a16:creationId xmlns:a16="http://schemas.microsoft.com/office/drawing/2014/main" id="{1CA8AFD1-601B-B809-B5C2-A8BB42106977}"/>
-              </a:ext>
-            </a:extLst>
-          </p:cNvPr>
-          <p:cNvSpPr txBox="1"/>
-          <p:nvPr/>
-        </p:nvSpPr>
-        <p:spPr>
-          <a:xfrm>
-            <a:off x="724371" y="5692560"/>
-            <a:ext cx="8133191" cy="769441"/>
-          </a:xfrm>
-          <a:prstGeom prst="rect">
-            <a:avLst/>
-          </a:prstGeom>
-          <a:noFill/>
-        </p:spPr>
-        <p:txBody>
-          <a:bodyPr wrap="square" rtlCol="0">
-            <a:spAutoFit/>
-          </a:bodyPr>
-          <a:lstStyle/>
-          <a:p>
-            <a:r>
-              <a:rPr lang="en-US" sz="2200" b="1" dirty="0"/>
-              <a:t>LETTER:</a:t>
-            </a:r>
-            <a:r>
-              <a:rPr lang="en-US" sz="2200" dirty="0"/>
-              <a:t>  Each essence is randomly generated with a letter A-F, </a:t>
-            </a:r>
-          </a:p>
-          <a:p>
-            <a:r>
-              <a:rPr lang="en-US" sz="2200" dirty="0"/>
-              <a:t>There is no guaranteed amount for any letter</a:t>
-            </a:r>
-          </a:p>
-        </p:txBody>
-      </p:sp>
-      <p:pic>
-        <p:nvPicPr>
-          <p:cNvPr id="38" name="Picture 37">
-            <a:extLst>
-              <a:ext uri="{FF2B5EF4-FFF2-40B4-BE49-F238E27FC236}">
-                <a16:creationId xmlns:a16="http://schemas.microsoft.com/office/drawing/2014/main" id="{1B063D12-BDCF-1D83-FB20-CF7772011CD7}"/>
-              </a:ext>
-            </a:extLst>
-          </p:cNvPr>
-          <p:cNvPicPr>
-            <a:picLocks noChangeAspect="1"/>
-          </p:cNvPicPr>
-          <p:nvPr/>
-        </p:nvPicPr>
-        <p:blipFill>
-          <a:blip r:embed="rId13"/>
-          <a:stretch>
-            <a:fillRect/>
-          </a:stretch>
-        </p:blipFill>
-        <p:spPr>
-          <a:xfrm>
-            <a:off x="6957175" y="2231433"/>
-            <a:ext cx="914400" cy="895350"/>
-          </a:xfrm>
-          <a:prstGeom prst="rect">
-            <a:avLst/>
-          </a:prstGeom>
-        </p:spPr>
-      </p:pic>
       <p:sp>
         <p:nvSpPr>
           <p:cNvPr id="41" name="Rectangle 40">
@@ -3862,8 +3493,8 @@
         </p:nvSpPr>
         <p:spPr>
           <a:xfrm>
-            <a:off x="615109" y="588964"/>
-            <a:ext cx="1616148" cy="923330"/>
+            <a:off x="4758987" y="1348843"/>
+            <a:ext cx="1436612" cy="923330"/>
           </a:xfrm>
           <a:prstGeom prst="rect">
             <a:avLst/>
@@ -3906,141 +3537,542 @@
                   </a:innerShdw>
                 </a:effectLst>
               </a:rPr>
-              <a:t>Goal:</a:t>
-            </a:r>
-          </a:p>
-        </p:txBody>
-      </p:sp>
-      <p:sp>
-        <p:nvSpPr>
-          <p:cNvPr id="2" name="TextBox 1">
+              <a:t>Goal</a:t>
+            </a:r>
+          </a:p>
+        </p:txBody>
+      </p:sp>
+      <p:grpSp>
+        <p:nvGrpSpPr>
+          <p:cNvPr id="58" name="Group 57">
             <a:extLst>
               <a:ext uri="{FF2B5EF4-FFF2-40B4-BE49-F238E27FC236}">
-                <a16:creationId xmlns:a16="http://schemas.microsoft.com/office/drawing/2014/main" id="{FAA58F0C-2C66-34F6-864B-851E74371F30}"/>
+                <a16:creationId xmlns:a16="http://schemas.microsoft.com/office/drawing/2014/main" id="{03D90C6E-52BD-4C44-2C84-44014E265EC4}"/>
               </a:ext>
             </a:extLst>
           </p:cNvPr>
-          <p:cNvSpPr txBox="1"/>
+          <p:cNvGrpSpPr/>
           <p:nvPr/>
-        </p:nvSpPr>
+        </p:nvGrpSpPr>
+        <p:grpSpPr>
+          <a:xfrm>
+            <a:off x="393309" y="1441382"/>
+            <a:ext cx="4459631" cy="4067775"/>
+            <a:chOff x="5464072" y="1252370"/>
+            <a:chExt cx="5999588" cy="5472420"/>
+          </a:xfrm>
+        </p:grpSpPr>
+        <p:pic>
+          <p:nvPicPr>
+            <p:cNvPr id="6" name="Picture 5">
+              <a:extLst>
+                <a:ext uri="{FF2B5EF4-FFF2-40B4-BE49-F238E27FC236}">
+                  <a16:creationId xmlns:a16="http://schemas.microsoft.com/office/drawing/2014/main" id="{06F7DEC3-3188-BA63-404F-541B3A411D3B}"/>
+                </a:ext>
+              </a:extLst>
+            </p:cNvPr>
+            <p:cNvPicPr>
+              <a:picLocks noChangeAspect="1"/>
+            </p:cNvPicPr>
+            <p:nvPr/>
+          </p:nvPicPr>
+          <p:blipFill rotWithShape="1">
+            <a:blip r:embed="rId2"/>
+            <a:srcRect t="32313" b="1"/>
+            <a:stretch/>
+          </p:blipFill>
+          <p:spPr>
+            <a:xfrm>
+              <a:off x="5464072" y="5265907"/>
+              <a:ext cx="5999588" cy="1458883"/>
+            </a:xfrm>
+            <a:prstGeom prst="rect">
+              <a:avLst/>
+            </a:prstGeom>
+          </p:spPr>
+        </p:pic>
+        <p:grpSp>
+          <p:nvGrpSpPr>
+            <p:cNvPr id="57" name="Group 56">
+              <a:extLst>
+                <a:ext uri="{FF2B5EF4-FFF2-40B4-BE49-F238E27FC236}">
+                  <a16:creationId xmlns:a16="http://schemas.microsoft.com/office/drawing/2014/main" id="{42CDF2E0-26C7-04CE-AF77-453F6985FBE4}"/>
+                </a:ext>
+              </a:extLst>
+            </p:cNvPr>
+            <p:cNvGrpSpPr/>
+            <p:nvPr/>
+          </p:nvGrpSpPr>
+          <p:grpSpPr>
+            <a:xfrm>
+              <a:off x="5906355" y="1252370"/>
+              <a:ext cx="4998192" cy="4261739"/>
+              <a:chOff x="5906355" y="1252370"/>
+              <a:chExt cx="4998192" cy="4261739"/>
+            </a:xfrm>
+          </p:grpSpPr>
+          <p:pic>
+            <p:nvPicPr>
+              <p:cNvPr id="7" name="Picture 6">
+                <a:extLst>
+                  <a:ext uri="{FF2B5EF4-FFF2-40B4-BE49-F238E27FC236}">
+                    <a16:creationId xmlns:a16="http://schemas.microsoft.com/office/drawing/2014/main" id="{44EC972E-5FF2-FCA9-D400-F4944C494396}"/>
+                  </a:ext>
+                </a:extLst>
+              </p:cNvPr>
+              <p:cNvPicPr>
+                <a:picLocks noChangeAspect="1"/>
+              </p:cNvPicPr>
+              <p:nvPr/>
+            </p:nvPicPr>
+            <p:blipFill>
+              <a:blip r:embed="rId3"/>
+              <a:stretch>
+                <a:fillRect/>
+              </a:stretch>
+            </p:blipFill>
+            <p:spPr>
+              <a:xfrm>
+                <a:off x="6694524" y="1252370"/>
+                <a:ext cx="3081072" cy="2751741"/>
+              </a:xfrm>
+              <a:prstGeom prst="rect">
+                <a:avLst/>
+              </a:prstGeom>
+            </p:spPr>
+          </p:pic>
+          <p:cxnSp>
+            <p:nvCxnSpPr>
+              <p:cNvPr id="11" name="Straight Arrow Connector 10">
+                <a:extLst>
+                  <a:ext uri="{FF2B5EF4-FFF2-40B4-BE49-F238E27FC236}">
+                    <a16:creationId xmlns:a16="http://schemas.microsoft.com/office/drawing/2014/main" id="{F7F200AB-5E0C-D25D-30E0-AEEB4B3D8F14}"/>
+                  </a:ext>
+                </a:extLst>
+              </p:cNvPr>
+              <p:cNvCxnSpPr>
+                <a:cxnSpLocks/>
+              </p:cNvCxnSpPr>
+              <p:nvPr/>
+            </p:nvCxnSpPr>
+            <p:spPr>
+              <a:xfrm flipH="1">
+                <a:off x="5906355" y="4004111"/>
+                <a:ext cx="2481202" cy="1365137"/>
+              </a:xfrm>
+              <a:prstGeom prst="straightConnector1">
+                <a:avLst/>
+              </a:prstGeom>
+              <a:ln w="57150">
+                <a:solidFill>
+                  <a:schemeClr val="accent1">
+                    <a:lumMod val="20000"/>
+                    <a:lumOff val="80000"/>
+                  </a:schemeClr>
+                </a:solidFill>
+                <a:tailEnd type="triangle"/>
+              </a:ln>
+            </p:spPr>
+            <p:style>
+              <a:lnRef idx="1">
+                <a:schemeClr val="dk1"/>
+              </a:lnRef>
+              <a:fillRef idx="0">
+                <a:schemeClr val="dk1"/>
+              </a:fillRef>
+              <a:effectRef idx="0">
+                <a:schemeClr val="dk1"/>
+              </a:effectRef>
+              <a:fontRef idx="minor">
+                <a:schemeClr val="tx1"/>
+              </a:fontRef>
+            </p:style>
+          </p:cxnSp>
+          <p:cxnSp>
+            <p:nvCxnSpPr>
+              <p:cNvPr id="16" name="Straight Arrow Connector 15">
+                <a:extLst>
+                  <a:ext uri="{FF2B5EF4-FFF2-40B4-BE49-F238E27FC236}">
+                    <a16:creationId xmlns:a16="http://schemas.microsoft.com/office/drawing/2014/main" id="{72E5E5C0-1CDB-21B9-760E-755AD5C26434}"/>
+                  </a:ext>
+                </a:extLst>
+              </p:cNvPr>
+              <p:cNvCxnSpPr>
+                <a:cxnSpLocks/>
+              </p:cNvCxnSpPr>
+              <p:nvPr/>
+            </p:nvCxnSpPr>
+            <p:spPr>
+              <a:xfrm flipH="1">
+                <a:off x="7250545" y="4013706"/>
+                <a:ext cx="1137012" cy="1407212"/>
+              </a:xfrm>
+              <a:prstGeom prst="straightConnector1">
+                <a:avLst/>
+              </a:prstGeom>
+              <a:ln w="57150">
+                <a:solidFill>
+                  <a:schemeClr val="accent1">
+                    <a:lumMod val="20000"/>
+                    <a:lumOff val="80000"/>
+                  </a:schemeClr>
+                </a:solidFill>
+                <a:tailEnd type="triangle"/>
+              </a:ln>
+            </p:spPr>
+            <p:style>
+              <a:lnRef idx="1">
+                <a:schemeClr val="dk1"/>
+              </a:lnRef>
+              <a:fillRef idx="0">
+                <a:schemeClr val="dk1"/>
+              </a:fillRef>
+              <a:effectRef idx="0">
+                <a:schemeClr val="dk1"/>
+              </a:effectRef>
+              <a:fontRef idx="minor">
+                <a:schemeClr val="tx1"/>
+              </a:fontRef>
+            </p:style>
+          </p:cxnSp>
+          <p:cxnSp>
+            <p:nvCxnSpPr>
+              <p:cNvPr id="19" name="Straight Arrow Connector 18">
+                <a:extLst>
+                  <a:ext uri="{FF2B5EF4-FFF2-40B4-BE49-F238E27FC236}">
+                    <a16:creationId xmlns:a16="http://schemas.microsoft.com/office/drawing/2014/main" id="{BB4A5D98-FCF3-D1E5-F4DD-54DDFD017F85}"/>
+                  </a:ext>
+                </a:extLst>
+              </p:cNvPr>
+              <p:cNvCxnSpPr>
+                <a:cxnSpLocks/>
+              </p:cNvCxnSpPr>
+              <p:nvPr/>
+            </p:nvCxnSpPr>
+            <p:spPr>
+              <a:xfrm>
+                <a:off x="8387557" y="4013706"/>
+                <a:ext cx="23559" cy="1500403"/>
+              </a:xfrm>
+              <a:prstGeom prst="straightConnector1">
+                <a:avLst/>
+              </a:prstGeom>
+              <a:ln w="57150">
+                <a:solidFill>
+                  <a:schemeClr val="accent1">
+                    <a:lumMod val="20000"/>
+                    <a:lumOff val="80000"/>
+                  </a:schemeClr>
+                </a:solidFill>
+                <a:tailEnd type="triangle"/>
+              </a:ln>
+            </p:spPr>
+            <p:style>
+              <a:lnRef idx="1">
+                <a:schemeClr val="dk1"/>
+              </a:lnRef>
+              <a:fillRef idx="0">
+                <a:schemeClr val="dk1"/>
+              </a:fillRef>
+              <a:effectRef idx="0">
+                <a:schemeClr val="dk1"/>
+              </a:effectRef>
+              <a:fontRef idx="minor">
+                <a:schemeClr val="tx1"/>
+              </a:fontRef>
+            </p:style>
+          </p:cxnSp>
+          <p:cxnSp>
+            <p:nvCxnSpPr>
+              <p:cNvPr id="25" name="Straight Arrow Connector 24">
+                <a:extLst>
+                  <a:ext uri="{FF2B5EF4-FFF2-40B4-BE49-F238E27FC236}">
+                    <a16:creationId xmlns:a16="http://schemas.microsoft.com/office/drawing/2014/main" id="{F1217E2B-5D96-0AF5-9703-9BEE206277AA}"/>
+                  </a:ext>
+                </a:extLst>
+              </p:cNvPr>
+              <p:cNvCxnSpPr>
+                <a:cxnSpLocks/>
+              </p:cNvCxnSpPr>
+              <p:nvPr/>
+            </p:nvCxnSpPr>
+            <p:spPr>
+              <a:xfrm>
+                <a:off x="8411116" y="4013706"/>
+                <a:ext cx="2493431" cy="1494036"/>
+              </a:xfrm>
+              <a:prstGeom prst="straightConnector1">
+                <a:avLst/>
+              </a:prstGeom>
+              <a:ln w="57150">
+                <a:solidFill>
+                  <a:schemeClr val="accent1">
+                    <a:lumMod val="20000"/>
+                    <a:lumOff val="80000"/>
+                  </a:schemeClr>
+                </a:solidFill>
+                <a:tailEnd type="triangle"/>
+              </a:ln>
+            </p:spPr>
+            <p:style>
+              <a:lnRef idx="1">
+                <a:schemeClr val="dk1"/>
+              </a:lnRef>
+              <a:fillRef idx="0">
+                <a:schemeClr val="dk1"/>
+              </a:fillRef>
+              <a:effectRef idx="0">
+                <a:schemeClr val="dk1"/>
+              </a:effectRef>
+              <a:fontRef idx="minor">
+                <a:schemeClr val="tx1"/>
+              </a:fontRef>
+            </p:style>
+          </p:cxnSp>
+          <p:cxnSp>
+            <p:nvCxnSpPr>
+              <p:cNvPr id="33" name="Straight Arrow Connector 32">
+                <a:extLst>
+                  <a:ext uri="{FF2B5EF4-FFF2-40B4-BE49-F238E27FC236}">
+                    <a16:creationId xmlns:a16="http://schemas.microsoft.com/office/drawing/2014/main" id="{00C576D3-1BFB-B1BA-D829-99245DA86ED6}"/>
+                  </a:ext>
+                </a:extLst>
+              </p:cNvPr>
+              <p:cNvCxnSpPr>
+                <a:cxnSpLocks/>
+              </p:cNvCxnSpPr>
+              <p:nvPr/>
+            </p:nvCxnSpPr>
+            <p:spPr>
+              <a:xfrm>
+                <a:off x="8411117" y="4013706"/>
+                <a:ext cx="1253132" cy="1484441"/>
+              </a:xfrm>
+              <a:prstGeom prst="straightConnector1">
+                <a:avLst/>
+              </a:prstGeom>
+              <a:ln w="57150">
+                <a:solidFill>
+                  <a:schemeClr val="accent1">
+                    <a:lumMod val="20000"/>
+                    <a:lumOff val="80000"/>
+                  </a:schemeClr>
+                </a:solidFill>
+                <a:tailEnd type="triangle"/>
+              </a:ln>
+            </p:spPr>
+            <p:style>
+              <a:lnRef idx="1">
+                <a:schemeClr val="dk1"/>
+              </a:lnRef>
+              <a:fillRef idx="0">
+                <a:schemeClr val="dk1"/>
+              </a:fillRef>
+              <a:effectRef idx="0">
+                <a:schemeClr val="dk1"/>
+              </a:effectRef>
+              <a:fontRef idx="minor">
+                <a:schemeClr val="tx1"/>
+              </a:fontRef>
+            </p:style>
+          </p:cxnSp>
+        </p:grpSp>
+      </p:grpSp>
+      <p:pic>
+        <p:nvPicPr>
+          <p:cNvPr id="60" name="Graphic 59" descr="Checkmark with solid fill">
+            <a:extLst>
+              <a:ext uri="{FF2B5EF4-FFF2-40B4-BE49-F238E27FC236}">
+                <a16:creationId xmlns:a16="http://schemas.microsoft.com/office/drawing/2014/main" id="{CA76E2AF-D464-9D10-3E69-C0A1E0A16F97}"/>
+              </a:ext>
+            </a:extLst>
+          </p:cNvPr>
+          <p:cNvPicPr>
+            <a:picLocks noChangeAspect="1"/>
+          </p:cNvPicPr>
+          <p:nvPr/>
+        </p:nvPicPr>
+        <p:blipFill>
+          <a:blip r:embed="rId4">
+            <a:extLst>
+              <a:ext uri="{28A0092B-C50C-407E-A947-70E740481C1C}">
+                <a14:useLocalDpi xmlns:a14="http://schemas.microsoft.com/office/drawing/2010/main" val="0"/>
+              </a:ext>
+              <a:ext uri="{96DAC541-7B7A-43D3-8B79-37D633B846F1}">
+                <asvg:svgBlip xmlns:asvg="http://schemas.microsoft.com/office/drawing/2016/SVG/main" r:embed="rId5"/>
+              </a:ext>
+            </a:extLst>
+          </a:blip>
+          <a:stretch>
+            <a:fillRect/>
+          </a:stretch>
+        </p:blipFill>
         <p:spPr>
           <a:xfrm>
-            <a:off x="1019787" y="3617835"/>
-            <a:ext cx="8487770" cy="461665"/>
+            <a:off x="412817" y="4696104"/>
+            <a:ext cx="618501" cy="618501"/>
           </a:xfrm>
           <a:prstGeom prst="rect">
             <a:avLst/>
           </a:prstGeom>
-          <a:noFill/>
         </p:spPr>
-        <p:txBody>
-          <a:bodyPr wrap="square" rtlCol="0">
-            <a:spAutoFit/>
-          </a:bodyPr>
-          <a:lstStyle/>
-          <a:p>
-            <a:pPr algn="ctr"/>
-            <a:r>
-              <a:rPr lang="en-US" sz="2400" dirty="0"/>
-              <a:t>Element Types</a:t>
-            </a:r>
-          </a:p>
-        </p:txBody>
-      </p:sp>
-      <p:cxnSp>
-        <p:nvCxnSpPr>
-          <p:cNvPr id="5" name="Straight Connector 4">
+      </p:pic>
+      <p:pic>
+        <p:nvPicPr>
+          <p:cNvPr id="61" name="Graphic 60" descr="Checkmark with solid fill">
             <a:extLst>
               <a:ext uri="{FF2B5EF4-FFF2-40B4-BE49-F238E27FC236}">
-                <a16:creationId xmlns:a16="http://schemas.microsoft.com/office/drawing/2014/main" id="{BE9C8895-0342-E36B-C6A5-C6A48FF91FA1}"/>
+                <a16:creationId xmlns:a16="http://schemas.microsoft.com/office/drawing/2014/main" id="{06B06075-6565-B797-BFC9-A86544C230EE}"/>
               </a:ext>
             </a:extLst>
           </p:cNvPr>
-          <p:cNvCxnSpPr>
-            <a:cxnSpLocks/>
-          </p:cNvCxnSpPr>
+          <p:cNvPicPr>
+            <a:picLocks noChangeAspect="1"/>
+          </p:cNvPicPr>
           <p:nvPr/>
-        </p:nvCxnSpPr>
+        </p:nvPicPr>
+        <p:blipFill>
+          <a:blip r:embed="rId4">
+            <a:extLst>
+              <a:ext uri="{28A0092B-C50C-407E-A947-70E740481C1C}">
+                <a14:useLocalDpi xmlns:a14="http://schemas.microsoft.com/office/drawing/2010/main" val="0"/>
+              </a:ext>
+              <a:ext uri="{96DAC541-7B7A-43D3-8B79-37D633B846F1}">
+                <asvg:svgBlip xmlns:asvg="http://schemas.microsoft.com/office/drawing/2016/SVG/main" r:embed="rId5"/>
+              </a:ext>
+            </a:extLst>
+          </a:blip>
+          <a:stretch>
+            <a:fillRect/>
+          </a:stretch>
+        </p:blipFill>
         <p:spPr>
           <a:xfrm>
-            <a:off x="0" y="1828800"/>
-            <a:ext cx="12192000" cy="0"/>
-          </a:xfrm>
-          <a:prstGeom prst="line">
-            <a:avLst/>
-          </a:prstGeom>
-          <a:ln w="76200"/>
-        </p:spPr>
-        <p:style>
-          <a:lnRef idx="1">
-            <a:schemeClr val="accent2"/>
-          </a:lnRef>
-          <a:fillRef idx="0">
-            <a:schemeClr val="accent2"/>
-          </a:fillRef>
-          <a:effectRef idx="0">
-            <a:schemeClr val="accent2"/>
-          </a:effectRef>
-          <a:fontRef idx="minor">
-            <a:schemeClr val="tx1"/>
-          </a:fontRef>
-        </p:style>
-      </p:cxnSp>
-      <p:sp>
-        <p:nvSpPr>
-          <p:cNvPr id="12" name="Rectangle 11">
-            <a:extLst>
-              <a:ext uri="{FF2B5EF4-FFF2-40B4-BE49-F238E27FC236}">
-                <a16:creationId xmlns:a16="http://schemas.microsoft.com/office/drawing/2014/main" id="{EB68C161-23BC-7F84-28AF-A7FD8226E480}"/>
-              </a:ext>
-            </a:extLst>
-          </p:cNvPr>
-          <p:cNvSpPr/>
-          <p:nvPr/>
-        </p:nvSpPr>
-        <p:spPr>
-          <a:xfrm>
-            <a:off x="506863" y="2316170"/>
-            <a:ext cx="2122696" cy="707886"/>
+            <a:off x="1334984" y="4684650"/>
+            <a:ext cx="618501" cy="618501"/>
           </a:xfrm>
           <a:prstGeom prst="rect">
             <a:avLst/>
           </a:prstGeom>
-          <a:noFill/>
         </p:spPr>
-        <p:txBody>
-          <a:bodyPr wrap="none" lIns="91440" tIns="45720" rIns="91440" bIns="45720">
-            <a:spAutoFit/>
-          </a:bodyPr>
-          <a:lstStyle/>
-          <a:p>
-            <a:pPr algn="ctr"/>
-            <a:r>
-              <a:rPr lang="en-US" sz="4000" b="1" cap="none" spc="0" dirty="0">
-                <a:ln w="12700">
-                  <a:solidFill>
-                    <a:schemeClr val="accent3">
-                      <a:lumMod val="50000"/>
-                    </a:schemeClr>
-                  </a:solidFill>
-                  <a:prstDash val="solid"/>
-                </a:ln>
-                <a:solidFill>
-                  <a:srgbClr val="FFFF00"/>
-                </a:solidFill>
-                <a:effectLst>
-                  <a:innerShdw blurRad="177800">
-                    <a:schemeClr val="accent3">
-                      <a:lumMod val="50000"/>
-                    </a:schemeClr>
-                  </a:innerShdw>
-                </a:effectLst>
-              </a:rPr>
-              <a:t>Essences:</a:t>
-            </a:r>
-          </a:p>
-        </p:txBody>
-      </p:sp>
+      </p:pic>
+      <p:pic>
+        <p:nvPicPr>
+          <p:cNvPr id="62" name="Graphic 61" descr="Checkmark with solid fill">
+            <a:extLst>
+              <a:ext uri="{FF2B5EF4-FFF2-40B4-BE49-F238E27FC236}">
+                <a16:creationId xmlns:a16="http://schemas.microsoft.com/office/drawing/2014/main" id="{7B0FB71E-CEBB-F835-61A2-29F5A4BFA072}"/>
+              </a:ext>
+            </a:extLst>
+          </p:cNvPr>
+          <p:cNvPicPr>
+            <a:picLocks noChangeAspect="1"/>
+          </p:cNvPicPr>
+          <p:nvPr/>
+        </p:nvPicPr>
+        <p:blipFill>
+          <a:blip r:embed="rId4">
+            <a:extLst>
+              <a:ext uri="{28A0092B-C50C-407E-A947-70E740481C1C}">
+                <a14:useLocalDpi xmlns:a14="http://schemas.microsoft.com/office/drawing/2010/main" val="0"/>
+              </a:ext>
+              <a:ext uri="{96DAC541-7B7A-43D3-8B79-37D633B846F1}">
+                <asvg:svgBlip xmlns:asvg="http://schemas.microsoft.com/office/drawing/2016/SVG/main" r:embed="rId5"/>
+              </a:ext>
+            </a:extLst>
+          </a:blip>
+          <a:stretch>
+            <a:fillRect/>
+          </a:stretch>
+        </p:blipFill>
+        <p:spPr>
+          <a:xfrm>
+            <a:off x="2311000" y="4660417"/>
+            <a:ext cx="618501" cy="618501"/>
+          </a:xfrm>
+          <a:prstGeom prst="rect">
+            <a:avLst/>
+          </a:prstGeom>
+        </p:spPr>
+      </p:pic>
+      <p:pic>
+        <p:nvPicPr>
+          <p:cNvPr id="63" name="Graphic 62" descr="Checkmark with solid fill">
+            <a:extLst>
+              <a:ext uri="{FF2B5EF4-FFF2-40B4-BE49-F238E27FC236}">
+                <a16:creationId xmlns:a16="http://schemas.microsoft.com/office/drawing/2014/main" id="{0E936F4C-AF70-BD03-CF64-3ED8AB4585ED}"/>
+              </a:ext>
+            </a:extLst>
+          </p:cNvPr>
+          <p:cNvPicPr>
+            <a:picLocks noChangeAspect="1"/>
+          </p:cNvPicPr>
+          <p:nvPr/>
+        </p:nvPicPr>
+        <p:blipFill>
+          <a:blip r:embed="rId4">
+            <a:extLst>
+              <a:ext uri="{28A0092B-C50C-407E-A947-70E740481C1C}">
+                <a14:useLocalDpi xmlns:a14="http://schemas.microsoft.com/office/drawing/2010/main" val="0"/>
+              </a:ext>
+              <a:ext uri="{96DAC541-7B7A-43D3-8B79-37D633B846F1}">
+                <asvg:svgBlip xmlns:asvg="http://schemas.microsoft.com/office/drawing/2016/SVG/main" r:embed="rId5"/>
+              </a:ext>
+            </a:extLst>
+          </a:blip>
+          <a:stretch>
+            <a:fillRect/>
+          </a:stretch>
+        </p:blipFill>
+        <p:spPr>
+          <a:xfrm>
+            <a:off x="3201375" y="4618945"/>
+            <a:ext cx="618501" cy="618501"/>
+          </a:xfrm>
+          <a:prstGeom prst="rect">
+            <a:avLst/>
+          </a:prstGeom>
+        </p:spPr>
+      </p:pic>
+      <p:pic>
+        <p:nvPicPr>
+          <p:cNvPr id="64" name="Graphic 63" descr="Checkmark with solid fill">
+            <a:extLst>
+              <a:ext uri="{FF2B5EF4-FFF2-40B4-BE49-F238E27FC236}">
+                <a16:creationId xmlns:a16="http://schemas.microsoft.com/office/drawing/2014/main" id="{94280C95-3070-54A3-6070-3007302D49EC}"/>
+              </a:ext>
+            </a:extLst>
+          </p:cNvPr>
+          <p:cNvPicPr>
+            <a:picLocks noChangeAspect="1"/>
+          </p:cNvPicPr>
+          <p:nvPr/>
+        </p:nvPicPr>
+        <p:blipFill>
+          <a:blip r:embed="rId4">
+            <a:extLst>
+              <a:ext uri="{28A0092B-C50C-407E-A947-70E740481C1C}">
+                <a14:useLocalDpi xmlns:a14="http://schemas.microsoft.com/office/drawing/2010/main" val="0"/>
+              </a:ext>
+              <a:ext uri="{96DAC541-7B7A-43D3-8B79-37D633B846F1}">
+                <asvg:svgBlip xmlns:asvg="http://schemas.microsoft.com/office/drawing/2016/SVG/main" r:embed="rId5"/>
+              </a:ext>
+            </a:extLst>
+          </a:blip>
+          <a:stretch>
+            <a:fillRect/>
+          </a:stretch>
+        </p:blipFill>
+        <p:spPr>
+          <a:xfrm>
+            <a:off x="4077022" y="4618945"/>
+            <a:ext cx="618501" cy="618501"/>
+          </a:xfrm>
+          <a:prstGeom prst="rect">
+            <a:avLst/>
+          </a:prstGeom>
+        </p:spPr>
+      </p:pic>
     </p:spTree>
     <p:extLst>
       <p:ext uri="{BB962C8B-B14F-4D97-AF65-F5344CB8AC3E}">
@@ -4073,41 +4105,6 @@
       </p:grpSpPr>
       <p:sp>
         <p:nvSpPr>
-          <p:cNvPr id="3" name="Subtitle 2">
-            <a:extLst>
-              <a:ext uri="{FF2B5EF4-FFF2-40B4-BE49-F238E27FC236}">
-                <a16:creationId xmlns:a16="http://schemas.microsoft.com/office/drawing/2014/main" id="{D74453C7-A557-6E80-4428-14A7911EC4AD}"/>
-              </a:ext>
-            </a:extLst>
-          </p:cNvPr>
-          <p:cNvSpPr>
-            <a:spLocks noGrp="1"/>
-          </p:cNvSpPr>
-          <p:nvPr>
-            <p:ph type="subTitle" idx="1"/>
-          </p:nvPr>
-        </p:nvSpPr>
-        <p:spPr>
-          <a:xfrm>
-            <a:off x="726492" y="592294"/>
-            <a:ext cx="9276824" cy="646332"/>
-          </a:xfrm>
-        </p:spPr>
-        <p:txBody>
-          <a:bodyPr>
-            <a:normAutofit/>
-          </a:bodyPr>
-          <a:lstStyle/>
-          <a:p>
-            <a:r>
-              <a:rPr lang="en-US" sz="2800" dirty="0"/>
-              <a:t>Only the essences in the bottom row are available  to take</a:t>
-            </a:r>
-          </a:p>
-        </p:txBody>
-      </p:sp>
-      <p:sp>
-        <p:nvSpPr>
           <p:cNvPr id="6" name="TextBox 5">
             <a:extLst>
               <a:ext uri="{FF2B5EF4-FFF2-40B4-BE49-F238E27FC236}">
@@ -4120,8 +4117,8 @@
         </p:nvSpPr>
         <p:spPr>
           <a:xfrm>
-            <a:off x="1448097" y="2044005"/>
-            <a:ext cx="6372762" cy="1815882"/>
+            <a:off x="930861" y="1118908"/>
+            <a:ext cx="6372762" cy="3970318"/>
           </a:xfrm>
           <a:prstGeom prst="rect">
             <a:avLst/>
@@ -4140,7 +4137,17 @@
             </a:pPr>
             <a:r>
               <a:rPr lang="en-US" sz="2800" dirty="0"/>
-              <a:t>After taking an essence,  it will be replaced by the next one above it  in the same  column</a:t>
+              <a:t>Only tiles in the bottom row are available to be taken</a:t>
+            </a:r>
+          </a:p>
+          <a:p>
+            <a:pPr marL="285750" indent="-285750">
+              <a:buFont typeface="Arial" panose="020B0604020202020204" pitchFamily="34" charset="0"/>
+              <a:buChar char="•"/>
+            </a:pPr>
+            <a:r>
+              <a:rPr lang="en-US" sz="2800" dirty="0"/>
+              <a:t>After taking a tile from the bottom row,  it will be replaced by the next one above it  in the same  column</a:t>
             </a:r>
           </a:p>
           <a:p>
@@ -4150,6 +4157,23 @@
             </a:pPr>
             <a:endParaRPr lang="en-US" sz="2800" dirty="0"/>
           </a:p>
+          <a:p>
+            <a:pPr marL="285750" indent="-285750">
+              <a:buFont typeface="Arial" panose="020B0604020202020204" pitchFamily="34" charset="0"/>
+              <a:buChar char="•"/>
+            </a:pPr>
+            <a:r>
+              <a:rPr lang="en-US" sz="2800" dirty="0"/>
+              <a:t>Tiles taken from research must be placed into  one of your experiments or  storage</a:t>
+            </a:r>
+          </a:p>
+          <a:p>
+            <a:pPr marL="285750" indent="-285750">
+              <a:buFont typeface="Arial" panose="020B0604020202020204" pitchFamily="34" charset="0"/>
+              <a:buChar char="•"/>
+            </a:pPr>
+            <a:endParaRPr lang="en-US" sz="2800" dirty="0"/>
+          </a:p>
         </p:txBody>
       </p:sp>
       <p:sp>
@@ -4166,7 +4190,7 @@
         </p:nvSpPr>
         <p:spPr>
           <a:xfrm>
-            <a:off x="1563278" y="3641869"/>
+            <a:off x="1418582" y="5262038"/>
             <a:ext cx="6097836" cy="954107"/>
           </a:xfrm>
           <a:prstGeom prst="rect">
@@ -4186,7 +4210,7 @@
             </a:pPr>
             <a:r>
               <a:rPr lang="en-US" sz="2800" dirty="0"/>
-              <a:t>You can only take from research if all experiments are stable</a:t>
+              <a:t>You are locked from taking new tiles if any of your experiments are unstable</a:t>
             </a:r>
           </a:p>
         </p:txBody>
@@ -4222,7 +4246,7 @@
         </p:blipFill>
         <p:spPr>
           <a:xfrm>
-            <a:off x="555731" y="3824709"/>
+            <a:off x="484421" y="5262038"/>
             <a:ext cx="892366" cy="892366"/>
           </a:xfrm>
           <a:prstGeom prst="rect">
@@ -4230,51 +4254,6 @@
           </a:prstGeom>
         </p:spPr>
       </p:pic>
-      <p:sp>
-        <p:nvSpPr>
-          <p:cNvPr id="12" name="TextBox 11">
-            <a:extLst>
-              <a:ext uri="{FF2B5EF4-FFF2-40B4-BE49-F238E27FC236}">
-                <a16:creationId xmlns:a16="http://schemas.microsoft.com/office/drawing/2014/main" id="{2ED2F3DC-2927-B2E5-A1C7-EC2A5C5186AE}"/>
-              </a:ext>
-            </a:extLst>
-          </p:cNvPr>
-          <p:cNvSpPr txBox="1"/>
-          <p:nvPr/>
-        </p:nvSpPr>
-        <p:spPr>
-          <a:xfrm>
-            <a:off x="1673446" y="4926876"/>
-            <a:ext cx="6842591" cy="1384995"/>
-          </a:xfrm>
-          <a:prstGeom prst="rect">
-            <a:avLst/>
-          </a:prstGeom>
-          <a:noFill/>
-        </p:spPr>
-        <p:txBody>
-          <a:bodyPr wrap="square">
-            <a:spAutoFit/>
-          </a:bodyPr>
-          <a:lstStyle/>
-          <a:p>
-            <a:pPr marL="285750" indent="-285750">
-              <a:buFont typeface="Arial" panose="020B0604020202020204" pitchFamily="34" charset="0"/>
-              <a:buChar char="•"/>
-            </a:pPr>
-            <a:r>
-              <a:rPr lang="en-US" sz="2800" dirty="0"/>
-              <a:t>You can freely move essences between experiments </a:t>
-            </a:r>
-          </a:p>
-          <a:p>
-            <a:r>
-              <a:rPr lang="en-US" sz="2800" dirty="0"/>
-              <a:t>    </a:t>
-            </a:r>
-          </a:p>
-        </p:txBody>
-      </p:sp>
       <p:pic>
         <p:nvPicPr>
           <p:cNvPr id="5" name="Picture 4">
@@ -4305,6 +4284,97 @@
           </a:prstGeom>
         </p:spPr>
       </p:pic>
+      <p:sp>
+        <p:nvSpPr>
+          <p:cNvPr id="2" name="Rectangle 1">
+            <a:extLst>
+              <a:ext uri="{FF2B5EF4-FFF2-40B4-BE49-F238E27FC236}">
+                <a16:creationId xmlns:a16="http://schemas.microsoft.com/office/drawing/2014/main" id="{EEDBF032-E90C-89C5-9446-947F97842AD7}"/>
+              </a:ext>
+            </a:extLst>
+          </p:cNvPr>
+          <p:cNvSpPr/>
+          <p:nvPr/>
+        </p:nvSpPr>
+        <p:spPr>
+          <a:xfrm>
+            <a:off x="484421" y="39240"/>
+            <a:ext cx="2652073" cy="923330"/>
+          </a:xfrm>
+          <a:prstGeom prst="rect">
+            <a:avLst/>
+          </a:prstGeom>
+          <a:noFill/>
+        </p:spPr>
+        <p:txBody>
+          <a:bodyPr wrap="none" lIns="91440" tIns="45720" rIns="91440" bIns="45720">
+            <a:spAutoFit/>
+          </a:bodyPr>
+          <a:lstStyle/>
+          <a:p>
+            <a:pPr algn="ctr"/>
+            <a:r>
+              <a:rPr lang="en-US" sz="5400" b="1" dirty="0">
+                <a:ln w="12700">
+                  <a:solidFill>
+                    <a:schemeClr val="accent3">
+                      <a:lumMod val="50000"/>
+                    </a:schemeClr>
+                  </a:solidFill>
+                  <a:prstDash val="solid"/>
+                </a:ln>
+                <a:pattFill prst="narHorz">
+                  <a:fgClr>
+                    <a:schemeClr val="accent3"/>
+                  </a:fgClr>
+                  <a:bgClr>
+                    <a:schemeClr val="accent3">
+                      <a:lumMod val="40000"/>
+                      <a:lumOff val="60000"/>
+                    </a:schemeClr>
+                  </a:bgClr>
+                </a:pattFill>
+                <a:effectLst>
+                  <a:innerShdw blurRad="177800">
+                    <a:schemeClr val="accent3">
+                      <a:lumMod val="50000"/>
+                    </a:schemeClr>
+                  </a:innerShdw>
+                </a:effectLst>
+              </a:rPr>
+              <a:t>Research</a:t>
+            </a:r>
+            <a:endParaRPr lang="en-US" sz="5400" b="1" cap="none" spc="0" dirty="0">
+              <a:ln w="12700">
+                <a:solidFill>
+                  <a:schemeClr val="accent3">
+                    <a:lumMod val="50000"/>
+                  </a:schemeClr>
+                </a:solidFill>
+                <a:prstDash val="solid"/>
+              </a:ln>
+              <a:pattFill prst="narHorz">
+                <a:fgClr>
+                  <a:schemeClr val="accent3"/>
+                </a:fgClr>
+                <a:bgClr>
+                  <a:schemeClr val="accent3">
+                    <a:lumMod val="40000"/>
+                    <a:lumOff val="60000"/>
+                  </a:schemeClr>
+                </a:bgClr>
+              </a:pattFill>
+              <a:effectLst>
+                <a:innerShdw blurRad="177800">
+                  <a:schemeClr val="accent3">
+                    <a:lumMod val="50000"/>
+                  </a:schemeClr>
+                </a:innerShdw>
+              </a:effectLst>
+            </a:endParaRPr>
+          </a:p>
+        </p:txBody>
+      </p:sp>
     </p:spTree>
     <p:extLst>
       <p:ext uri="{BB962C8B-B14F-4D97-AF65-F5344CB8AC3E}">
@@ -4337,20 +4407,281 @@
       </p:grpSpPr>
       <p:sp>
         <p:nvSpPr>
-          <p:cNvPr id="6" name="TextBox 5">
+          <p:cNvPr id="7" name="Subtitle 2">
             <a:extLst>
               <a:ext uri="{FF2B5EF4-FFF2-40B4-BE49-F238E27FC236}">
-                <a16:creationId xmlns:a16="http://schemas.microsoft.com/office/drawing/2014/main" id="{F5D13BBC-3AAE-1FE0-C9A7-74F23D4FAC05}"/>
+                <a16:creationId xmlns:a16="http://schemas.microsoft.com/office/drawing/2014/main" id="{9FC0D787-C3BB-EB97-C9FF-BC8D1D93F348}"/>
               </a:ext>
             </a:extLst>
           </p:cNvPr>
-          <p:cNvSpPr txBox="1"/>
+          <p:cNvSpPr txBox="1">
+            <a:spLocks/>
+          </p:cNvSpPr>
           <p:nvPr/>
         </p:nvSpPr>
         <p:spPr>
           <a:xfrm>
-            <a:off x="1287136" y="120318"/>
-            <a:ext cx="7855027" cy="523220"/>
+            <a:off x="478110" y="1125188"/>
+            <a:ext cx="10106985" cy="4371049"/>
+          </a:xfrm>
+          <a:prstGeom prst="rect">
+            <a:avLst/>
+          </a:prstGeom>
+        </p:spPr>
+        <p:txBody>
+          <a:bodyPr vert="horz" lIns="91440" tIns="45720" rIns="91440" bIns="45720" rtlCol="0">
+            <a:normAutofit/>
+          </a:bodyPr>
+          <a:lstStyle>
+            <a:lvl1pPr marL="0" indent="0" algn="l" defTabSz="914400" rtl="0" eaLnBrk="1" latinLnBrk="0" hangingPunct="1">
+              <a:lnSpc>
+                <a:spcPct val="85000"/>
+              </a:lnSpc>
+              <a:spcBef>
+                <a:spcPts val="1300"/>
+              </a:spcBef>
+              <a:buFont typeface="Arial" pitchFamily="34" charset="0"/>
+              <a:buNone/>
+              <a:defRPr sz="3200" kern="1200">
+                <a:solidFill>
+                  <a:schemeClr val="tx1"/>
+                </a:solidFill>
+                <a:latin typeface="+mj-lt"/>
+                <a:ea typeface="+mn-ea"/>
+                <a:cs typeface="+mn-cs"/>
+              </a:defRPr>
+            </a:lvl1pPr>
+            <a:lvl2pPr marL="457200" indent="0" algn="ctr" defTabSz="914400" rtl="0" eaLnBrk="1" latinLnBrk="0" hangingPunct="1">
+              <a:lnSpc>
+                <a:spcPct val="85000"/>
+              </a:lnSpc>
+              <a:spcBef>
+                <a:spcPts val="600"/>
+              </a:spcBef>
+              <a:buFont typeface="Arial" pitchFamily="34" charset="0"/>
+              <a:buNone/>
+              <a:defRPr sz="2800" kern="1200">
+                <a:solidFill>
+                  <a:schemeClr val="tx1">
+                    <a:lumMod val="75000"/>
+                    <a:lumOff val="25000"/>
+                  </a:schemeClr>
+                </a:solidFill>
+                <a:latin typeface="+mn-lt"/>
+                <a:ea typeface="+mn-ea"/>
+                <a:cs typeface="+mn-cs"/>
+              </a:defRPr>
+            </a:lvl2pPr>
+            <a:lvl3pPr marL="914400" indent="0" algn="ctr" defTabSz="914400" rtl="0" eaLnBrk="1" latinLnBrk="0" hangingPunct="1">
+              <a:lnSpc>
+                <a:spcPct val="85000"/>
+              </a:lnSpc>
+              <a:spcBef>
+                <a:spcPts val="600"/>
+              </a:spcBef>
+              <a:buFont typeface="Arial" pitchFamily="34" charset="0"/>
+              <a:buNone/>
+              <a:defRPr sz="2400" i="1" kern="1200">
+                <a:solidFill>
+                  <a:schemeClr val="tx1">
+                    <a:lumMod val="65000"/>
+                    <a:lumOff val="35000"/>
+                  </a:schemeClr>
+                </a:solidFill>
+                <a:latin typeface="+mn-lt"/>
+                <a:ea typeface="+mn-ea"/>
+                <a:cs typeface="+mn-cs"/>
+              </a:defRPr>
+            </a:lvl3pPr>
+            <a:lvl4pPr marL="1371600" indent="0" algn="ctr" defTabSz="914400" rtl="0" eaLnBrk="1" latinLnBrk="0" hangingPunct="1">
+              <a:lnSpc>
+                <a:spcPct val="85000"/>
+              </a:lnSpc>
+              <a:spcBef>
+                <a:spcPts val="600"/>
+              </a:spcBef>
+              <a:buFont typeface="Arial" pitchFamily="34" charset="0"/>
+              <a:buNone/>
+              <a:defRPr sz="2000" kern="1200">
+                <a:solidFill>
+                  <a:schemeClr val="tx1">
+                    <a:lumMod val="65000"/>
+                    <a:lumOff val="35000"/>
+                  </a:schemeClr>
+                </a:solidFill>
+                <a:latin typeface="+mn-lt"/>
+                <a:ea typeface="+mn-ea"/>
+                <a:cs typeface="+mn-cs"/>
+              </a:defRPr>
+            </a:lvl4pPr>
+            <a:lvl5pPr marL="1828800" indent="0" algn="ctr" defTabSz="914400" rtl="0" eaLnBrk="1" latinLnBrk="0" hangingPunct="1">
+              <a:lnSpc>
+                <a:spcPct val="85000"/>
+              </a:lnSpc>
+              <a:spcBef>
+                <a:spcPts val="600"/>
+              </a:spcBef>
+              <a:buFont typeface="Arial" pitchFamily="34" charset="0"/>
+              <a:buNone/>
+              <a:defRPr sz="2000" kern="1200">
+                <a:solidFill>
+                  <a:schemeClr val="tx1">
+                    <a:lumMod val="65000"/>
+                    <a:lumOff val="35000"/>
+                  </a:schemeClr>
+                </a:solidFill>
+                <a:latin typeface="+mn-lt"/>
+                <a:ea typeface="+mn-ea"/>
+                <a:cs typeface="+mn-cs"/>
+              </a:defRPr>
+            </a:lvl5pPr>
+            <a:lvl6pPr marL="2286000" indent="0" algn="ctr" defTabSz="914400" rtl="0" eaLnBrk="1" latinLnBrk="0" hangingPunct="1">
+              <a:lnSpc>
+                <a:spcPct val="85000"/>
+              </a:lnSpc>
+              <a:spcBef>
+                <a:spcPts val="600"/>
+              </a:spcBef>
+              <a:buFont typeface="Arial" pitchFamily="34" charset="0"/>
+              <a:buNone/>
+              <a:defRPr sz="2000" kern="1200">
+                <a:solidFill>
+                  <a:schemeClr val="tx1">
+                    <a:lumMod val="65000"/>
+                    <a:lumOff val="35000"/>
+                  </a:schemeClr>
+                </a:solidFill>
+                <a:latin typeface="+mn-lt"/>
+                <a:ea typeface="+mn-ea"/>
+                <a:cs typeface="+mn-cs"/>
+              </a:defRPr>
+            </a:lvl6pPr>
+            <a:lvl7pPr marL="2743200" indent="0" algn="ctr" defTabSz="914400" rtl="0" eaLnBrk="1" latinLnBrk="0" hangingPunct="1">
+              <a:lnSpc>
+                <a:spcPct val="85000"/>
+              </a:lnSpc>
+              <a:spcBef>
+                <a:spcPts val="600"/>
+              </a:spcBef>
+              <a:buFont typeface="Arial" pitchFamily="34" charset="0"/>
+              <a:buNone/>
+              <a:defRPr sz="2000" kern="1200">
+                <a:solidFill>
+                  <a:schemeClr val="tx1">
+                    <a:lumMod val="65000"/>
+                    <a:lumOff val="35000"/>
+                  </a:schemeClr>
+                </a:solidFill>
+                <a:latin typeface="+mn-lt"/>
+                <a:ea typeface="+mn-ea"/>
+                <a:cs typeface="+mn-cs"/>
+              </a:defRPr>
+            </a:lvl7pPr>
+            <a:lvl8pPr marL="3200400" indent="0" algn="ctr" defTabSz="914400" rtl="0" eaLnBrk="1" latinLnBrk="0" hangingPunct="1">
+              <a:lnSpc>
+                <a:spcPct val="85000"/>
+              </a:lnSpc>
+              <a:spcBef>
+                <a:spcPts val="600"/>
+              </a:spcBef>
+              <a:buFont typeface="Arial" pitchFamily="34" charset="0"/>
+              <a:buNone/>
+              <a:defRPr sz="2000" kern="1200">
+                <a:solidFill>
+                  <a:schemeClr val="tx1">
+                    <a:lumMod val="65000"/>
+                    <a:lumOff val="35000"/>
+                  </a:schemeClr>
+                </a:solidFill>
+                <a:latin typeface="+mn-lt"/>
+                <a:ea typeface="+mn-ea"/>
+                <a:cs typeface="+mn-cs"/>
+              </a:defRPr>
+            </a:lvl8pPr>
+            <a:lvl9pPr marL="3657600" indent="0" algn="ctr" defTabSz="914400" rtl="0" eaLnBrk="1" latinLnBrk="0" hangingPunct="1">
+              <a:lnSpc>
+                <a:spcPct val="85000"/>
+              </a:lnSpc>
+              <a:spcBef>
+                <a:spcPts val="600"/>
+              </a:spcBef>
+              <a:buFont typeface="Arial" pitchFamily="34" charset="0"/>
+              <a:buNone/>
+              <a:defRPr sz="2000" kern="1200">
+                <a:solidFill>
+                  <a:schemeClr val="tx1">
+                    <a:lumMod val="65000"/>
+                    <a:lumOff val="35000"/>
+                  </a:schemeClr>
+                </a:solidFill>
+                <a:latin typeface="+mn-lt"/>
+                <a:ea typeface="+mn-ea"/>
+                <a:cs typeface="+mn-cs"/>
+              </a:defRPr>
+            </a:lvl9pPr>
+          </a:lstStyle>
+          <a:p>
+            <a:endParaRPr lang="en-US"/>
+          </a:p>
+          <a:p>
+            <a:pPr marL="457200" indent="-457200">
+              <a:buFont typeface="Arial" panose="020B0604020202020204" pitchFamily="34" charset="0"/>
+              <a:buChar char="•"/>
+            </a:pPr>
+            <a:r>
+              <a:rPr lang="en-US"/>
+              <a:t>Tiles can be freely placed into  or out of storage.</a:t>
+            </a:r>
+          </a:p>
+          <a:p>
+            <a:pPr marL="457200" indent="-457200">
+              <a:buFont typeface="Arial" panose="020B0604020202020204" pitchFamily="34" charset="0"/>
+              <a:buChar char="•"/>
+            </a:pPr>
+            <a:r>
+              <a:rPr lang="en-US"/>
+              <a:t>Storage is never subject to alchemic laws</a:t>
+            </a:r>
+          </a:p>
+          <a:p>
+            <a:pPr marL="457200" indent="-457200">
+              <a:buFont typeface="Arial" panose="020B0604020202020204" pitchFamily="34" charset="0"/>
+              <a:buChar char="•"/>
+            </a:pPr>
+            <a:r>
+              <a:rPr lang="en-US"/>
+              <a:t>Storage has a capacity of 8</a:t>
+            </a:r>
+          </a:p>
+          <a:p>
+            <a:pPr marL="457200" indent="-457200">
+              <a:buFont typeface="Arial" panose="020B0604020202020204" pitchFamily="34" charset="0"/>
+              <a:buChar char="•"/>
+            </a:pPr>
+            <a:r>
+              <a:rPr lang="en-US"/>
+              <a:t>Storage starts with 2 random tiles</a:t>
+            </a:r>
+            <a:endParaRPr lang="en-US" dirty="0"/>
+          </a:p>
+        </p:txBody>
+      </p:sp>
+      <p:sp>
+        <p:nvSpPr>
+          <p:cNvPr id="4" name="Rectangle 3">
+            <a:extLst>
+              <a:ext uri="{FF2B5EF4-FFF2-40B4-BE49-F238E27FC236}">
+                <a16:creationId xmlns:a16="http://schemas.microsoft.com/office/drawing/2014/main" id="{E2369CB6-C899-ECEE-7629-78643EDC8962}"/>
+              </a:ext>
+            </a:extLst>
+          </p:cNvPr>
+          <p:cNvSpPr/>
+          <p:nvPr/>
+        </p:nvSpPr>
+        <p:spPr>
+          <a:xfrm>
+            <a:off x="1677679" y="0"/>
+            <a:ext cx="2252861" cy="923330"/>
           </a:xfrm>
           <a:prstGeom prst="rect">
             <a:avLst/>
@@ -4358,22 +4689,114 @@
           <a:noFill/>
         </p:spPr>
         <p:txBody>
-          <a:bodyPr wrap="square" rtlCol="0">
+          <a:bodyPr wrap="none" lIns="91440" tIns="45720" rIns="91440" bIns="45720">
             <a:spAutoFit/>
           </a:bodyPr>
           <a:lstStyle/>
           <a:p>
-            <a:r>
-              <a:rPr lang="en-US" sz="2800" dirty="0"/>
-              <a:t>All active experiments are subject to </a:t>
-            </a:r>
-            <a:r>
-              <a:rPr lang="en-US" sz="2800" i="1" dirty="0"/>
-              <a:t>alchemical laws</a:t>
-            </a:r>
-          </a:p>
-        </p:txBody>
-      </p:sp>
+            <a:pPr algn="ctr"/>
+            <a:r>
+              <a:rPr lang="en-US" sz="5400" b="1" cap="none" spc="0">
+                <a:ln w="9525">
+                  <a:solidFill>
+                    <a:schemeClr val="bg1"/>
+                  </a:solidFill>
+                  <a:prstDash val="solid"/>
+                </a:ln>
+                <a:solidFill>
+                  <a:schemeClr val="tx1"/>
+                </a:solidFill>
+                <a:effectLst>
+                  <a:outerShdw blurRad="12700" dist="38100" dir="2700000" algn="tl" rotWithShape="0">
+                    <a:schemeClr val="bg1">
+                      <a:lumMod val="50000"/>
+                    </a:schemeClr>
+                  </a:outerShdw>
+                </a:effectLst>
+              </a:rPr>
+              <a:t>Storage</a:t>
+            </a:r>
+            <a:endParaRPr lang="en-US" sz="5400" b="1" cap="none" spc="0" dirty="0">
+              <a:ln w="9525">
+                <a:solidFill>
+                  <a:schemeClr val="bg1"/>
+                </a:solidFill>
+                <a:prstDash val="solid"/>
+              </a:ln>
+              <a:solidFill>
+                <a:schemeClr val="tx1"/>
+              </a:solidFill>
+              <a:effectLst>
+                <a:outerShdw blurRad="12700" dist="38100" dir="2700000" algn="tl" rotWithShape="0">
+                  <a:schemeClr val="bg1">
+                    <a:lumMod val="50000"/>
+                  </a:schemeClr>
+                </a:outerShdw>
+              </a:effectLst>
+            </a:endParaRPr>
+          </a:p>
+        </p:txBody>
+      </p:sp>
+      <p:pic>
+        <p:nvPicPr>
+          <p:cNvPr id="6" name="Picture 5" descr="A screenshot of a computer&#10;&#10;Description automatically generated">
+            <a:extLst>
+              <a:ext uri="{FF2B5EF4-FFF2-40B4-BE49-F238E27FC236}">
+                <a16:creationId xmlns:a16="http://schemas.microsoft.com/office/drawing/2014/main" id="{770685E4-9BB4-C067-6CF0-536D1E4CB02C}"/>
+              </a:ext>
+            </a:extLst>
+          </p:cNvPr>
+          <p:cNvPicPr>
+            <a:picLocks noChangeAspect="1"/>
+          </p:cNvPicPr>
+          <p:nvPr/>
+        </p:nvPicPr>
+        <p:blipFill>
+          <a:blip r:embed="rId2"/>
+          <a:stretch>
+            <a:fillRect/>
+          </a:stretch>
+        </p:blipFill>
+        <p:spPr>
+          <a:xfrm>
+            <a:off x="7327862" y="3657601"/>
+            <a:ext cx="4386028" cy="2914938"/>
+          </a:xfrm>
+          <a:prstGeom prst="rect">
+            <a:avLst/>
+          </a:prstGeom>
+        </p:spPr>
+      </p:pic>
+    </p:spTree>
+    <p:extLst>
+      <p:ext uri="{BB962C8B-B14F-4D97-AF65-F5344CB8AC3E}">
+        <p14:creationId xmlns:p14="http://schemas.microsoft.com/office/powerpoint/2010/main" val="4257053615"/>
+      </p:ext>
+    </p:extLst>
+  </p:cSld>
+  <p:clrMapOvr>
+    <a:masterClrMapping/>
+  </p:clrMapOvr>
+</p:sld>
+</file>
+
+<file path=ppt/slides/slide4.xml><?xml version="1.0" encoding="utf-8"?>
+<p:sld xmlns:a="http://schemas.openxmlformats.org/drawingml/2006/main" xmlns:r="http://schemas.openxmlformats.org/officeDocument/2006/relationships" xmlns:p="http://schemas.openxmlformats.org/presentationml/2006/main">
+  <p:cSld>
+    <p:spTree>
+      <p:nvGrpSpPr>
+        <p:cNvPr id="1" name=""/>
+        <p:cNvGrpSpPr/>
+        <p:nvPr/>
+      </p:nvGrpSpPr>
+      <p:grpSpPr>
+        <a:xfrm>
+          <a:off x="0" y="0"/>
+          <a:ext cx="0" cy="0"/>
+          <a:chOff x="0" y="0"/>
+          <a:chExt cx="0" cy="0"/>
+        </a:xfrm>
+      </p:grpSpPr>
       <p:sp>
         <p:nvSpPr>
           <p:cNvPr id="7" name="TextBox 6">
@@ -4388,8 +4811,8 @@
         </p:nvSpPr>
         <p:spPr>
           <a:xfrm>
-            <a:off x="1022148" y="715113"/>
-            <a:ext cx="9038671" cy="1631216"/>
+            <a:off x="749675" y="2100568"/>
+            <a:ext cx="9391852" cy="4093428"/>
           </a:xfrm>
           <a:prstGeom prst="rect">
             <a:avLst/>
@@ -4408,7 +4831,7 @@
             </a:pPr>
             <a:r>
               <a:rPr lang="en-US" sz="2000" dirty="0"/>
-              <a:t>Experiments are only active if they have at least 3 essences in them</a:t>
+              <a:t>Experiments are inactive when they have less than 3 tiles</a:t>
             </a:r>
           </a:p>
           <a:p>
@@ -4418,21 +4841,7 @@
             </a:pPr>
             <a:r>
               <a:rPr lang="en-US" sz="2000" dirty="0"/>
-              <a:t>Inactive experiments are automatically considered stable</a:t>
-            </a:r>
-          </a:p>
-          <a:p>
-            <a:pPr marL="285750" indent="-285750">
-              <a:buFont typeface="Arial" panose="020B0604020202020204" pitchFamily="34" charset="0"/>
-              <a:buChar char="•"/>
-            </a:pPr>
-            <a:r>
-              <a:rPr lang="en-US" sz="2000" dirty="0"/>
-              <a:t>Active experiments are stable only if they do not violate any </a:t>
-            </a:r>
-            <a:r>
-              <a:rPr lang="en-US" sz="2000" i="1" dirty="0"/>
-              <a:t>alchemical laws</a:t>
+              <a:t>Inactive experiments are automatically stable</a:t>
             </a:r>
           </a:p>
           <a:p>
@@ -4447,6 +4856,53 @@
               <a:buFont typeface="Arial" panose="020B0604020202020204" pitchFamily="34" charset="0"/>
               <a:buChar char="•"/>
             </a:pPr>
+            <a:endParaRPr lang="en-US" sz="2000" dirty="0"/>
+          </a:p>
+          <a:p>
+            <a:pPr marL="285750" indent="-285750">
+              <a:buFont typeface="Arial" panose="020B0604020202020204" pitchFamily="34" charset="0"/>
+              <a:buChar char="•"/>
+            </a:pPr>
+            <a:endParaRPr lang="en-US" sz="2000" dirty="0"/>
+          </a:p>
+          <a:p>
+            <a:pPr marL="285750" indent="-285750">
+              <a:buFont typeface="Arial" panose="020B0604020202020204" pitchFamily="34" charset="0"/>
+              <a:buChar char="•"/>
+            </a:pPr>
+            <a:endParaRPr lang="en-US" sz="2000" dirty="0"/>
+          </a:p>
+          <a:p>
+            <a:pPr marL="285750" indent="-285750">
+              <a:buFont typeface="Arial" panose="020B0604020202020204" pitchFamily="34" charset="0"/>
+              <a:buChar char="•"/>
+            </a:pPr>
+            <a:r>
+              <a:rPr lang="en-US" sz="2000" dirty="0"/>
+              <a:t>Active experiments are stable only if they do not violate any </a:t>
+            </a:r>
+            <a:r>
+              <a:rPr lang="en-US" sz="2000" i="1" dirty="0"/>
+              <a:t>alchemical laws.  </a:t>
+            </a:r>
+            <a:r>
+              <a:rPr lang="en-US" sz="2000" dirty="0"/>
+              <a:t>If it breaks any laws, it is unstable (blocking  victory and taking new tiles from research)</a:t>
+            </a:r>
+            <a:endParaRPr lang="en-US" sz="2000" i="1" dirty="0"/>
+          </a:p>
+          <a:p>
+            <a:pPr marL="285750" indent="-285750">
+              <a:buFont typeface="Arial" panose="020B0604020202020204" pitchFamily="34" charset="0"/>
+              <a:buChar char="•"/>
+            </a:pPr>
+            <a:endParaRPr lang="en-US" sz="2000" dirty="0"/>
+          </a:p>
+          <a:p>
+            <a:pPr marL="285750" indent="-285750">
+              <a:buFont typeface="Arial" panose="020B0604020202020204" pitchFamily="34" charset="0"/>
+              <a:buChar char="•"/>
+            </a:pPr>
             <a:r>
               <a:rPr lang="en-US" sz="2000" dirty="0"/>
               <a:t>The laws of Alchemy apply </a:t>
@@ -4457,7 +4913,731 @@
             </a:r>
             <a:r>
               <a:rPr lang="en-US" sz="2000" dirty="0"/>
-              <a:t> to both  elements and letters</a:t>
+              <a:t> to both  the shapes and letters in an experiment</a:t>
+            </a:r>
+          </a:p>
+          <a:p>
+            <a:pPr marL="285750" indent="-285750">
+              <a:buFont typeface="Arial" panose="020B0604020202020204" pitchFamily="34" charset="0"/>
+              <a:buChar char="•"/>
+            </a:pPr>
+            <a:endParaRPr lang="en-US" sz="2000" dirty="0"/>
+          </a:p>
+          <a:p>
+            <a:pPr marL="285750" indent="-285750">
+              <a:buFont typeface="Arial" panose="020B0604020202020204" pitchFamily="34" charset="0"/>
+              <a:buChar char="•"/>
+            </a:pPr>
+            <a:r>
+              <a:rPr lang="en-US" sz="2000" dirty="0"/>
+              <a:t>Each experiment is a separate set that does not contribute to the shape and letter counts relevant to other experiments</a:t>
+            </a:r>
+          </a:p>
+        </p:txBody>
+      </p:sp>
+      <p:sp>
+        <p:nvSpPr>
+          <p:cNvPr id="6" name="TextBox 5">
+            <a:extLst>
+              <a:ext uri="{FF2B5EF4-FFF2-40B4-BE49-F238E27FC236}">
+                <a16:creationId xmlns:a16="http://schemas.microsoft.com/office/drawing/2014/main" id="{F5D13BBC-3AAE-1FE0-C9A7-74F23D4FAC05}"/>
+              </a:ext>
+            </a:extLst>
+          </p:cNvPr>
+          <p:cNvSpPr txBox="1"/>
+          <p:nvPr/>
+        </p:nvSpPr>
+        <p:spPr>
+          <a:xfrm>
+            <a:off x="873750" y="3424007"/>
+            <a:ext cx="7855027" cy="523220"/>
+          </a:xfrm>
+          <a:prstGeom prst="rect">
+            <a:avLst/>
+          </a:prstGeom>
+          <a:noFill/>
+        </p:spPr>
+        <p:txBody>
+          <a:bodyPr wrap="square" rtlCol="0">
+            <a:spAutoFit/>
+          </a:bodyPr>
+          <a:lstStyle/>
+          <a:p>
+            <a:r>
+              <a:rPr lang="en-US" sz="2800" dirty="0"/>
+              <a:t>All active experiments are subject to </a:t>
+            </a:r>
+            <a:r>
+              <a:rPr lang="en-US" sz="2800" i="1" dirty="0"/>
+              <a:t>alchemical laws</a:t>
+            </a:r>
+          </a:p>
+        </p:txBody>
+      </p:sp>
+      <p:sp>
+        <p:nvSpPr>
+          <p:cNvPr id="3" name="Rectangle 2">
+            <a:extLst>
+              <a:ext uri="{FF2B5EF4-FFF2-40B4-BE49-F238E27FC236}">
+                <a16:creationId xmlns:a16="http://schemas.microsoft.com/office/drawing/2014/main" id="{94CD569D-F779-2C9F-B6EB-52CA4C51A35D}"/>
+              </a:ext>
+            </a:extLst>
+          </p:cNvPr>
+          <p:cNvSpPr/>
+          <p:nvPr/>
+        </p:nvSpPr>
+        <p:spPr>
+          <a:xfrm>
+            <a:off x="0" y="-9236"/>
+            <a:ext cx="3576300" cy="923330"/>
+          </a:xfrm>
+          <a:prstGeom prst="rect">
+            <a:avLst/>
+          </a:prstGeom>
+          <a:noFill/>
+        </p:spPr>
+        <p:txBody>
+          <a:bodyPr wrap="none" lIns="91440" tIns="45720" rIns="91440" bIns="45720">
+            <a:spAutoFit/>
+          </a:bodyPr>
+          <a:lstStyle/>
+          <a:p>
+            <a:pPr algn="ctr"/>
+            <a:r>
+              <a:rPr lang="en-US" sz="5400" b="1" dirty="0">
+                <a:ln w="12700">
+                  <a:solidFill>
+                    <a:schemeClr val="accent3">
+                      <a:lumMod val="50000"/>
+                    </a:schemeClr>
+                  </a:solidFill>
+                  <a:prstDash val="solid"/>
+                </a:ln>
+                <a:pattFill prst="narHorz">
+                  <a:fgClr>
+                    <a:schemeClr val="accent3"/>
+                  </a:fgClr>
+                  <a:bgClr>
+                    <a:schemeClr val="accent3">
+                      <a:lumMod val="40000"/>
+                      <a:lumOff val="60000"/>
+                    </a:schemeClr>
+                  </a:bgClr>
+                </a:pattFill>
+                <a:effectLst>
+                  <a:innerShdw blurRad="177800">
+                    <a:schemeClr val="accent3">
+                      <a:lumMod val="50000"/>
+                    </a:schemeClr>
+                  </a:innerShdw>
+                </a:effectLst>
+              </a:rPr>
+              <a:t>Experiments</a:t>
+            </a:r>
+            <a:endParaRPr lang="en-US" sz="5400" b="1" cap="none" spc="0" dirty="0">
+              <a:ln w="12700">
+                <a:solidFill>
+                  <a:schemeClr val="accent3">
+                    <a:lumMod val="50000"/>
+                  </a:schemeClr>
+                </a:solidFill>
+                <a:prstDash val="solid"/>
+              </a:ln>
+              <a:pattFill prst="narHorz">
+                <a:fgClr>
+                  <a:schemeClr val="accent3"/>
+                </a:fgClr>
+                <a:bgClr>
+                  <a:schemeClr val="accent3">
+                    <a:lumMod val="40000"/>
+                    <a:lumOff val="60000"/>
+                  </a:schemeClr>
+                </a:bgClr>
+              </a:pattFill>
+              <a:effectLst>
+                <a:innerShdw blurRad="177800">
+                  <a:schemeClr val="accent3">
+                    <a:lumMod val="50000"/>
+                  </a:schemeClr>
+                </a:innerShdw>
+              </a:effectLst>
+            </a:endParaRPr>
+          </a:p>
+        </p:txBody>
+      </p:sp>
+      <p:sp>
+        <p:nvSpPr>
+          <p:cNvPr id="4" name="TextBox 3">
+            <a:extLst>
+              <a:ext uri="{FF2B5EF4-FFF2-40B4-BE49-F238E27FC236}">
+                <a16:creationId xmlns:a16="http://schemas.microsoft.com/office/drawing/2014/main" id="{C4BC0DB8-9977-8635-0326-BC92733F5ADE}"/>
+              </a:ext>
+            </a:extLst>
+          </p:cNvPr>
+          <p:cNvSpPr txBox="1"/>
+          <p:nvPr/>
+        </p:nvSpPr>
+        <p:spPr>
+          <a:xfrm>
+            <a:off x="749675" y="928423"/>
+            <a:ext cx="9038671" cy="707886"/>
+          </a:xfrm>
+          <a:prstGeom prst="rect">
+            <a:avLst/>
+          </a:prstGeom>
+          <a:noFill/>
+        </p:spPr>
+        <p:txBody>
+          <a:bodyPr wrap="square" rtlCol="0">
+            <a:spAutoFit/>
+          </a:bodyPr>
+          <a:lstStyle/>
+          <a:p>
+            <a:pPr marL="285750" indent="-285750">
+              <a:buFont typeface="Arial" panose="020B0604020202020204" pitchFamily="34" charset="0"/>
+              <a:buChar char="•"/>
+            </a:pPr>
+            <a:r>
+              <a:rPr lang="en-US" sz="2000" dirty="0"/>
+              <a:t>You have 5 experiments that can each hold any number of tiles</a:t>
+            </a:r>
+          </a:p>
+          <a:p>
+            <a:pPr marL="285750" indent="-285750">
+              <a:buFont typeface="Arial" panose="020B0604020202020204" pitchFamily="34" charset="0"/>
+              <a:buChar char="•"/>
+            </a:pPr>
+            <a:r>
+              <a:rPr lang="en-US" sz="2000" dirty="0"/>
+              <a:t>Tiles can be moved between experiments freely</a:t>
+            </a:r>
+          </a:p>
+        </p:txBody>
+      </p:sp>
+      <p:sp>
+        <p:nvSpPr>
+          <p:cNvPr id="5" name="TextBox 4">
+            <a:extLst>
+              <a:ext uri="{FF2B5EF4-FFF2-40B4-BE49-F238E27FC236}">
+                <a16:creationId xmlns:a16="http://schemas.microsoft.com/office/drawing/2014/main" id="{DD85E6DD-C16E-B905-6FF7-C06EADF4B8FE}"/>
+              </a:ext>
+            </a:extLst>
+          </p:cNvPr>
+          <p:cNvSpPr txBox="1"/>
+          <p:nvPr/>
+        </p:nvSpPr>
+        <p:spPr>
+          <a:xfrm>
+            <a:off x="342659" y="2900787"/>
+            <a:ext cx="9300105" cy="523220"/>
+          </a:xfrm>
+          <a:prstGeom prst="rect">
+            <a:avLst/>
+          </a:prstGeom>
+          <a:noFill/>
+        </p:spPr>
+        <p:txBody>
+          <a:bodyPr wrap="square" rtlCol="0">
+            <a:spAutoFit/>
+          </a:bodyPr>
+          <a:lstStyle/>
+          <a:p>
+            <a:r>
+              <a:rPr lang="en-US" sz="2800" dirty="0"/>
+              <a:t>When an experiment has at least 3 tiles, it becomes active:</a:t>
+            </a:r>
+          </a:p>
+        </p:txBody>
+      </p:sp>
+    </p:spTree>
+    <p:extLst>
+      <p:ext uri="{BB962C8B-B14F-4D97-AF65-F5344CB8AC3E}">
+        <p14:creationId xmlns:p14="http://schemas.microsoft.com/office/powerpoint/2010/main" val="633554770"/>
+      </p:ext>
+    </p:extLst>
+  </p:cSld>
+  <p:clrMapOvr>
+    <a:masterClrMapping/>
+  </p:clrMapOvr>
+</p:sld>
+</file>
+
+<file path=ppt/slides/slide5.xml><?xml version="1.0" encoding="utf-8"?>
+<p:sld xmlns:a="http://schemas.openxmlformats.org/drawingml/2006/main" xmlns:r="http://schemas.openxmlformats.org/officeDocument/2006/relationships" xmlns:p="http://schemas.openxmlformats.org/presentationml/2006/main">
+  <p:cSld>
+    <p:spTree>
+      <p:nvGrpSpPr>
+        <p:cNvPr id="1" name=""/>
+        <p:cNvGrpSpPr/>
+        <p:nvPr/>
+      </p:nvGrpSpPr>
+      <p:grpSpPr>
+        <a:xfrm>
+          <a:off x="0" y="0"/>
+          <a:ext cx="0" cy="0"/>
+          <a:chOff x="0" y="0"/>
+          <a:chExt cx="0" cy="0"/>
+        </a:xfrm>
+      </p:grpSpPr>
+      <p:sp>
+        <p:nvSpPr>
+          <p:cNvPr id="6" name="Rectangle 5">
+            <a:extLst>
+              <a:ext uri="{FF2B5EF4-FFF2-40B4-BE49-F238E27FC236}">
+                <a16:creationId xmlns:a16="http://schemas.microsoft.com/office/drawing/2014/main" id="{9F60BF40-2D47-D459-1F46-215AAD4A1DCE}"/>
+              </a:ext>
+            </a:extLst>
+          </p:cNvPr>
+          <p:cNvSpPr/>
+          <p:nvPr/>
+        </p:nvSpPr>
+        <p:spPr>
+          <a:xfrm>
+            <a:off x="2338548" y="168966"/>
+            <a:ext cx="4848828" cy="923330"/>
+          </a:xfrm>
+          <a:prstGeom prst="rect">
+            <a:avLst/>
+          </a:prstGeom>
+          <a:noFill/>
+        </p:spPr>
+        <p:txBody>
+          <a:bodyPr wrap="none" lIns="91440" tIns="45720" rIns="91440" bIns="45720">
+            <a:spAutoFit/>
+          </a:bodyPr>
+          <a:lstStyle/>
+          <a:p>
+            <a:pPr algn="ctr"/>
+            <a:r>
+              <a:rPr lang="en-US" sz="5400" b="1" dirty="0">
+                <a:ln w="22225">
+                  <a:solidFill>
+                    <a:schemeClr val="accent2"/>
+                  </a:solidFill>
+                  <a:prstDash val="solid"/>
+                </a:ln>
+                <a:solidFill>
+                  <a:schemeClr val="accent2">
+                    <a:lumMod val="40000"/>
+                    <a:lumOff val="60000"/>
+                  </a:schemeClr>
+                </a:solidFill>
+              </a:rPr>
+              <a:t>Meta Constraints</a:t>
+            </a:r>
+          </a:p>
+        </p:txBody>
+      </p:sp>
+      <p:sp>
+        <p:nvSpPr>
+          <p:cNvPr id="7" name="Subtitle 2">
+            <a:extLst>
+              <a:ext uri="{FF2B5EF4-FFF2-40B4-BE49-F238E27FC236}">
+                <a16:creationId xmlns:a16="http://schemas.microsoft.com/office/drawing/2014/main" id="{9FC0D787-C3BB-EB97-C9FF-BC8D1D93F348}"/>
+              </a:ext>
+            </a:extLst>
+          </p:cNvPr>
+          <p:cNvSpPr txBox="1">
+            <a:spLocks/>
+          </p:cNvSpPr>
+          <p:nvPr/>
+        </p:nvSpPr>
+        <p:spPr>
+          <a:xfrm>
+            <a:off x="731777" y="1092296"/>
+            <a:ext cx="10516447" cy="5489126"/>
+          </a:xfrm>
+          <a:prstGeom prst="rect">
+            <a:avLst/>
+          </a:prstGeom>
+        </p:spPr>
+        <p:txBody>
+          <a:bodyPr vert="horz" lIns="91440" tIns="45720" rIns="91440" bIns="45720" rtlCol="0">
+            <a:normAutofit/>
+          </a:bodyPr>
+          <a:lstStyle>
+            <a:lvl1pPr marL="0" indent="0" algn="l" defTabSz="914400" rtl="0" eaLnBrk="1" latinLnBrk="0" hangingPunct="1">
+              <a:lnSpc>
+                <a:spcPct val="85000"/>
+              </a:lnSpc>
+              <a:spcBef>
+                <a:spcPts val="1300"/>
+              </a:spcBef>
+              <a:buFont typeface="Arial" pitchFamily="34" charset="0"/>
+              <a:buNone/>
+              <a:defRPr sz="3200" kern="1200">
+                <a:solidFill>
+                  <a:schemeClr val="tx1"/>
+                </a:solidFill>
+                <a:latin typeface="+mj-lt"/>
+                <a:ea typeface="+mn-ea"/>
+                <a:cs typeface="+mn-cs"/>
+              </a:defRPr>
+            </a:lvl1pPr>
+            <a:lvl2pPr marL="457200" indent="0" algn="ctr" defTabSz="914400" rtl="0" eaLnBrk="1" latinLnBrk="0" hangingPunct="1">
+              <a:lnSpc>
+                <a:spcPct val="85000"/>
+              </a:lnSpc>
+              <a:spcBef>
+                <a:spcPts val="600"/>
+              </a:spcBef>
+              <a:buFont typeface="Arial" pitchFamily="34" charset="0"/>
+              <a:buNone/>
+              <a:defRPr sz="2800" kern="1200">
+                <a:solidFill>
+                  <a:schemeClr val="tx1">
+                    <a:lumMod val="75000"/>
+                    <a:lumOff val="25000"/>
+                  </a:schemeClr>
+                </a:solidFill>
+                <a:latin typeface="+mn-lt"/>
+                <a:ea typeface="+mn-ea"/>
+                <a:cs typeface="+mn-cs"/>
+              </a:defRPr>
+            </a:lvl2pPr>
+            <a:lvl3pPr marL="914400" indent="0" algn="ctr" defTabSz="914400" rtl="0" eaLnBrk="1" latinLnBrk="0" hangingPunct="1">
+              <a:lnSpc>
+                <a:spcPct val="85000"/>
+              </a:lnSpc>
+              <a:spcBef>
+                <a:spcPts val="600"/>
+              </a:spcBef>
+              <a:buFont typeface="Arial" pitchFamily="34" charset="0"/>
+              <a:buNone/>
+              <a:defRPr sz="2400" i="1" kern="1200">
+                <a:solidFill>
+                  <a:schemeClr val="tx1">
+                    <a:lumMod val="65000"/>
+                    <a:lumOff val="35000"/>
+                  </a:schemeClr>
+                </a:solidFill>
+                <a:latin typeface="+mn-lt"/>
+                <a:ea typeface="+mn-ea"/>
+                <a:cs typeface="+mn-cs"/>
+              </a:defRPr>
+            </a:lvl3pPr>
+            <a:lvl4pPr marL="1371600" indent="0" algn="ctr" defTabSz="914400" rtl="0" eaLnBrk="1" latinLnBrk="0" hangingPunct="1">
+              <a:lnSpc>
+                <a:spcPct val="85000"/>
+              </a:lnSpc>
+              <a:spcBef>
+                <a:spcPts val="600"/>
+              </a:spcBef>
+              <a:buFont typeface="Arial" pitchFamily="34" charset="0"/>
+              <a:buNone/>
+              <a:defRPr sz="2000" kern="1200">
+                <a:solidFill>
+                  <a:schemeClr val="tx1">
+                    <a:lumMod val="65000"/>
+                    <a:lumOff val="35000"/>
+                  </a:schemeClr>
+                </a:solidFill>
+                <a:latin typeface="+mn-lt"/>
+                <a:ea typeface="+mn-ea"/>
+                <a:cs typeface="+mn-cs"/>
+              </a:defRPr>
+            </a:lvl4pPr>
+            <a:lvl5pPr marL="1828800" indent="0" algn="ctr" defTabSz="914400" rtl="0" eaLnBrk="1" latinLnBrk="0" hangingPunct="1">
+              <a:lnSpc>
+                <a:spcPct val="85000"/>
+              </a:lnSpc>
+              <a:spcBef>
+                <a:spcPts val="600"/>
+              </a:spcBef>
+              <a:buFont typeface="Arial" pitchFamily="34" charset="0"/>
+              <a:buNone/>
+              <a:defRPr sz="2000" kern="1200">
+                <a:solidFill>
+                  <a:schemeClr val="tx1">
+                    <a:lumMod val="65000"/>
+                    <a:lumOff val="35000"/>
+                  </a:schemeClr>
+                </a:solidFill>
+                <a:latin typeface="+mn-lt"/>
+                <a:ea typeface="+mn-ea"/>
+                <a:cs typeface="+mn-cs"/>
+              </a:defRPr>
+            </a:lvl5pPr>
+            <a:lvl6pPr marL="2286000" indent="0" algn="ctr" defTabSz="914400" rtl="0" eaLnBrk="1" latinLnBrk="0" hangingPunct="1">
+              <a:lnSpc>
+                <a:spcPct val="85000"/>
+              </a:lnSpc>
+              <a:spcBef>
+                <a:spcPts val="600"/>
+              </a:spcBef>
+              <a:buFont typeface="Arial" pitchFamily="34" charset="0"/>
+              <a:buNone/>
+              <a:defRPr sz="2000" kern="1200">
+                <a:solidFill>
+                  <a:schemeClr val="tx1">
+                    <a:lumMod val="65000"/>
+                    <a:lumOff val="35000"/>
+                  </a:schemeClr>
+                </a:solidFill>
+                <a:latin typeface="+mn-lt"/>
+                <a:ea typeface="+mn-ea"/>
+                <a:cs typeface="+mn-cs"/>
+              </a:defRPr>
+            </a:lvl6pPr>
+            <a:lvl7pPr marL="2743200" indent="0" algn="ctr" defTabSz="914400" rtl="0" eaLnBrk="1" latinLnBrk="0" hangingPunct="1">
+              <a:lnSpc>
+                <a:spcPct val="85000"/>
+              </a:lnSpc>
+              <a:spcBef>
+                <a:spcPts val="600"/>
+              </a:spcBef>
+              <a:buFont typeface="Arial" pitchFamily="34" charset="0"/>
+              <a:buNone/>
+              <a:defRPr sz="2000" kern="1200">
+                <a:solidFill>
+                  <a:schemeClr val="tx1">
+                    <a:lumMod val="65000"/>
+                    <a:lumOff val="35000"/>
+                  </a:schemeClr>
+                </a:solidFill>
+                <a:latin typeface="+mn-lt"/>
+                <a:ea typeface="+mn-ea"/>
+                <a:cs typeface="+mn-cs"/>
+              </a:defRPr>
+            </a:lvl7pPr>
+            <a:lvl8pPr marL="3200400" indent="0" algn="ctr" defTabSz="914400" rtl="0" eaLnBrk="1" latinLnBrk="0" hangingPunct="1">
+              <a:lnSpc>
+                <a:spcPct val="85000"/>
+              </a:lnSpc>
+              <a:spcBef>
+                <a:spcPts val="600"/>
+              </a:spcBef>
+              <a:buFont typeface="Arial" pitchFamily="34" charset="0"/>
+              <a:buNone/>
+              <a:defRPr sz="2000" kern="1200">
+                <a:solidFill>
+                  <a:schemeClr val="tx1">
+                    <a:lumMod val="65000"/>
+                    <a:lumOff val="35000"/>
+                  </a:schemeClr>
+                </a:solidFill>
+                <a:latin typeface="+mn-lt"/>
+                <a:ea typeface="+mn-ea"/>
+                <a:cs typeface="+mn-cs"/>
+              </a:defRPr>
+            </a:lvl8pPr>
+            <a:lvl9pPr marL="3657600" indent="0" algn="ctr" defTabSz="914400" rtl="0" eaLnBrk="1" latinLnBrk="0" hangingPunct="1">
+              <a:lnSpc>
+                <a:spcPct val="85000"/>
+              </a:lnSpc>
+              <a:spcBef>
+                <a:spcPts val="600"/>
+              </a:spcBef>
+              <a:buFont typeface="Arial" pitchFamily="34" charset="0"/>
+              <a:buNone/>
+              <a:defRPr sz="2000" kern="1200">
+                <a:solidFill>
+                  <a:schemeClr val="tx1">
+                    <a:lumMod val="65000"/>
+                    <a:lumOff val="35000"/>
+                  </a:schemeClr>
+                </a:solidFill>
+                <a:latin typeface="+mn-lt"/>
+                <a:ea typeface="+mn-ea"/>
+                <a:cs typeface="+mn-cs"/>
+              </a:defRPr>
+            </a:lvl9pPr>
+          </a:lstStyle>
+          <a:p>
+            <a:pPr marL="457200" indent="-457200">
+              <a:buFont typeface="Arial" panose="020B0604020202020204" pitchFamily="34" charset="0"/>
+              <a:buChar char="•"/>
+            </a:pPr>
+            <a:r>
+              <a:rPr lang="en-US" dirty="0"/>
+              <a:t>Eventually, both alchemical laws will also apply to the number of tiles each active experiment has</a:t>
+            </a:r>
+          </a:p>
+          <a:p>
+            <a:pPr marL="457200" indent="-457200">
+              <a:buFont typeface="Arial" panose="020B0604020202020204" pitchFamily="34" charset="0"/>
+              <a:buChar char="•"/>
+            </a:pPr>
+            <a:r>
+              <a:rPr lang="en-US" dirty="0"/>
+              <a:t>In other words, two active experiments can not have the same number of tiles  and one experiment can not have more tiles than all the other active experiments combined</a:t>
+            </a:r>
+          </a:p>
+          <a:p>
+            <a:pPr marL="457200" indent="-457200">
+              <a:buFont typeface="Arial" panose="020B0604020202020204" pitchFamily="34" charset="0"/>
+              <a:buChar char="•"/>
+            </a:pPr>
+            <a:r>
+              <a:rPr lang="en-US" dirty="0"/>
+              <a:t>These constraints do not apply until there are at least 20 tiles  in your active experiments</a:t>
+            </a:r>
+          </a:p>
+          <a:p>
+            <a:pPr marL="457200" indent="-457200">
+              <a:buFont typeface="Arial" panose="020B0604020202020204" pitchFamily="34" charset="0"/>
+              <a:buChar char="•"/>
+            </a:pPr>
+            <a:r>
+              <a:rPr lang="en-US" dirty="0"/>
+              <a:t>When meta constraints are broken, all experiments become unstable</a:t>
+            </a:r>
+          </a:p>
+        </p:txBody>
+      </p:sp>
+    </p:spTree>
+    <p:extLst>
+      <p:ext uri="{BB962C8B-B14F-4D97-AF65-F5344CB8AC3E}">
+        <p14:creationId xmlns:p14="http://schemas.microsoft.com/office/powerpoint/2010/main" val="2558907806"/>
+      </p:ext>
+    </p:extLst>
+  </p:cSld>
+  <p:clrMapOvr>
+    <a:masterClrMapping/>
+  </p:clrMapOvr>
+</p:sld>
+</file>
+
+<file path=ppt/slides/slide6.xml><?xml version="1.0" encoding="utf-8"?>
+<p:sld xmlns:a="http://schemas.openxmlformats.org/drawingml/2006/main" xmlns:r="http://schemas.openxmlformats.org/officeDocument/2006/relationships" xmlns:p="http://schemas.openxmlformats.org/presentationml/2006/main">
+  <p:cSld>
+    <p:spTree>
+      <p:nvGrpSpPr>
+        <p:cNvPr id="1" name=""/>
+        <p:cNvGrpSpPr/>
+        <p:nvPr/>
+      </p:nvGrpSpPr>
+      <p:grpSpPr>
+        <a:xfrm>
+          <a:off x="0" y="0"/>
+          <a:ext cx="0" cy="0"/>
+          <a:chOff x="0" y="0"/>
+          <a:chExt cx="0" cy="0"/>
+        </a:xfrm>
+      </p:grpSpPr>
+      <p:sp>
+        <p:nvSpPr>
+          <p:cNvPr id="6" name="TextBox 5">
+            <a:extLst>
+              <a:ext uri="{FF2B5EF4-FFF2-40B4-BE49-F238E27FC236}">
+                <a16:creationId xmlns:a16="http://schemas.microsoft.com/office/drawing/2014/main" id="{F5D13BBC-3AAE-1FE0-C9A7-74F23D4FAC05}"/>
+              </a:ext>
+            </a:extLst>
+          </p:cNvPr>
+          <p:cNvSpPr txBox="1"/>
+          <p:nvPr/>
+        </p:nvSpPr>
+        <p:spPr>
+          <a:xfrm>
+            <a:off x="1287136" y="120318"/>
+            <a:ext cx="7855027" cy="523220"/>
+          </a:xfrm>
+          <a:prstGeom prst="rect">
+            <a:avLst/>
+          </a:prstGeom>
+          <a:noFill/>
+        </p:spPr>
+        <p:txBody>
+          <a:bodyPr wrap="square" rtlCol="0">
+            <a:spAutoFit/>
+          </a:bodyPr>
+          <a:lstStyle/>
+          <a:p>
+            <a:r>
+              <a:rPr lang="en-US" sz="2800" dirty="0"/>
+              <a:t>All active experiments are subject to </a:t>
+            </a:r>
+            <a:r>
+              <a:rPr lang="en-US" sz="2800" i="1" dirty="0"/>
+              <a:t>alchemical laws</a:t>
+            </a:r>
+          </a:p>
+        </p:txBody>
+      </p:sp>
+      <p:sp>
+        <p:nvSpPr>
+          <p:cNvPr id="7" name="TextBox 6">
+            <a:extLst>
+              <a:ext uri="{FF2B5EF4-FFF2-40B4-BE49-F238E27FC236}">
+                <a16:creationId xmlns:a16="http://schemas.microsoft.com/office/drawing/2014/main" id="{1B1DEE8C-BA0C-7E1A-5B0B-703E87C4DDD2}"/>
+              </a:ext>
+            </a:extLst>
+          </p:cNvPr>
+          <p:cNvSpPr txBox="1"/>
+          <p:nvPr/>
+        </p:nvSpPr>
+        <p:spPr>
+          <a:xfrm>
+            <a:off x="1022148" y="715113"/>
+            <a:ext cx="9038671" cy="1631216"/>
+          </a:xfrm>
+          <a:prstGeom prst="rect">
+            <a:avLst/>
+          </a:prstGeom>
+          <a:noFill/>
+        </p:spPr>
+        <p:txBody>
+          <a:bodyPr wrap="square" rtlCol="0">
+            <a:spAutoFit/>
+          </a:bodyPr>
+          <a:lstStyle/>
+          <a:p>
+            <a:pPr marL="285750" indent="-285750">
+              <a:buFont typeface="Arial" panose="020B0604020202020204" pitchFamily="34" charset="0"/>
+              <a:buChar char="•"/>
+            </a:pPr>
+            <a:r>
+              <a:rPr lang="en-US" sz="2000" dirty="0"/>
+              <a:t>Experiments are only active if they have at least 3 essences in them</a:t>
+            </a:r>
+          </a:p>
+          <a:p>
+            <a:pPr marL="285750" indent="-285750">
+              <a:buFont typeface="Arial" panose="020B0604020202020204" pitchFamily="34" charset="0"/>
+              <a:buChar char="•"/>
+            </a:pPr>
+            <a:r>
+              <a:rPr lang="en-US" sz="2000" dirty="0"/>
+              <a:t>Inactive experiments are automatically considered stable</a:t>
+            </a:r>
+          </a:p>
+          <a:p>
+            <a:pPr marL="285750" indent="-285750">
+              <a:buFont typeface="Arial" panose="020B0604020202020204" pitchFamily="34" charset="0"/>
+              <a:buChar char="•"/>
+            </a:pPr>
+            <a:r>
+              <a:rPr lang="en-US" sz="2000" dirty="0"/>
+              <a:t>Active experiments are stable only if they do not violate any </a:t>
+            </a:r>
+            <a:r>
+              <a:rPr lang="en-US" sz="2000" i="1" dirty="0"/>
+              <a:t>alchemical laws</a:t>
+            </a:r>
+          </a:p>
+          <a:p>
+            <a:pPr marL="285750" indent="-285750">
+              <a:buFont typeface="Arial" panose="020B0604020202020204" pitchFamily="34" charset="0"/>
+              <a:buChar char="•"/>
+            </a:pPr>
+            <a:endParaRPr lang="en-US" sz="2000" dirty="0"/>
+          </a:p>
+          <a:p>
+            <a:pPr marL="285750" indent="-285750">
+              <a:buFont typeface="Arial" panose="020B0604020202020204" pitchFamily="34" charset="0"/>
+              <a:buChar char="•"/>
+            </a:pPr>
+            <a:r>
+              <a:rPr lang="en-US" sz="2000" dirty="0"/>
+              <a:t>The laws of Alchemy apply </a:t>
+            </a:r>
+            <a:r>
+              <a:rPr lang="en-US" sz="2000" b="1" dirty="0"/>
+              <a:t>separately</a:t>
+            </a:r>
+            <a:r>
+              <a:rPr lang="en-US" sz="2000" dirty="0"/>
+              <a:t> to both  shapes and letters</a:t>
             </a:r>
           </a:p>
         </p:txBody>
@@ -4634,7 +5814,7 @@
             </a:pPr>
             <a:r>
               <a:rPr lang="en-US" dirty="0"/>
-              <a:t>An experiment can not have an equal count of two different elements</a:t>
+              <a:t>An experiment can not have an equal count of two different shapes</a:t>
             </a:r>
           </a:p>
           <a:p>
@@ -4700,7 +5880,15 @@
             </a:pPr>
             <a:r>
               <a:rPr lang="en-US" dirty="0"/>
-              <a:t>An experiment can not have more of any element than all its other elements combined</a:t>
+              <a:t>An experiment can not have more of any shape than all its </a:t>
+            </a:r>
+            <a:r>
+              <a:rPr lang="en-US"/>
+              <a:t>other shapes </a:t>
+            </a:r>
+            <a:r>
+              <a:rPr lang="en-US" dirty="0"/>
+              <a:t>combined</a:t>
             </a:r>
           </a:p>
           <a:p>
@@ -4735,7 +5923,7 @@
 </p:sld>
 </file>
 
-<file path=ppt/slides/slide4.xml><?xml version="1.0" encoding="utf-8"?>
+<file path=ppt/slides/slide7.xml><?xml version="1.0" encoding="utf-8"?>
 <p:sld xmlns:a="http://schemas.openxmlformats.org/drawingml/2006/main" xmlns:r="http://schemas.openxmlformats.org/officeDocument/2006/relationships" xmlns:p="http://schemas.openxmlformats.org/presentationml/2006/main">
   <p:cSld>
     <p:spTree>
@@ -4752,22 +5940,217 @@
           <a:chExt cx="0" cy="0"/>
         </a:xfrm>
       </p:grpSpPr>
-      <p:sp>
-        <p:nvSpPr>
-          <p:cNvPr id="6" name="Rectangle 5">
+      <p:pic>
+        <p:nvPicPr>
+          <p:cNvPr id="4" name="Graphic 3">
             <a:extLst>
               <a:ext uri="{FF2B5EF4-FFF2-40B4-BE49-F238E27FC236}">
-                <a16:creationId xmlns:a16="http://schemas.microsoft.com/office/drawing/2014/main" id="{9F60BF40-2D47-D459-1F46-215AAD4A1DCE}"/>
+                <a16:creationId xmlns:a16="http://schemas.microsoft.com/office/drawing/2014/main" id="{73F1059C-DCFD-0DDA-A5BA-3177DA24EAAA}"/>
               </a:ext>
             </a:extLst>
           </p:cNvPr>
-          <p:cNvSpPr/>
+          <p:cNvPicPr>
+            <a:picLocks noChangeAspect="1"/>
+          </p:cNvPicPr>
           <p:nvPr/>
-        </p:nvSpPr>
+        </p:nvPicPr>
+        <p:blipFill>
+          <a:blip r:embed="rId2">
+            <a:extLst>
+              <a:ext uri="{28A0092B-C50C-407E-A947-70E740481C1C}">
+                <a14:useLocalDpi xmlns:a14="http://schemas.microsoft.com/office/drawing/2010/main" val="0"/>
+              </a:ext>
+              <a:ext uri="{96DAC541-7B7A-43D3-8B79-37D633B846F1}">
+                <asvg:svgBlip xmlns:asvg="http://schemas.microsoft.com/office/drawing/2016/SVG/main" r:embed="rId3"/>
+              </a:ext>
+            </a:extLst>
+          </a:blip>
+          <a:stretch>
+            <a:fillRect/>
+          </a:stretch>
+        </p:blipFill>
         <p:spPr>
           <a:xfrm>
-            <a:off x="2338548" y="168966"/>
-            <a:ext cx="4848828" cy="923330"/>
+            <a:off x="5031711" y="4162590"/>
+            <a:ext cx="1234144" cy="1234144"/>
+          </a:xfrm>
+          <a:prstGeom prst="rect">
+            <a:avLst/>
+          </a:prstGeom>
+        </p:spPr>
+      </p:pic>
+      <p:pic>
+        <p:nvPicPr>
+          <p:cNvPr id="5" name="Graphic 4">
+            <a:extLst>
+              <a:ext uri="{FF2B5EF4-FFF2-40B4-BE49-F238E27FC236}">
+                <a16:creationId xmlns:a16="http://schemas.microsoft.com/office/drawing/2014/main" id="{FEF5CD53-F0ED-2CBC-3C52-D95995A7598E}"/>
+              </a:ext>
+            </a:extLst>
+          </p:cNvPr>
+          <p:cNvPicPr>
+            <a:picLocks noChangeAspect="1"/>
+          </p:cNvPicPr>
+          <p:nvPr/>
+        </p:nvPicPr>
+        <p:blipFill>
+          <a:blip r:embed="rId4">
+            <a:extLst>
+              <a:ext uri="{28A0092B-C50C-407E-A947-70E740481C1C}">
+                <a14:useLocalDpi xmlns:a14="http://schemas.microsoft.com/office/drawing/2010/main" val="0"/>
+              </a:ext>
+              <a:ext uri="{96DAC541-7B7A-43D3-8B79-37D633B846F1}">
+                <asvg:svgBlip xmlns:asvg="http://schemas.microsoft.com/office/drawing/2016/SVG/main" r:embed="rId5"/>
+              </a:ext>
+            </a:extLst>
+          </a:blip>
+          <a:stretch>
+            <a:fillRect/>
+          </a:stretch>
+        </p:blipFill>
+        <p:spPr>
+          <a:xfrm>
+            <a:off x="6875252" y="4166254"/>
+            <a:ext cx="1234144" cy="1234144"/>
+          </a:xfrm>
+          <a:prstGeom prst="rect">
+            <a:avLst/>
+          </a:prstGeom>
+        </p:spPr>
+      </p:pic>
+      <p:pic>
+        <p:nvPicPr>
+          <p:cNvPr id="6" name="Graphic 5">
+            <a:extLst>
+              <a:ext uri="{FF2B5EF4-FFF2-40B4-BE49-F238E27FC236}">
+                <a16:creationId xmlns:a16="http://schemas.microsoft.com/office/drawing/2014/main" id="{8147F001-8303-E59D-B757-D4879E1238CE}"/>
+              </a:ext>
+            </a:extLst>
+          </p:cNvPr>
+          <p:cNvPicPr>
+            <a:picLocks noChangeAspect="1"/>
+          </p:cNvPicPr>
+          <p:nvPr/>
+        </p:nvPicPr>
+        <p:blipFill>
+          <a:blip r:embed="rId6">
+            <a:extLst>
+              <a:ext uri="{28A0092B-C50C-407E-A947-70E740481C1C}">
+                <a14:useLocalDpi xmlns:a14="http://schemas.microsoft.com/office/drawing/2010/main" val="0"/>
+              </a:ext>
+              <a:ext uri="{96DAC541-7B7A-43D3-8B79-37D633B846F1}">
+                <asvg:svgBlip xmlns:asvg="http://schemas.microsoft.com/office/drawing/2016/SVG/main" r:embed="rId7"/>
+              </a:ext>
+            </a:extLst>
+          </a:blip>
+          <a:stretch>
+            <a:fillRect/>
+          </a:stretch>
+        </p:blipFill>
+        <p:spPr>
+          <a:xfrm>
+            <a:off x="8640845" y="4198716"/>
+            <a:ext cx="1234144" cy="1234144"/>
+          </a:xfrm>
+          <a:prstGeom prst="rect">
+            <a:avLst/>
+          </a:prstGeom>
+        </p:spPr>
+      </p:pic>
+      <p:pic>
+        <p:nvPicPr>
+          <p:cNvPr id="7" name="Graphic 6">
+            <a:extLst>
+              <a:ext uri="{FF2B5EF4-FFF2-40B4-BE49-F238E27FC236}">
+                <a16:creationId xmlns:a16="http://schemas.microsoft.com/office/drawing/2014/main" id="{781CDEDE-6A18-0654-A738-EAB36D954D11}"/>
+              </a:ext>
+            </a:extLst>
+          </p:cNvPr>
+          <p:cNvPicPr>
+            <a:picLocks noChangeAspect="1"/>
+          </p:cNvPicPr>
+          <p:nvPr/>
+        </p:nvPicPr>
+        <p:blipFill>
+          <a:blip r:embed="rId8">
+            <a:extLst>
+              <a:ext uri="{28A0092B-C50C-407E-A947-70E740481C1C}">
+                <a14:useLocalDpi xmlns:a14="http://schemas.microsoft.com/office/drawing/2010/main" val="0"/>
+              </a:ext>
+              <a:ext uri="{96DAC541-7B7A-43D3-8B79-37D633B846F1}">
+                <asvg:svgBlip xmlns:asvg="http://schemas.microsoft.com/office/drawing/2016/SVG/main" r:embed="rId9"/>
+              </a:ext>
+            </a:extLst>
+          </a:blip>
+          <a:stretch>
+            <a:fillRect/>
+          </a:stretch>
+        </p:blipFill>
+        <p:spPr>
+          <a:xfrm>
+            <a:off x="3266118" y="4198716"/>
+            <a:ext cx="1234144" cy="1234144"/>
+          </a:xfrm>
+          <a:prstGeom prst="rect">
+            <a:avLst/>
+          </a:prstGeom>
+        </p:spPr>
+      </p:pic>
+      <p:pic>
+        <p:nvPicPr>
+          <p:cNvPr id="8" name="Graphic 7">
+            <a:extLst>
+              <a:ext uri="{FF2B5EF4-FFF2-40B4-BE49-F238E27FC236}">
+                <a16:creationId xmlns:a16="http://schemas.microsoft.com/office/drawing/2014/main" id="{61BBAC08-F96B-B7AB-890D-E93D5D378913}"/>
+              </a:ext>
+            </a:extLst>
+          </p:cNvPr>
+          <p:cNvPicPr>
+            <a:picLocks noChangeAspect="1"/>
+          </p:cNvPicPr>
+          <p:nvPr/>
+        </p:nvPicPr>
+        <p:blipFill>
+          <a:blip r:embed="rId10">
+            <a:extLst>
+              <a:ext uri="{28A0092B-C50C-407E-A947-70E740481C1C}">
+                <a14:useLocalDpi xmlns:a14="http://schemas.microsoft.com/office/drawing/2010/main" val="0"/>
+              </a:ext>
+              <a:ext uri="{96DAC541-7B7A-43D3-8B79-37D633B846F1}">
+                <asvg:svgBlip xmlns:asvg="http://schemas.microsoft.com/office/drawing/2016/SVG/main" r:embed="rId11"/>
+              </a:ext>
+            </a:extLst>
+          </a:blip>
+          <a:stretch>
+            <a:fillRect/>
+          </a:stretch>
+        </p:blipFill>
+        <p:spPr>
+          <a:xfrm>
+            <a:off x="1460188" y="4187368"/>
+            <a:ext cx="1236554" cy="1236554"/>
+          </a:xfrm>
+          <a:prstGeom prst="rect">
+            <a:avLst/>
+          </a:prstGeom>
+        </p:spPr>
+      </p:pic>
+      <p:sp>
+        <p:nvSpPr>
+          <p:cNvPr id="10" name="TextBox 9">
+            <a:extLst>
+              <a:ext uri="{FF2B5EF4-FFF2-40B4-BE49-F238E27FC236}">
+                <a16:creationId xmlns:a16="http://schemas.microsoft.com/office/drawing/2014/main" id="{866BBFB8-FBD0-6BC2-76E2-74AF08382FF5}"/>
+              </a:ext>
+            </a:extLst>
+          </p:cNvPr>
+          <p:cNvSpPr txBox="1"/>
+          <p:nvPr/>
+        </p:nvSpPr>
+        <p:spPr>
+          <a:xfrm>
+            <a:off x="4166550" y="2502892"/>
+            <a:ext cx="5015797" cy="369332"/>
           </a:xfrm>
           <a:prstGeom prst="rect">
             <a:avLst/>
@@ -4775,605 +6158,34 @@
           <a:noFill/>
         </p:spPr>
         <p:txBody>
-          <a:bodyPr wrap="none" lIns="91440" tIns="45720" rIns="91440" bIns="45720">
+          <a:bodyPr wrap="square" rtlCol="0">
             <a:spAutoFit/>
           </a:bodyPr>
           <a:lstStyle/>
           <a:p>
-            <a:pPr algn="ctr"/>
-            <a:r>
-              <a:rPr lang="en-US" sz="5400" b="1" dirty="0">
-                <a:ln w="22225">
-                  <a:solidFill>
-                    <a:schemeClr val="accent2"/>
-                  </a:solidFill>
-                  <a:prstDash val="solid"/>
-                </a:ln>
-                <a:solidFill>
-                  <a:schemeClr val="accent2">
-                    <a:lumMod val="40000"/>
-                    <a:lumOff val="60000"/>
-                  </a:schemeClr>
-                </a:solidFill>
-              </a:rPr>
-              <a:t>Meta Constraints</a:t>
-            </a:r>
-          </a:p>
-        </p:txBody>
-      </p:sp>
-      <p:sp>
-        <p:nvSpPr>
-          <p:cNvPr id="7" name="Subtitle 2">
+            <a:r>
+              <a:rPr lang="en-US" dirty="0"/>
+              <a:t>Each tile has 2 attributes:</a:t>
+            </a:r>
+          </a:p>
+        </p:txBody>
+      </p:sp>
+      <p:sp>
+        <p:nvSpPr>
+          <p:cNvPr id="11" name="TextBox 10">
             <a:extLst>
               <a:ext uri="{FF2B5EF4-FFF2-40B4-BE49-F238E27FC236}">
-                <a16:creationId xmlns:a16="http://schemas.microsoft.com/office/drawing/2014/main" id="{9FC0D787-C3BB-EB97-C9FF-BC8D1D93F348}"/>
+                <a16:creationId xmlns:a16="http://schemas.microsoft.com/office/drawing/2014/main" id="{E5CE3D7D-8103-DCD7-93AA-36D470DFE62A}"/>
               </a:ext>
             </a:extLst>
           </p:cNvPr>
-          <p:cNvSpPr txBox="1">
-            <a:spLocks/>
-          </p:cNvSpPr>
+          <p:cNvSpPr txBox="1"/>
           <p:nvPr/>
         </p:nvSpPr>
         <p:spPr>
           <a:xfrm>
-            <a:off x="731777" y="1092296"/>
-            <a:ext cx="10516447" cy="5489126"/>
-          </a:xfrm>
-          <a:prstGeom prst="rect">
-            <a:avLst/>
-          </a:prstGeom>
-        </p:spPr>
-        <p:txBody>
-          <a:bodyPr vert="horz" lIns="91440" tIns="45720" rIns="91440" bIns="45720" rtlCol="0">
-            <a:normAutofit/>
-          </a:bodyPr>
-          <a:lstStyle>
-            <a:lvl1pPr marL="0" indent="0" algn="l" defTabSz="914400" rtl="0" eaLnBrk="1" latinLnBrk="0" hangingPunct="1">
-              <a:lnSpc>
-                <a:spcPct val="85000"/>
-              </a:lnSpc>
-              <a:spcBef>
-                <a:spcPts val="1300"/>
-              </a:spcBef>
-              <a:buFont typeface="Arial" pitchFamily="34" charset="0"/>
-              <a:buNone/>
-              <a:defRPr sz="3200" kern="1200">
-                <a:solidFill>
-                  <a:schemeClr val="tx1"/>
-                </a:solidFill>
-                <a:latin typeface="+mj-lt"/>
-                <a:ea typeface="+mn-ea"/>
-                <a:cs typeface="+mn-cs"/>
-              </a:defRPr>
-            </a:lvl1pPr>
-            <a:lvl2pPr marL="457200" indent="0" algn="ctr" defTabSz="914400" rtl="0" eaLnBrk="1" latinLnBrk="0" hangingPunct="1">
-              <a:lnSpc>
-                <a:spcPct val="85000"/>
-              </a:lnSpc>
-              <a:spcBef>
-                <a:spcPts val="600"/>
-              </a:spcBef>
-              <a:buFont typeface="Arial" pitchFamily="34" charset="0"/>
-              <a:buNone/>
-              <a:defRPr sz="2800" kern="1200">
-                <a:solidFill>
-                  <a:schemeClr val="tx1">
-                    <a:lumMod val="75000"/>
-                    <a:lumOff val="25000"/>
-                  </a:schemeClr>
-                </a:solidFill>
-                <a:latin typeface="+mn-lt"/>
-                <a:ea typeface="+mn-ea"/>
-                <a:cs typeface="+mn-cs"/>
-              </a:defRPr>
-            </a:lvl2pPr>
-            <a:lvl3pPr marL="914400" indent="0" algn="ctr" defTabSz="914400" rtl="0" eaLnBrk="1" latinLnBrk="0" hangingPunct="1">
-              <a:lnSpc>
-                <a:spcPct val="85000"/>
-              </a:lnSpc>
-              <a:spcBef>
-                <a:spcPts val="600"/>
-              </a:spcBef>
-              <a:buFont typeface="Arial" pitchFamily="34" charset="0"/>
-              <a:buNone/>
-              <a:defRPr sz="2400" i="1" kern="1200">
-                <a:solidFill>
-                  <a:schemeClr val="tx1">
-                    <a:lumMod val="65000"/>
-                    <a:lumOff val="35000"/>
-                  </a:schemeClr>
-                </a:solidFill>
-                <a:latin typeface="+mn-lt"/>
-                <a:ea typeface="+mn-ea"/>
-                <a:cs typeface="+mn-cs"/>
-              </a:defRPr>
-            </a:lvl3pPr>
-            <a:lvl4pPr marL="1371600" indent="0" algn="ctr" defTabSz="914400" rtl="0" eaLnBrk="1" latinLnBrk="0" hangingPunct="1">
-              <a:lnSpc>
-                <a:spcPct val="85000"/>
-              </a:lnSpc>
-              <a:spcBef>
-                <a:spcPts val="600"/>
-              </a:spcBef>
-              <a:buFont typeface="Arial" pitchFamily="34" charset="0"/>
-              <a:buNone/>
-              <a:defRPr sz="2000" kern="1200">
-                <a:solidFill>
-                  <a:schemeClr val="tx1">
-                    <a:lumMod val="65000"/>
-                    <a:lumOff val="35000"/>
-                  </a:schemeClr>
-                </a:solidFill>
-                <a:latin typeface="+mn-lt"/>
-                <a:ea typeface="+mn-ea"/>
-                <a:cs typeface="+mn-cs"/>
-              </a:defRPr>
-            </a:lvl4pPr>
-            <a:lvl5pPr marL="1828800" indent="0" algn="ctr" defTabSz="914400" rtl="0" eaLnBrk="1" latinLnBrk="0" hangingPunct="1">
-              <a:lnSpc>
-                <a:spcPct val="85000"/>
-              </a:lnSpc>
-              <a:spcBef>
-                <a:spcPts val="600"/>
-              </a:spcBef>
-              <a:buFont typeface="Arial" pitchFamily="34" charset="0"/>
-              <a:buNone/>
-              <a:defRPr sz="2000" kern="1200">
-                <a:solidFill>
-                  <a:schemeClr val="tx1">
-                    <a:lumMod val="65000"/>
-                    <a:lumOff val="35000"/>
-                  </a:schemeClr>
-                </a:solidFill>
-                <a:latin typeface="+mn-lt"/>
-                <a:ea typeface="+mn-ea"/>
-                <a:cs typeface="+mn-cs"/>
-              </a:defRPr>
-            </a:lvl5pPr>
-            <a:lvl6pPr marL="2286000" indent="0" algn="ctr" defTabSz="914400" rtl="0" eaLnBrk="1" latinLnBrk="0" hangingPunct="1">
-              <a:lnSpc>
-                <a:spcPct val="85000"/>
-              </a:lnSpc>
-              <a:spcBef>
-                <a:spcPts val="600"/>
-              </a:spcBef>
-              <a:buFont typeface="Arial" pitchFamily="34" charset="0"/>
-              <a:buNone/>
-              <a:defRPr sz="2000" kern="1200">
-                <a:solidFill>
-                  <a:schemeClr val="tx1">
-                    <a:lumMod val="65000"/>
-                    <a:lumOff val="35000"/>
-                  </a:schemeClr>
-                </a:solidFill>
-                <a:latin typeface="+mn-lt"/>
-                <a:ea typeface="+mn-ea"/>
-                <a:cs typeface="+mn-cs"/>
-              </a:defRPr>
-            </a:lvl6pPr>
-            <a:lvl7pPr marL="2743200" indent="0" algn="ctr" defTabSz="914400" rtl="0" eaLnBrk="1" latinLnBrk="0" hangingPunct="1">
-              <a:lnSpc>
-                <a:spcPct val="85000"/>
-              </a:lnSpc>
-              <a:spcBef>
-                <a:spcPts val="600"/>
-              </a:spcBef>
-              <a:buFont typeface="Arial" pitchFamily="34" charset="0"/>
-              <a:buNone/>
-              <a:defRPr sz="2000" kern="1200">
-                <a:solidFill>
-                  <a:schemeClr val="tx1">
-                    <a:lumMod val="65000"/>
-                    <a:lumOff val="35000"/>
-                  </a:schemeClr>
-                </a:solidFill>
-                <a:latin typeface="+mn-lt"/>
-                <a:ea typeface="+mn-ea"/>
-                <a:cs typeface="+mn-cs"/>
-              </a:defRPr>
-            </a:lvl7pPr>
-            <a:lvl8pPr marL="3200400" indent="0" algn="ctr" defTabSz="914400" rtl="0" eaLnBrk="1" latinLnBrk="0" hangingPunct="1">
-              <a:lnSpc>
-                <a:spcPct val="85000"/>
-              </a:lnSpc>
-              <a:spcBef>
-                <a:spcPts val="600"/>
-              </a:spcBef>
-              <a:buFont typeface="Arial" pitchFamily="34" charset="0"/>
-              <a:buNone/>
-              <a:defRPr sz="2000" kern="1200">
-                <a:solidFill>
-                  <a:schemeClr val="tx1">
-                    <a:lumMod val="65000"/>
-                    <a:lumOff val="35000"/>
-                  </a:schemeClr>
-                </a:solidFill>
-                <a:latin typeface="+mn-lt"/>
-                <a:ea typeface="+mn-ea"/>
-                <a:cs typeface="+mn-cs"/>
-              </a:defRPr>
-            </a:lvl8pPr>
-            <a:lvl9pPr marL="3657600" indent="0" algn="ctr" defTabSz="914400" rtl="0" eaLnBrk="1" latinLnBrk="0" hangingPunct="1">
-              <a:lnSpc>
-                <a:spcPct val="85000"/>
-              </a:lnSpc>
-              <a:spcBef>
-                <a:spcPts val="600"/>
-              </a:spcBef>
-              <a:buFont typeface="Arial" pitchFamily="34" charset="0"/>
-              <a:buNone/>
-              <a:defRPr sz="2000" kern="1200">
-                <a:solidFill>
-                  <a:schemeClr val="tx1">
-                    <a:lumMod val="65000"/>
-                    <a:lumOff val="35000"/>
-                  </a:schemeClr>
-                </a:solidFill>
-                <a:latin typeface="+mn-lt"/>
-                <a:ea typeface="+mn-ea"/>
-                <a:cs typeface="+mn-cs"/>
-              </a:defRPr>
-            </a:lvl9pPr>
-          </a:lstStyle>
-          <a:p>
-            <a:pPr marL="457200" indent="-457200">
-              <a:buFont typeface="Arial" panose="020B0604020202020204" pitchFamily="34" charset="0"/>
-              <a:buChar char="•"/>
-            </a:pPr>
-            <a:r>
-              <a:rPr lang="en-US" dirty="0"/>
-              <a:t>Eventually, both alchemical laws will also apply to the number of essences each active experiment has</a:t>
-            </a:r>
-          </a:p>
-          <a:p>
-            <a:pPr marL="457200" indent="-457200">
-              <a:buFont typeface="Arial" panose="020B0604020202020204" pitchFamily="34" charset="0"/>
-              <a:buChar char="•"/>
-            </a:pPr>
-            <a:r>
-              <a:rPr lang="en-US" dirty="0"/>
-              <a:t>In other words, two active experiments can not have the same number of essences and one experiment can not have more essences than all the other active experiments combined</a:t>
-            </a:r>
-          </a:p>
-          <a:p>
-            <a:pPr marL="457200" indent="-457200">
-              <a:buFont typeface="Arial" panose="020B0604020202020204" pitchFamily="34" charset="0"/>
-              <a:buChar char="•"/>
-            </a:pPr>
-            <a:r>
-              <a:rPr lang="en-US" dirty="0"/>
-              <a:t>These constraints do not apply until there are at least 20 essences in your active experiments</a:t>
-            </a:r>
-          </a:p>
-          <a:p>
-            <a:pPr marL="457200" indent="-457200">
-              <a:buFont typeface="Arial" panose="020B0604020202020204" pitchFamily="34" charset="0"/>
-              <a:buChar char="•"/>
-            </a:pPr>
-            <a:r>
-              <a:rPr lang="en-US" dirty="0"/>
-              <a:t>When meta constraints are broken, all experiments become unstable</a:t>
-            </a:r>
-          </a:p>
-        </p:txBody>
-      </p:sp>
-    </p:spTree>
-    <p:extLst>
-      <p:ext uri="{BB962C8B-B14F-4D97-AF65-F5344CB8AC3E}">
-        <p14:creationId xmlns:p14="http://schemas.microsoft.com/office/powerpoint/2010/main" val="2558907806"/>
-      </p:ext>
-    </p:extLst>
-  </p:cSld>
-  <p:clrMapOvr>
-    <a:masterClrMapping/>
-  </p:clrMapOvr>
-</p:sld>
-</file>
-
-<file path=ppt/slides/slide5.xml><?xml version="1.0" encoding="utf-8"?>
-<p:sld xmlns:a="http://schemas.openxmlformats.org/drawingml/2006/main" xmlns:r="http://schemas.openxmlformats.org/officeDocument/2006/relationships" xmlns:p="http://schemas.openxmlformats.org/presentationml/2006/main">
-  <p:cSld>
-    <p:spTree>
-      <p:nvGrpSpPr>
-        <p:cNvPr id="1" name=""/>
-        <p:cNvGrpSpPr/>
-        <p:nvPr/>
-      </p:nvGrpSpPr>
-      <p:grpSpPr>
-        <a:xfrm>
-          <a:off x="0" y="0"/>
-          <a:ext cx="0" cy="0"/>
-          <a:chOff x="0" y="0"/>
-          <a:chExt cx="0" cy="0"/>
-        </a:xfrm>
-      </p:grpSpPr>
-      <p:sp>
-        <p:nvSpPr>
-          <p:cNvPr id="7" name="Subtitle 2">
-            <a:extLst>
-              <a:ext uri="{FF2B5EF4-FFF2-40B4-BE49-F238E27FC236}">
-                <a16:creationId xmlns:a16="http://schemas.microsoft.com/office/drawing/2014/main" id="{9FC0D787-C3BB-EB97-C9FF-BC8D1D93F348}"/>
-              </a:ext>
-            </a:extLst>
-          </p:cNvPr>
-          <p:cNvSpPr txBox="1">
-            <a:spLocks/>
-          </p:cNvSpPr>
-          <p:nvPr/>
-        </p:nvSpPr>
-        <p:spPr>
-          <a:xfrm>
-            <a:off x="219492" y="746497"/>
-            <a:ext cx="10106985" cy="4371049"/>
-          </a:xfrm>
-          <a:prstGeom prst="rect">
-            <a:avLst/>
-          </a:prstGeom>
-        </p:spPr>
-        <p:txBody>
-          <a:bodyPr vert="horz" lIns="91440" tIns="45720" rIns="91440" bIns="45720" rtlCol="0">
-            <a:normAutofit/>
-          </a:bodyPr>
-          <a:lstStyle>
-            <a:lvl1pPr marL="0" indent="0" algn="l" defTabSz="914400" rtl="0" eaLnBrk="1" latinLnBrk="0" hangingPunct="1">
-              <a:lnSpc>
-                <a:spcPct val="85000"/>
-              </a:lnSpc>
-              <a:spcBef>
-                <a:spcPts val="1300"/>
-              </a:spcBef>
-              <a:buFont typeface="Arial" pitchFamily="34" charset="0"/>
-              <a:buNone/>
-              <a:defRPr sz="3200" kern="1200">
-                <a:solidFill>
-                  <a:schemeClr val="tx1"/>
-                </a:solidFill>
-                <a:latin typeface="+mj-lt"/>
-                <a:ea typeface="+mn-ea"/>
-                <a:cs typeface="+mn-cs"/>
-              </a:defRPr>
-            </a:lvl1pPr>
-            <a:lvl2pPr marL="457200" indent="0" algn="ctr" defTabSz="914400" rtl="0" eaLnBrk="1" latinLnBrk="0" hangingPunct="1">
-              <a:lnSpc>
-                <a:spcPct val="85000"/>
-              </a:lnSpc>
-              <a:spcBef>
-                <a:spcPts val="600"/>
-              </a:spcBef>
-              <a:buFont typeface="Arial" pitchFamily="34" charset="0"/>
-              <a:buNone/>
-              <a:defRPr sz="2800" kern="1200">
-                <a:solidFill>
-                  <a:schemeClr val="tx1">
-                    <a:lumMod val="75000"/>
-                    <a:lumOff val="25000"/>
-                  </a:schemeClr>
-                </a:solidFill>
-                <a:latin typeface="+mn-lt"/>
-                <a:ea typeface="+mn-ea"/>
-                <a:cs typeface="+mn-cs"/>
-              </a:defRPr>
-            </a:lvl2pPr>
-            <a:lvl3pPr marL="914400" indent="0" algn="ctr" defTabSz="914400" rtl="0" eaLnBrk="1" latinLnBrk="0" hangingPunct="1">
-              <a:lnSpc>
-                <a:spcPct val="85000"/>
-              </a:lnSpc>
-              <a:spcBef>
-                <a:spcPts val="600"/>
-              </a:spcBef>
-              <a:buFont typeface="Arial" pitchFamily="34" charset="0"/>
-              <a:buNone/>
-              <a:defRPr sz="2400" i="1" kern="1200">
-                <a:solidFill>
-                  <a:schemeClr val="tx1">
-                    <a:lumMod val="65000"/>
-                    <a:lumOff val="35000"/>
-                  </a:schemeClr>
-                </a:solidFill>
-                <a:latin typeface="+mn-lt"/>
-                <a:ea typeface="+mn-ea"/>
-                <a:cs typeface="+mn-cs"/>
-              </a:defRPr>
-            </a:lvl3pPr>
-            <a:lvl4pPr marL="1371600" indent="0" algn="ctr" defTabSz="914400" rtl="0" eaLnBrk="1" latinLnBrk="0" hangingPunct="1">
-              <a:lnSpc>
-                <a:spcPct val="85000"/>
-              </a:lnSpc>
-              <a:spcBef>
-                <a:spcPts val="600"/>
-              </a:spcBef>
-              <a:buFont typeface="Arial" pitchFamily="34" charset="0"/>
-              <a:buNone/>
-              <a:defRPr sz="2000" kern="1200">
-                <a:solidFill>
-                  <a:schemeClr val="tx1">
-                    <a:lumMod val="65000"/>
-                    <a:lumOff val="35000"/>
-                  </a:schemeClr>
-                </a:solidFill>
-                <a:latin typeface="+mn-lt"/>
-                <a:ea typeface="+mn-ea"/>
-                <a:cs typeface="+mn-cs"/>
-              </a:defRPr>
-            </a:lvl4pPr>
-            <a:lvl5pPr marL="1828800" indent="0" algn="ctr" defTabSz="914400" rtl="0" eaLnBrk="1" latinLnBrk="0" hangingPunct="1">
-              <a:lnSpc>
-                <a:spcPct val="85000"/>
-              </a:lnSpc>
-              <a:spcBef>
-                <a:spcPts val="600"/>
-              </a:spcBef>
-              <a:buFont typeface="Arial" pitchFamily="34" charset="0"/>
-              <a:buNone/>
-              <a:defRPr sz="2000" kern="1200">
-                <a:solidFill>
-                  <a:schemeClr val="tx1">
-                    <a:lumMod val="65000"/>
-                    <a:lumOff val="35000"/>
-                  </a:schemeClr>
-                </a:solidFill>
-                <a:latin typeface="+mn-lt"/>
-                <a:ea typeface="+mn-ea"/>
-                <a:cs typeface="+mn-cs"/>
-              </a:defRPr>
-            </a:lvl5pPr>
-            <a:lvl6pPr marL="2286000" indent="0" algn="ctr" defTabSz="914400" rtl="0" eaLnBrk="1" latinLnBrk="0" hangingPunct="1">
-              <a:lnSpc>
-                <a:spcPct val="85000"/>
-              </a:lnSpc>
-              <a:spcBef>
-                <a:spcPts val="600"/>
-              </a:spcBef>
-              <a:buFont typeface="Arial" pitchFamily="34" charset="0"/>
-              <a:buNone/>
-              <a:defRPr sz="2000" kern="1200">
-                <a:solidFill>
-                  <a:schemeClr val="tx1">
-                    <a:lumMod val="65000"/>
-                    <a:lumOff val="35000"/>
-                  </a:schemeClr>
-                </a:solidFill>
-                <a:latin typeface="+mn-lt"/>
-                <a:ea typeface="+mn-ea"/>
-                <a:cs typeface="+mn-cs"/>
-              </a:defRPr>
-            </a:lvl6pPr>
-            <a:lvl7pPr marL="2743200" indent="0" algn="ctr" defTabSz="914400" rtl="0" eaLnBrk="1" latinLnBrk="0" hangingPunct="1">
-              <a:lnSpc>
-                <a:spcPct val="85000"/>
-              </a:lnSpc>
-              <a:spcBef>
-                <a:spcPts val="600"/>
-              </a:spcBef>
-              <a:buFont typeface="Arial" pitchFamily="34" charset="0"/>
-              <a:buNone/>
-              <a:defRPr sz="2000" kern="1200">
-                <a:solidFill>
-                  <a:schemeClr val="tx1">
-                    <a:lumMod val="65000"/>
-                    <a:lumOff val="35000"/>
-                  </a:schemeClr>
-                </a:solidFill>
-                <a:latin typeface="+mn-lt"/>
-                <a:ea typeface="+mn-ea"/>
-                <a:cs typeface="+mn-cs"/>
-              </a:defRPr>
-            </a:lvl7pPr>
-            <a:lvl8pPr marL="3200400" indent="0" algn="ctr" defTabSz="914400" rtl="0" eaLnBrk="1" latinLnBrk="0" hangingPunct="1">
-              <a:lnSpc>
-                <a:spcPct val="85000"/>
-              </a:lnSpc>
-              <a:spcBef>
-                <a:spcPts val="600"/>
-              </a:spcBef>
-              <a:buFont typeface="Arial" pitchFamily="34" charset="0"/>
-              <a:buNone/>
-              <a:defRPr sz="2000" kern="1200">
-                <a:solidFill>
-                  <a:schemeClr val="tx1">
-                    <a:lumMod val="65000"/>
-                    <a:lumOff val="35000"/>
-                  </a:schemeClr>
-                </a:solidFill>
-                <a:latin typeface="+mn-lt"/>
-                <a:ea typeface="+mn-ea"/>
-                <a:cs typeface="+mn-cs"/>
-              </a:defRPr>
-            </a:lvl8pPr>
-            <a:lvl9pPr marL="3657600" indent="0" algn="ctr" defTabSz="914400" rtl="0" eaLnBrk="1" latinLnBrk="0" hangingPunct="1">
-              <a:lnSpc>
-                <a:spcPct val="85000"/>
-              </a:lnSpc>
-              <a:spcBef>
-                <a:spcPts val="600"/>
-              </a:spcBef>
-              <a:buFont typeface="Arial" pitchFamily="34" charset="0"/>
-              <a:buNone/>
-              <a:defRPr sz="2000" kern="1200">
-                <a:solidFill>
-                  <a:schemeClr val="tx1">
-                    <a:lumMod val="65000"/>
-                    <a:lumOff val="35000"/>
-                  </a:schemeClr>
-                </a:solidFill>
-                <a:latin typeface="+mn-lt"/>
-                <a:ea typeface="+mn-ea"/>
-                <a:cs typeface="+mn-cs"/>
-              </a:defRPr>
-            </a:lvl9pPr>
-          </a:lstStyle>
-          <a:p>
-            <a:endParaRPr lang="en-US" dirty="0"/>
-          </a:p>
-          <a:p>
-            <a:pPr marL="457200" indent="-457200">
-              <a:buFont typeface="Arial" panose="020B0604020202020204" pitchFamily="34" charset="0"/>
-              <a:buChar char="•"/>
-            </a:pPr>
-            <a:r>
-              <a:rPr lang="en-US" dirty="0"/>
-              <a:t>Essences can be freely placed into  or out of storage.</a:t>
-            </a:r>
-          </a:p>
-          <a:p>
-            <a:pPr marL="457200" indent="-457200">
-              <a:buFont typeface="Arial" panose="020B0604020202020204" pitchFamily="34" charset="0"/>
-              <a:buChar char="•"/>
-            </a:pPr>
-            <a:r>
-              <a:rPr lang="en-US" dirty="0"/>
-              <a:t>Storage is never subject to alchemic laws</a:t>
-            </a:r>
-          </a:p>
-          <a:p>
-            <a:pPr marL="457200" indent="-457200">
-              <a:buFont typeface="Arial" panose="020B0604020202020204" pitchFamily="34" charset="0"/>
-              <a:buChar char="•"/>
-            </a:pPr>
-            <a:r>
-              <a:rPr lang="en-US" dirty="0"/>
-              <a:t>Storage has a capacity of 8</a:t>
-            </a:r>
-          </a:p>
-          <a:p>
-            <a:pPr marL="457200" indent="-457200">
-              <a:buFont typeface="Arial" panose="020B0604020202020204" pitchFamily="34" charset="0"/>
-              <a:buChar char="•"/>
-            </a:pPr>
-            <a:r>
-              <a:rPr lang="en-US" dirty="0"/>
-              <a:t>Storage starts with 2 random essences </a:t>
-            </a:r>
-          </a:p>
-          <a:p>
-            <a:pPr marL="457200" indent="-457200">
-              <a:buFont typeface="Arial" panose="020B0604020202020204" pitchFamily="34" charset="0"/>
-              <a:buChar char="•"/>
-            </a:pPr>
-            <a:r>
-              <a:rPr lang="en-US" dirty="0"/>
-              <a:t>You can not win while you have essences in storage </a:t>
-            </a:r>
-          </a:p>
-        </p:txBody>
-      </p:sp>
-      <p:sp>
-        <p:nvSpPr>
-          <p:cNvPr id="4" name="Rectangle 3">
-            <a:extLst>
-              <a:ext uri="{FF2B5EF4-FFF2-40B4-BE49-F238E27FC236}">
-                <a16:creationId xmlns:a16="http://schemas.microsoft.com/office/drawing/2014/main" id="{E2369CB6-C899-ECEE-7629-78643EDC8962}"/>
-              </a:ext>
-            </a:extLst>
-          </p:cNvPr>
-          <p:cNvSpPr/>
-          <p:nvPr/>
-        </p:nvSpPr>
-        <p:spPr>
-          <a:xfrm>
-            <a:off x="1677679" y="0"/>
-            <a:ext cx="2252861" cy="923330"/>
+            <a:off x="724371" y="5692560"/>
+            <a:ext cx="8133191" cy="769441"/>
           </a:xfrm>
           <a:prstGeom prst="rect">
             <a:avLst/>
@@ -5381,6 +6193,117 @@
           <a:noFill/>
         </p:spPr>
         <p:txBody>
+          <a:bodyPr wrap="square" rtlCol="0">
+            <a:spAutoFit/>
+          </a:bodyPr>
+          <a:lstStyle/>
+          <a:p>
+            <a:r>
+              <a:rPr lang="en-US" sz="2200" b="1" dirty="0"/>
+              <a:t>LETTER:</a:t>
+            </a:r>
+            <a:r>
+              <a:rPr lang="en-US" sz="2200" dirty="0"/>
+              <a:t>  Each essence is randomly generated with a letter A-F, </a:t>
+            </a:r>
+          </a:p>
+          <a:p>
+            <a:r>
+              <a:rPr lang="en-US" sz="2200" dirty="0"/>
+              <a:t>There is no guaranteed amount for any letter</a:t>
+            </a:r>
+          </a:p>
+        </p:txBody>
+      </p:sp>
+      <p:pic>
+        <p:nvPicPr>
+          <p:cNvPr id="12" name="Picture 11">
+            <a:extLst>
+              <a:ext uri="{FF2B5EF4-FFF2-40B4-BE49-F238E27FC236}">
+                <a16:creationId xmlns:a16="http://schemas.microsoft.com/office/drawing/2014/main" id="{E758F92E-EA60-450F-3D31-E724B3706E6B}"/>
+              </a:ext>
+            </a:extLst>
+          </p:cNvPr>
+          <p:cNvPicPr>
+            <a:picLocks noChangeAspect="1"/>
+          </p:cNvPicPr>
+          <p:nvPr/>
+        </p:nvPicPr>
+        <p:blipFill>
+          <a:blip r:embed="rId12"/>
+          <a:stretch>
+            <a:fillRect/>
+          </a:stretch>
+        </p:blipFill>
+        <p:spPr>
+          <a:xfrm>
+            <a:off x="2390723" y="44231"/>
+            <a:ext cx="1084123" cy="1061537"/>
+          </a:xfrm>
+          <a:prstGeom prst="rect">
+            <a:avLst/>
+          </a:prstGeom>
+        </p:spPr>
+      </p:pic>
+      <p:sp>
+        <p:nvSpPr>
+          <p:cNvPr id="13" name="TextBox 12">
+            <a:extLst>
+              <a:ext uri="{FF2B5EF4-FFF2-40B4-BE49-F238E27FC236}">
+                <a16:creationId xmlns:a16="http://schemas.microsoft.com/office/drawing/2014/main" id="{575EA97B-BBE4-2935-93CC-AFB03DFD3544}"/>
+              </a:ext>
+            </a:extLst>
+          </p:cNvPr>
+          <p:cNvSpPr txBox="1"/>
+          <p:nvPr/>
+        </p:nvSpPr>
+        <p:spPr>
+          <a:xfrm>
+            <a:off x="1019787" y="3617835"/>
+            <a:ext cx="8487770" cy="461665"/>
+          </a:xfrm>
+          <a:prstGeom prst="rect">
+            <a:avLst/>
+          </a:prstGeom>
+          <a:noFill/>
+        </p:spPr>
+        <p:txBody>
+          <a:bodyPr wrap="square" rtlCol="0">
+            <a:spAutoFit/>
+          </a:bodyPr>
+          <a:lstStyle/>
+          <a:p>
+            <a:pPr algn="ctr"/>
+            <a:r>
+              <a:rPr lang="en-US" sz="2400" dirty="0"/>
+              <a:t>Element Types</a:t>
+            </a:r>
+          </a:p>
+        </p:txBody>
+      </p:sp>
+      <p:sp>
+        <p:nvSpPr>
+          <p:cNvPr id="14" name="Rectangle 13">
+            <a:extLst>
+              <a:ext uri="{FF2B5EF4-FFF2-40B4-BE49-F238E27FC236}">
+                <a16:creationId xmlns:a16="http://schemas.microsoft.com/office/drawing/2014/main" id="{78C4DE15-1EC0-F753-2751-2A1F529D8683}"/>
+              </a:ext>
+            </a:extLst>
+          </p:cNvPr>
+          <p:cNvSpPr/>
+          <p:nvPr/>
+        </p:nvSpPr>
+        <p:spPr>
+          <a:xfrm>
+            <a:off x="4572924" y="-25686"/>
+            <a:ext cx="2026517" cy="1200329"/>
+          </a:xfrm>
+          <a:prstGeom prst="rect">
+            <a:avLst/>
+          </a:prstGeom>
+          <a:noFill/>
+        </p:spPr>
+        <p:txBody>
           <a:bodyPr wrap="none" lIns="91440" tIns="45720" rIns="91440" bIns="45720">
             <a:spAutoFit/>
           </a:bodyPr>
@@ -5388,33 +6311,164 @@
           <a:p>
             <a:pPr algn="ctr"/>
             <a:r>
-              <a:rPr lang="en-US" sz="5400" b="1" cap="none" spc="0" dirty="0">
-                <a:ln w="9525">
+              <a:rPr lang="en-US" sz="7200" b="1" cap="none" spc="0" dirty="0">
+                <a:ln w="12700">
                   <a:solidFill>
-                    <a:schemeClr val="bg1"/>
+                    <a:schemeClr val="accent3">
+                      <a:lumMod val="50000"/>
+                    </a:schemeClr>
                   </a:solidFill>
                   <a:prstDash val="solid"/>
                 </a:ln>
                 <a:solidFill>
-                  <a:schemeClr val="tx1"/>
+                  <a:srgbClr val="FFFF00"/>
                 </a:solidFill>
                 <a:effectLst>
-                  <a:outerShdw blurRad="12700" dist="38100" dir="2700000" algn="tl" rotWithShape="0">
-                    <a:schemeClr val="bg1">
+                  <a:innerShdw blurRad="177800">
+                    <a:schemeClr val="accent3">
                       <a:lumMod val="50000"/>
                     </a:schemeClr>
-                  </a:outerShdw>
+                  </a:innerShdw>
                 </a:effectLst>
               </a:rPr>
-              <a:t>Storage</a:t>
-            </a:r>
-          </a:p>
-        </p:txBody>
-      </p:sp>
+              <a:t>Tiles </a:t>
+            </a:r>
+          </a:p>
+        </p:txBody>
+      </p:sp>
+      <p:sp>
+        <p:nvSpPr>
+          <p:cNvPr id="15" name="TextBox 14">
+            <a:extLst>
+              <a:ext uri="{FF2B5EF4-FFF2-40B4-BE49-F238E27FC236}">
+                <a16:creationId xmlns:a16="http://schemas.microsoft.com/office/drawing/2014/main" id="{5F025C5E-E25A-EDE1-CEC0-DCFCD37B070A}"/>
+              </a:ext>
+            </a:extLst>
+          </p:cNvPr>
+          <p:cNvSpPr txBox="1"/>
+          <p:nvPr/>
+        </p:nvSpPr>
+        <p:spPr>
+          <a:xfrm>
+            <a:off x="724371" y="3131924"/>
+            <a:ext cx="11710930" cy="461665"/>
+          </a:xfrm>
+          <a:prstGeom prst="rect">
+            <a:avLst/>
+          </a:prstGeom>
+          <a:noFill/>
+        </p:spPr>
+        <p:txBody>
+          <a:bodyPr wrap="square" rtlCol="0">
+            <a:spAutoFit/>
+          </a:bodyPr>
+          <a:lstStyle/>
+          <a:p>
+            <a:r>
+              <a:rPr lang="en-US" sz="2400" b="1" dirty="0"/>
+              <a:t>ELEMENT</a:t>
+            </a:r>
+            <a:r>
+              <a:rPr lang="en-US" sz="2400" dirty="0"/>
+              <a:t>:</a:t>
+            </a:r>
+          </a:p>
+        </p:txBody>
+      </p:sp>
+      <p:pic>
+        <p:nvPicPr>
+          <p:cNvPr id="17" name="Picture 16">
+            <a:extLst>
+              <a:ext uri="{FF2B5EF4-FFF2-40B4-BE49-F238E27FC236}">
+                <a16:creationId xmlns:a16="http://schemas.microsoft.com/office/drawing/2014/main" id="{F631760B-8642-24CE-030F-E5FAE11A901D}"/>
+              </a:ext>
+            </a:extLst>
+          </p:cNvPr>
+          <p:cNvPicPr>
+            <a:picLocks noChangeAspect="1"/>
+          </p:cNvPicPr>
+          <p:nvPr/>
+        </p:nvPicPr>
+        <p:blipFill>
+          <a:blip r:embed="rId13"/>
+          <a:stretch>
+            <a:fillRect/>
+          </a:stretch>
+        </p:blipFill>
+        <p:spPr>
+          <a:xfrm>
+            <a:off x="10379628" y="58647"/>
+            <a:ext cx="1052789" cy="1072285"/>
+          </a:xfrm>
+          <a:prstGeom prst="rect">
+            <a:avLst/>
+          </a:prstGeom>
+        </p:spPr>
+      </p:pic>
+      <p:pic>
+        <p:nvPicPr>
+          <p:cNvPr id="19" name="Picture 18">
+            <a:extLst>
+              <a:ext uri="{FF2B5EF4-FFF2-40B4-BE49-F238E27FC236}">
+                <a16:creationId xmlns:a16="http://schemas.microsoft.com/office/drawing/2014/main" id="{90CC6CB2-C5A7-02EC-27B8-5DA0A008376D}"/>
+              </a:ext>
+            </a:extLst>
+          </p:cNvPr>
+          <p:cNvPicPr>
+            <a:picLocks noChangeAspect="1"/>
+          </p:cNvPicPr>
+          <p:nvPr/>
+        </p:nvPicPr>
+        <p:blipFill>
+          <a:blip r:embed="rId14"/>
+          <a:stretch>
+            <a:fillRect/>
+          </a:stretch>
+        </p:blipFill>
+        <p:spPr>
+          <a:xfrm>
+            <a:off x="200636" y="85083"/>
+            <a:ext cx="1110927" cy="1110927"/>
+          </a:xfrm>
+          <a:prstGeom prst="rect">
+            <a:avLst/>
+          </a:prstGeom>
+        </p:spPr>
+      </p:pic>
+      <p:pic>
+        <p:nvPicPr>
+          <p:cNvPr id="9" name="Picture 8">
+            <a:extLst>
+              <a:ext uri="{FF2B5EF4-FFF2-40B4-BE49-F238E27FC236}">
+                <a16:creationId xmlns:a16="http://schemas.microsoft.com/office/drawing/2014/main" id="{862D1BA1-5AC0-080A-3E6F-05F5A3CACC8C}"/>
+              </a:ext>
+            </a:extLst>
+          </p:cNvPr>
+          <p:cNvPicPr>
+            <a:picLocks noChangeAspect="1"/>
+          </p:cNvPicPr>
+          <p:nvPr/>
+        </p:nvPicPr>
+        <p:blipFill>
+          <a:blip r:embed="rId15"/>
+          <a:stretch>
+            <a:fillRect/>
+          </a:stretch>
+        </p:blipFill>
+        <p:spPr>
+          <a:xfrm>
+            <a:off x="7749466" y="43190"/>
+            <a:ext cx="1073763" cy="1062578"/>
+          </a:xfrm>
+          <a:prstGeom prst="rect">
+            <a:avLst/>
+          </a:prstGeom>
+        </p:spPr>
+      </p:pic>
     </p:spTree>
     <p:extLst>
       <p:ext uri="{BB962C8B-B14F-4D97-AF65-F5344CB8AC3E}">
-        <p14:creationId xmlns:p14="http://schemas.microsoft.com/office/powerpoint/2010/main" val="4257053615"/>
+        <p14:creationId xmlns:p14="http://schemas.microsoft.com/office/powerpoint/2010/main" val="770881210"/>
       </p:ext>
     </p:extLst>
   </p:cSld>

</xml_diff>

<commit_message>
Finished Alchemy practice 1 and 2
</commit_message>
<xml_diff>
--- a/Assets/How to Play/Instructions.pptx
+++ b/Assets/How to Play/Instructions.pptx
@@ -10,8 +10,6 @@
     <p:sldId id="261" r:id="rId4"/>
     <p:sldId id="264" r:id="rId5"/>
     <p:sldId id="260" r:id="rId6"/>
-    <p:sldId id="259" r:id="rId7"/>
-    <p:sldId id="262" r:id="rId8"/>
   </p:sldIdLst>
   <p:sldSz cx="12192000" cy="6858000"/>
   <p:notesSz cx="6858000" cy="9144000"/>
@@ -273,7 +271,7 @@
           <a:p>
             <a:fld id="{62B14E49-696A-4F24-B720-C8B44559A9DA}" type="datetimeFigureOut">
               <a:rPr lang="en-US" smtClean="0"/>
-              <a:t>9/13/2023</a:t>
+              <a:t>10/2/2023</a:t>
             </a:fld>
             <a:endParaRPr lang="en-US"/>
           </a:p>
@@ -443,7 +441,7 @@
           <a:p>
             <a:fld id="{62B14E49-696A-4F24-B720-C8B44559A9DA}" type="datetimeFigureOut">
               <a:rPr lang="en-US" smtClean="0"/>
-              <a:t>9/13/2023</a:t>
+              <a:t>10/2/2023</a:t>
             </a:fld>
             <a:endParaRPr lang="en-US"/>
           </a:p>
@@ -623,7 +621,7 @@
           <a:p>
             <a:fld id="{62B14E49-696A-4F24-B720-C8B44559A9DA}" type="datetimeFigureOut">
               <a:rPr lang="en-US" smtClean="0"/>
-              <a:t>9/13/2023</a:t>
+              <a:t>10/2/2023</a:t>
             </a:fld>
             <a:endParaRPr lang="en-US"/>
           </a:p>
@@ -793,7 +791,7 @@
           <a:p>
             <a:fld id="{62B14E49-696A-4F24-B720-C8B44559A9DA}" type="datetimeFigureOut">
               <a:rPr lang="en-US" smtClean="0"/>
-              <a:t>9/13/2023</a:t>
+              <a:t>10/2/2023</a:t>
             </a:fld>
             <a:endParaRPr lang="en-US"/>
           </a:p>
@@ -1057,7 +1055,7 @@
           <a:p>
             <a:fld id="{62B14E49-696A-4F24-B720-C8B44559A9DA}" type="datetimeFigureOut">
               <a:rPr lang="en-US" smtClean="0"/>
-              <a:t>9/13/2023</a:t>
+              <a:t>10/2/2023</a:t>
             </a:fld>
             <a:endParaRPr lang="en-US"/>
           </a:p>
@@ -1345,7 +1343,7 @@
           <a:p>
             <a:fld id="{62B14E49-696A-4F24-B720-C8B44559A9DA}" type="datetimeFigureOut">
               <a:rPr lang="en-US" smtClean="0"/>
-              <a:t>9/13/2023</a:t>
+              <a:t>10/2/2023</a:t>
             </a:fld>
             <a:endParaRPr lang="en-US"/>
           </a:p>
@@ -1774,7 +1772,7 @@
           <a:p>
             <a:fld id="{62B14E49-696A-4F24-B720-C8B44559A9DA}" type="datetimeFigureOut">
               <a:rPr lang="en-US" smtClean="0"/>
-              <a:t>9/13/2023</a:t>
+              <a:t>10/2/2023</a:t>
             </a:fld>
             <a:endParaRPr lang="en-US"/>
           </a:p>
@@ -1892,7 +1890,7 @@
           <a:p>
             <a:fld id="{62B14E49-696A-4F24-B720-C8B44559A9DA}" type="datetimeFigureOut">
               <a:rPr lang="en-US" smtClean="0"/>
-              <a:t>9/13/2023</a:t>
+              <a:t>10/2/2023</a:t>
             </a:fld>
             <a:endParaRPr lang="en-US"/>
           </a:p>
@@ -1987,7 +1985,7 @@
           <a:p>
             <a:fld id="{62B14E49-696A-4F24-B720-C8B44559A9DA}" type="datetimeFigureOut">
               <a:rPr lang="en-US" smtClean="0"/>
-              <a:t>9/13/2023</a:t>
+              <a:t>10/2/2023</a:t>
             </a:fld>
             <a:endParaRPr lang="en-US"/>
           </a:p>
@@ -2343,7 +2341,7 @@
           <a:p>
             <a:fld id="{62B14E49-696A-4F24-B720-C8B44559A9DA}" type="datetimeFigureOut">
               <a:rPr lang="en-US" smtClean="0"/>
-              <a:t>9/13/2023</a:t>
+              <a:t>10/2/2023</a:t>
             </a:fld>
             <a:endParaRPr lang="en-US"/>
           </a:p>
@@ -2646,7 +2644,7 @@
           <a:p>
             <a:fld id="{62B14E49-696A-4F24-B720-C8B44559A9DA}" type="datetimeFigureOut">
               <a:rPr lang="en-US" smtClean="0"/>
-              <a:t>9/13/2023</a:t>
+              <a:t>10/2/2023</a:t>
             </a:fld>
             <a:endParaRPr lang="en-US"/>
           </a:p>
@@ -2859,7 +2857,7 @@
           <a:p>
             <a:fld id="{62B14E49-696A-4F24-B720-C8B44559A9DA}" type="datetimeFigureOut">
               <a:rPr lang="en-US" smtClean="0"/>
-              <a:t>9/13/2023</a:t>
+              <a:t>10/2/2023</a:t>
             </a:fld>
             <a:endParaRPr lang="en-US"/>
           </a:p>
@@ -4812,7 +4810,7 @@
         <p:spPr>
           <a:xfrm>
             <a:off x="749675" y="2100568"/>
-            <a:ext cx="9391852" cy="4093428"/>
+            <a:ext cx="9391852" cy="3785652"/>
           </a:xfrm>
           <a:prstGeom prst="rect">
             <a:avLst/>
@@ -4930,7 +4928,15 @@
             </a:pPr>
             <a:r>
               <a:rPr lang="en-US" sz="2000" dirty="0"/>
-              <a:t>Each experiment is a separate set that does not contribute to the shape and letter counts relevant to other experiments</a:t>
+              <a:t>Each experiment is a distinct alchemical set, </a:t>
+            </a:r>
+            <a:r>
+              <a:rPr lang="en-US" sz="2000" dirty="0" err="1"/>
+              <a:t>seperate</a:t>
+            </a:r>
+            <a:r>
+              <a:rPr lang="en-US" sz="2000" dirty="0"/>
+              <a:t> from other experiments</a:t>
             </a:r>
           </a:p>
         </p:txBody>
@@ -5489,986 +5495,6 @@
     <p:extLst>
       <p:ext uri="{BB962C8B-B14F-4D97-AF65-F5344CB8AC3E}">
         <p14:creationId xmlns:p14="http://schemas.microsoft.com/office/powerpoint/2010/main" val="2558907806"/>
-      </p:ext>
-    </p:extLst>
-  </p:cSld>
-  <p:clrMapOvr>
-    <a:masterClrMapping/>
-  </p:clrMapOvr>
-</p:sld>
-</file>
-
-<file path=ppt/slides/slide6.xml><?xml version="1.0" encoding="utf-8"?>
-<p:sld xmlns:a="http://schemas.openxmlformats.org/drawingml/2006/main" xmlns:r="http://schemas.openxmlformats.org/officeDocument/2006/relationships" xmlns:p="http://schemas.openxmlformats.org/presentationml/2006/main">
-  <p:cSld>
-    <p:spTree>
-      <p:nvGrpSpPr>
-        <p:cNvPr id="1" name=""/>
-        <p:cNvGrpSpPr/>
-        <p:nvPr/>
-      </p:nvGrpSpPr>
-      <p:grpSpPr>
-        <a:xfrm>
-          <a:off x="0" y="0"/>
-          <a:ext cx="0" cy="0"/>
-          <a:chOff x="0" y="0"/>
-          <a:chExt cx="0" cy="0"/>
-        </a:xfrm>
-      </p:grpSpPr>
-      <p:sp>
-        <p:nvSpPr>
-          <p:cNvPr id="6" name="TextBox 5">
-            <a:extLst>
-              <a:ext uri="{FF2B5EF4-FFF2-40B4-BE49-F238E27FC236}">
-                <a16:creationId xmlns:a16="http://schemas.microsoft.com/office/drawing/2014/main" id="{F5D13BBC-3AAE-1FE0-C9A7-74F23D4FAC05}"/>
-              </a:ext>
-            </a:extLst>
-          </p:cNvPr>
-          <p:cNvSpPr txBox="1"/>
-          <p:nvPr/>
-        </p:nvSpPr>
-        <p:spPr>
-          <a:xfrm>
-            <a:off x="1287136" y="120318"/>
-            <a:ext cx="7855027" cy="523220"/>
-          </a:xfrm>
-          <a:prstGeom prst="rect">
-            <a:avLst/>
-          </a:prstGeom>
-          <a:noFill/>
-        </p:spPr>
-        <p:txBody>
-          <a:bodyPr wrap="square" rtlCol="0">
-            <a:spAutoFit/>
-          </a:bodyPr>
-          <a:lstStyle/>
-          <a:p>
-            <a:r>
-              <a:rPr lang="en-US" sz="2800" dirty="0"/>
-              <a:t>All active experiments are subject to </a:t>
-            </a:r>
-            <a:r>
-              <a:rPr lang="en-US" sz="2800" i="1" dirty="0"/>
-              <a:t>alchemical laws</a:t>
-            </a:r>
-          </a:p>
-        </p:txBody>
-      </p:sp>
-      <p:sp>
-        <p:nvSpPr>
-          <p:cNvPr id="7" name="TextBox 6">
-            <a:extLst>
-              <a:ext uri="{FF2B5EF4-FFF2-40B4-BE49-F238E27FC236}">
-                <a16:creationId xmlns:a16="http://schemas.microsoft.com/office/drawing/2014/main" id="{1B1DEE8C-BA0C-7E1A-5B0B-703E87C4DDD2}"/>
-              </a:ext>
-            </a:extLst>
-          </p:cNvPr>
-          <p:cNvSpPr txBox="1"/>
-          <p:nvPr/>
-        </p:nvSpPr>
-        <p:spPr>
-          <a:xfrm>
-            <a:off x="1022148" y="715113"/>
-            <a:ext cx="9038671" cy="1631216"/>
-          </a:xfrm>
-          <a:prstGeom prst="rect">
-            <a:avLst/>
-          </a:prstGeom>
-          <a:noFill/>
-        </p:spPr>
-        <p:txBody>
-          <a:bodyPr wrap="square" rtlCol="0">
-            <a:spAutoFit/>
-          </a:bodyPr>
-          <a:lstStyle/>
-          <a:p>
-            <a:pPr marL="285750" indent="-285750">
-              <a:buFont typeface="Arial" panose="020B0604020202020204" pitchFamily="34" charset="0"/>
-              <a:buChar char="•"/>
-            </a:pPr>
-            <a:r>
-              <a:rPr lang="en-US" sz="2000" dirty="0"/>
-              <a:t>Experiments are only active if they have at least 3 essences in them</a:t>
-            </a:r>
-          </a:p>
-          <a:p>
-            <a:pPr marL="285750" indent="-285750">
-              <a:buFont typeface="Arial" panose="020B0604020202020204" pitchFamily="34" charset="0"/>
-              <a:buChar char="•"/>
-            </a:pPr>
-            <a:r>
-              <a:rPr lang="en-US" sz="2000" dirty="0"/>
-              <a:t>Inactive experiments are automatically considered stable</a:t>
-            </a:r>
-          </a:p>
-          <a:p>
-            <a:pPr marL="285750" indent="-285750">
-              <a:buFont typeface="Arial" panose="020B0604020202020204" pitchFamily="34" charset="0"/>
-              <a:buChar char="•"/>
-            </a:pPr>
-            <a:r>
-              <a:rPr lang="en-US" sz="2000" dirty="0"/>
-              <a:t>Active experiments are stable only if they do not violate any </a:t>
-            </a:r>
-            <a:r>
-              <a:rPr lang="en-US" sz="2000" i="1" dirty="0"/>
-              <a:t>alchemical laws</a:t>
-            </a:r>
-          </a:p>
-          <a:p>
-            <a:pPr marL="285750" indent="-285750">
-              <a:buFont typeface="Arial" panose="020B0604020202020204" pitchFamily="34" charset="0"/>
-              <a:buChar char="•"/>
-            </a:pPr>
-            <a:endParaRPr lang="en-US" sz="2000" dirty="0"/>
-          </a:p>
-          <a:p>
-            <a:pPr marL="285750" indent="-285750">
-              <a:buFont typeface="Arial" panose="020B0604020202020204" pitchFamily="34" charset="0"/>
-              <a:buChar char="•"/>
-            </a:pPr>
-            <a:r>
-              <a:rPr lang="en-US" sz="2000" dirty="0"/>
-              <a:t>The laws of Alchemy apply </a:t>
-            </a:r>
-            <a:r>
-              <a:rPr lang="en-US" sz="2000" b="1" dirty="0"/>
-              <a:t>separately</a:t>
-            </a:r>
-            <a:r>
-              <a:rPr lang="en-US" sz="2000" dirty="0"/>
-              <a:t> to both  shapes and letters</a:t>
-            </a:r>
-          </a:p>
-        </p:txBody>
-      </p:sp>
-      <p:sp>
-        <p:nvSpPr>
-          <p:cNvPr id="9" name="Rectangle 8">
-            <a:extLst>
-              <a:ext uri="{FF2B5EF4-FFF2-40B4-BE49-F238E27FC236}">
-                <a16:creationId xmlns:a16="http://schemas.microsoft.com/office/drawing/2014/main" id="{DE4E726F-FD1E-E37B-E68E-288346F33573}"/>
-              </a:ext>
-            </a:extLst>
-          </p:cNvPr>
-          <p:cNvSpPr/>
-          <p:nvPr/>
-        </p:nvSpPr>
-        <p:spPr>
-          <a:xfrm>
-            <a:off x="1335428" y="2291627"/>
-            <a:ext cx="2882196" cy="1754326"/>
-          </a:xfrm>
-          <a:prstGeom prst="rect">
-            <a:avLst/>
-          </a:prstGeom>
-          <a:noFill/>
-        </p:spPr>
-        <p:txBody>
-          <a:bodyPr wrap="square" lIns="91440" tIns="45720" rIns="91440" bIns="45720">
-            <a:spAutoFit/>
-          </a:bodyPr>
-          <a:lstStyle/>
-          <a:p>
-            <a:pPr algn="ctr"/>
-            <a:r>
-              <a:rPr lang="en-US" sz="5400" b="1" cap="none" spc="0" dirty="0">
-                <a:ln w="12700" cmpd="sng">
-                  <a:solidFill>
-                    <a:schemeClr val="accent4"/>
-                  </a:solidFill>
-                  <a:prstDash val="solid"/>
-                </a:ln>
-                <a:gradFill>
-                  <a:gsLst>
-                    <a:gs pos="0">
-                      <a:schemeClr val="accent4"/>
-                    </a:gs>
-                    <a:gs pos="4000">
-                      <a:schemeClr val="accent4">
-                        <a:lumMod val="60000"/>
-                        <a:lumOff val="40000"/>
-                      </a:schemeClr>
-                    </a:gs>
-                    <a:gs pos="87000">
-                      <a:schemeClr val="accent4">
-                        <a:lumMod val="20000"/>
-                        <a:lumOff val="80000"/>
-                      </a:schemeClr>
-                    </a:gs>
-                  </a:gsLst>
-                  <a:lin ang="5400000"/>
-                </a:gradFill>
-                <a:effectLst/>
-              </a:rPr>
-              <a:t>Alchemy law #1</a:t>
-            </a:r>
-          </a:p>
-        </p:txBody>
-      </p:sp>
-      <p:sp>
-        <p:nvSpPr>
-          <p:cNvPr id="12" name="Rectangle 11">
-            <a:extLst>
-              <a:ext uri="{FF2B5EF4-FFF2-40B4-BE49-F238E27FC236}">
-                <a16:creationId xmlns:a16="http://schemas.microsoft.com/office/drawing/2014/main" id="{BF1BD244-50B9-906E-F93D-AD61EAA78FE9}"/>
-              </a:ext>
-            </a:extLst>
-          </p:cNvPr>
-          <p:cNvSpPr/>
-          <p:nvPr/>
-        </p:nvSpPr>
-        <p:spPr>
-          <a:xfrm>
-            <a:off x="6259967" y="2255948"/>
-            <a:ext cx="2882196" cy="1754326"/>
-          </a:xfrm>
-          <a:prstGeom prst="rect">
-            <a:avLst/>
-          </a:prstGeom>
-          <a:noFill/>
-        </p:spPr>
-        <p:txBody>
-          <a:bodyPr wrap="square" lIns="91440" tIns="45720" rIns="91440" bIns="45720">
-            <a:spAutoFit/>
-          </a:bodyPr>
-          <a:lstStyle/>
-          <a:p>
-            <a:pPr algn="ctr"/>
-            <a:r>
-              <a:rPr lang="en-US" sz="5400" b="1" cap="none" spc="0" dirty="0">
-                <a:ln w="12700" cmpd="sng">
-                  <a:solidFill>
-                    <a:schemeClr val="accent4"/>
-                  </a:solidFill>
-                  <a:prstDash val="solid"/>
-                </a:ln>
-                <a:gradFill>
-                  <a:gsLst>
-                    <a:gs pos="0">
-                      <a:schemeClr val="accent4"/>
-                    </a:gs>
-                    <a:gs pos="4000">
-                      <a:schemeClr val="accent4">
-                        <a:lumMod val="60000"/>
-                        <a:lumOff val="40000"/>
-                      </a:schemeClr>
-                    </a:gs>
-                    <a:gs pos="87000">
-                      <a:schemeClr val="accent4">
-                        <a:lumMod val="20000"/>
-                        <a:lumOff val="80000"/>
-                      </a:schemeClr>
-                    </a:gs>
-                  </a:gsLst>
-                  <a:lin ang="5400000"/>
-                </a:gradFill>
-                <a:effectLst/>
-              </a:rPr>
-              <a:t>Alchemy law #2</a:t>
-            </a:r>
-          </a:p>
-        </p:txBody>
-      </p:sp>
-      <p:sp>
-        <p:nvSpPr>
-          <p:cNvPr id="13" name="TextBox 12">
-            <a:extLst>
-              <a:ext uri="{FF2B5EF4-FFF2-40B4-BE49-F238E27FC236}">
-                <a16:creationId xmlns:a16="http://schemas.microsoft.com/office/drawing/2014/main" id="{A6D3359F-B296-7E7C-7195-FA97D21A04D5}"/>
-              </a:ext>
-            </a:extLst>
-          </p:cNvPr>
-          <p:cNvSpPr txBox="1"/>
-          <p:nvPr/>
-        </p:nvSpPr>
-        <p:spPr>
-          <a:xfrm>
-            <a:off x="550843" y="4387476"/>
-            <a:ext cx="4990641" cy="1785104"/>
-          </a:xfrm>
-          <a:prstGeom prst="rect">
-            <a:avLst/>
-          </a:prstGeom>
-          <a:noFill/>
-        </p:spPr>
-        <p:txBody>
-          <a:bodyPr wrap="square" rtlCol="0">
-            <a:spAutoFit/>
-          </a:bodyPr>
-          <a:lstStyle/>
-          <a:p>
-            <a:r>
-              <a:rPr lang="en-US" dirty="0"/>
-              <a:t>			</a:t>
-            </a:r>
-            <a:r>
-              <a:rPr lang="en-US" sz="2000" dirty="0"/>
-              <a:t>(anti-equality rule)</a:t>
-            </a:r>
-          </a:p>
-          <a:p>
-            <a:pPr marL="285750" indent="-285750">
-              <a:buFont typeface="Arial" panose="020B0604020202020204" pitchFamily="34" charset="0"/>
-              <a:buChar char="•"/>
-            </a:pPr>
-            <a:r>
-              <a:rPr lang="en-US" dirty="0"/>
-              <a:t>An experiment can not have an equal count of two different shapes</a:t>
-            </a:r>
-          </a:p>
-          <a:p>
-            <a:pPr marL="285750" indent="-285750">
-              <a:buFont typeface="Arial" panose="020B0604020202020204" pitchFamily="34" charset="0"/>
-              <a:buChar char="•"/>
-            </a:pPr>
-            <a:endParaRPr lang="en-US" dirty="0"/>
-          </a:p>
-          <a:p>
-            <a:pPr marL="285750" indent="-285750">
-              <a:buFont typeface="Arial" panose="020B0604020202020204" pitchFamily="34" charset="0"/>
-              <a:buChar char="•"/>
-            </a:pPr>
-            <a:r>
-              <a:rPr lang="en-US" dirty="0"/>
-              <a:t>An experiment can not have an equal count of two different letters </a:t>
-            </a:r>
-          </a:p>
-        </p:txBody>
-      </p:sp>
-      <p:sp>
-        <p:nvSpPr>
-          <p:cNvPr id="2" name="TextBox 1">
-            <a:extLst>
-              <a:ext uri="{FF2B5EF4-FFF2-40B4-BE49-F238E27FC236}">
-                <a16:creationId xmlns:a16="http://schemas.microsoft.com/office/drawing/2014/main" id="{AECBD692-0EE1-B641-3A1F-A9D9E0E8A3EC}"/>
-              </a:ext>
-            </a:extLst>
-          </p:cNvPr>
-          <p:cNvSpPr txBox="1"/>
-          <p:nvPr/>
-        </p:nvSpPr>
-        <p:spPr>
-          <a:xfrm>
-            <a:off x="5914221" y="4387476"/>
-            <a:ext cx="4990641" cy="1785104"/>
-          </a:xfrm>
-          <a:prstGeom prst="rect">
-            <a:avLst/>
-          </a:prstGeom>
-          <a:noFill/>
-        </p:spPr>
-        <p:txBody>
-          <a:bodyPr wrap="square" rtlCol="0">
-            <a:spAutoFit/>
-          </a:bodyPr>
-          <a:lstStyle/>
-          <a:p>
-            <a:r>
-              <a:rPr lang="en-US" dirty="0"/>
-              <a:t>		</a:t>
-            </a:r>
-            <a:r>
-              <a:rPr lang="en-US" sz="2000" dirty="0"/>
-              <a:t>	(anti-majority rule)</a:t>
-            </a:r>
-          </a:p>
-          <a:p>
-            <a:pPr marL="285750" indent="-285750">
-              <a:buFont typeface="Arial" panose="020B0604020202020204" pitchFamily="34" charset="0"/>
-              <a:buChar char="•"/>
-            </a:pPr>
-            <a:r>
-              <a:rPr lang="en-US" dirty="0"/>
-              <a:t>An experiment can not have more of any shape than all its </a:t>
-            </a:r>
-            <a:r>
-              <a:rPr lang="en-US"/>
-              <a:t>other shapes </a:t>
-            </a:r>
-            <a:r>
-              <a:rPr lang="en-US" dirty="0"/>
-              <a:t>combined</a:t>
-            </a:r>
-          </a:p>
-          <a:p>
-            <a:pPr marL="285750" indent="-285750">
-              <a:buFont typeface="Arial" panose="020B0604020202020204" pitchFamily="34" charset="0"/>
-              <a:buChar char="•"/>
-            </a:pPr>
-            <a:endParaRPr lang="en-US" dirty="0"/>
-          </a:p>
-          <a:p>
-            <a:pPr marL="285750" indent="-285750">
-              <a:buFont typeface="Arial" panose="020B0604020202020204" pitchFamily="34" charset="0"/>
-              <a:buChar char="•"/>
-            </a:pPr>
-            <a:r>
-              <a:rPr lang="en-US" dirty="0"/>
-              <a:t>An experiment can not have more of any letter  than all its other letters combined</a:t>
-            </a:r>
-          </a:p>
-        </p:txBody>
-      </p:sp>
-    </p:spTree>
-    <p:extLst>
-      <p:ext uri="{BB962C8B-B14F-4D97-AF65-F5344CB8AC3E}">
-        <p14:creationId xmlns:p14="http://schemas.microsoft.com/office/powerpoint/2010/main" val="2685666678"/>
-      </p:ext>
-    </p:extLst>
-  </p:cSld>
-  <p:clrMapOvr>
-    <a:masterClrMapping/>
-  </p:clrMapOvr>
-</p:sld>
-</file>
-
-<file path=ppt/slides/slide7.xml><?xml version="1.0" encoding="utf-8"?>
-<p:sld xmlns:a="http://schemas.openxmlformats.org/drawingml/2006/main" xmlns:r="http://schemas.openxmlformats.org/officeDocument/2006/relationships" xmlns:p="http://schemas.openxmlformats.org/presentationml/2006/main">
-  <p:cSld>
-    <p:spTree>
-      <p:nvGrpSpPr>
-        <p:cNvPr id="1" name=""/>
-        <p:cNvGrpSpPr/>
-        <p:nvPr/>
-      </p:nvGrpSpPr>
-      <p:grpSpPr>
-        <a:xfrm>
-          <a:off x="0" y="0"/>
-          <a:ext cx="0" cy="0"/>
-          <a:chOff x="0" y="0"/>
-          <a:chExt cx="0" cy="0"/>
-        </a:xfrm>
-      </p:grpSpPr>
-      <p:pic>
-        <p:nvPicPr>
-          <p:cNvPr id="4" name="Graphic 3">
-            <a:extLst>
-              <a:ext uri="{FF2B5EF4-FFF2-40B4-BE49-F238E27FC236}">
-                <a16:creationId xmlns:a16="http://schemas.microsoft.com/office/drawing/2014/main" id="{73F1059C-DCFD-0DDA-A5BA-3177DA24EAAA}"/>
-              </a:ext>
-            </a:extLst>
-          </p:cNvPr>
-          <p:cNvPicPr>
-            <a:picLocks noChangeAspect="1"/>
-          </p:cNvPicPr>
-          <p:nvPr/>
-        </p:nvPicPr>
-        <p:blipFill>
-          <a:blip r:embed="rId2">
-            <a:extLst>
-              <a:ext uri="{28A0092B-C50C-407E-A947-70E740481C1C}">
-                <a14:useLocalDpi xmlns:a14="http://schemas.microsoft.com/office/drawing/2010/main" val="0"/>
-              </a:ext>
-              <a:ext uri="{96DAC541-7B7A-43D3-8B79-37D633B846F1}">
-                <asvg:svgBlip xmlns:asvg="http://schemas.microsoft.com/office/drawing/2016/SVG/main" r:embed="rId3"/>
-              </a:ext>
-            </a:extLst>
-          </a:blip>
-          <a:stretch>
-            <a:fillRect/>
-          </a:stretch>
-        </p:blipFill>
-        <p:spPr>
-          <a:xfrm>
-            <a:off x="5031711" y="4162590"/>
-            <a:ext cx="1234144" cy="1234144"/>
-          </a:xfrm>
-          <a:prstGeom prst="rect">
-            <a:avLst/>
-          </a:prstGeom>
-        </p:spPr>
-      </p:pic>
-      <p:pic>
-        <p:nvPicPr>
-          <p:cNvPr id="5" name="Graphic 4">
-            <a:extLst>
-              <a:ext uri="{FF2B5EF4-FFF2-40B4-BE49-F238E27FC236}">
-                <a16:creationId xmlns:a16="http://schemas.microsoft.com/office/drawing/2014/main" id="{FEF5CD53-F0ED-2CBC-3C52-D95995A7598E}"/>
-              </a:ext>
-            </a:extLst>
-          </p:cNvPr>
-          <p:cNvPicPr>
-            <a:picLocks noChangeAspect="1"/>
-          </p:cNvPicPr>
-          <p:nvPr/>
-        </p:nvPicPr>
-        <p:blipFill>
-          <a:blip r:embed="rId4">
-            <a:extLst>
-              <a:ext uri="{28A0092B-C50C-407E-A947-70E740481C1C}">
-                <a14:useLocalDpi xmlns:a14="http://schemas.microsoft.com/office/drawing/2010/main" val="0"/>
-              </a:ext>
-              <a:ext uri="{96DAC541-7B7A-43D3-8B79-37D633B846F1}">
-                <asvg:svgBlip xmlns:asvg="http://schemas.microsoft.com/office/drawing/2016/SVG/main" r:embed="rId5"/>
-              </a:ext>
-            </a:extLst>
-          </a:blip>
-          <a:stretch>
-            <a:fillRect/>
-          </a:stretch>
-        </p:blipFill>
-        <p:spPr>
-          <a:xfrm>
-            <a:off x="6875252" y="4166254"/>
-            <a:ext cx="1234144" cy="1234144"/>
-          </a:xfrm>
-          <a:prstGeom prst="rect">
-            <a:avLst/>
-          </a:prstGeom>
-        </p:spPr>
-      </p:pic>
-      <p:pic>
-        <p:nvPicPr>
-          <p:cNvPr id="6" name="Graphic 5">
-            <a:extLst>
-              <a:ext uri="{FF2B5EF4-FFF2-40B4-BE49-F238E27FC236}">
-                <a16:creationId xmlns:a16="http://schemas.microsoft.com/office/drawing/2014/main" id="{8147F001-8303-E59D-B757-D4879E1238CE}"/>
-              </a:ext>
-            </a:extLst>
-          </p:cNvPr>
-          <p:cNvPicPr>
-            <a:picLocks noChangeAspect="1"/>
-          </p:cNvPicPr>
-          <p:nvPr/>
-        </p:nvPicPr>
-        <p:blipFill>
-          <a:blip r:embed="rId6">
-            <a:extLst>
-              <a:ext uri="{28A0092B-C50C-407E-A947-70E740481C1C}">
-                <a14:useLocalDpi xmlns:a14="http://schemas.microsoft.com/office/drawing/2010/main" val="0"/>
-              </a:ext>
-              <a:ext uri="{96DAC541-7B7A-43D3-8B79-37D633B846F1}">
-                <asvg:svgBlip xmlns:asvg="http://schemas.microsoft.com/office/drawing/2016/SVG/main" r:embed="rId7"/>
-              </a:ext>
-            </a:extLst>
-          </a:blip>
-          <a:stretch>
-            <a:fillRect/>
-          </a:stretch>
-        </p:blipFill>
-        <p:spPr>
-          <a:xfrm>
-            <a:off x="8640845" y="4198716"/>
-            <a:ext cx="1234144" cy="1234144"/>
-          </a:xfrm>
-          <a:prstGeom prst="rect">
-            <a:avLst/>
-          </a:prstGeom>
-        </p:spPr>
-      </p:pic>
-      <p:pic>
-        <p:nvPicPr>
-          <p:cNvPr id="7" name="Graphic 6">
-            <a:extLst>
-              <a:ext uri="{FF2B5EF4-FFF2-40B4-BE49-F238E27FC236}">
-                <a16:creationId xmlns:a16="http://schemas.microsoft.com/office/drawing/2014/main" id="{781CDEDE-6A18-0654-A738-EAB36D954D11}"/>
-              </a:ext>
-            </a:extLst>
-          </p:cNvPr>
-          <p:cNvPicPr>
-            <a:picLocks noChangeAspect="1"/>
-          </p:cNvPicPr>
-          <p:nvPr/>
-        </p:nvPicPr>
-        <p:blipFill>
-          <a:blip r:embed="rId8">
-            <a:extLst>
-              <a:ext uri="{28A0092B-C50C-407E-A947-70E740481C1C}">
-                <a14:useLocalDpi xmlns:a14="http://schemas.microsoft.com/office/drawing/2010/main" val="0"/>
-              </a:ext>
-              <a:ext uri="{96DAC541-7B7A-43D3-8B79-37D633B846F1}">
-                <asvg:svgBlip xmlns:asvg="http://schemas.microsoft.com/office/drawing/2016/SVG/main" r:embed="rId9"/>
-              </a:ext>
-            </a:extLst>
-          </a:blip>
-          <a:stretch>
-            <a:fillRect/>
-          </a:stretch>
-        </p:blipFill>
-        <p:spPr>
-          <a:xfrm>
-            <a:off x="3266118" y="4198716"/>
-            <a:ext cx="1234144" cy="1234144"/>
-          </a:xfrm>
-          <a:prstGeom prst="rect">
-            <a:avLst/>
-          </a:prstGeom>
-        </p:spPr>
-      </p:pic>
-      <p:pic>
-        <p:nvPicPr>
-          <p:cNvPr id="8" name="Graphic 7">
-            <a:extLst>
-              <a:ext uri="{FF2B5EF4-FFF2-40B4-BE49-F238E27FC236}">
-                <a16:creationId xmlns:a16="http://schemas.microsoft.com/office/drawing/2014/main" id="{61BBAC08-F96B-B7AB-890D-E93D5D378913}"/>
-              </a:ext>
-            </a:extLst>
-          </p:cNvPr>
-          <p:cNvPicPr>
-            <a:picLocks noChangeAspect="1"/>
-          </p:cNvPicPr>
-          <p:nvPr/>
-        </p:nvPicPr>
-        <p:blipFill>
-          <a:blip r:embed="rId10">
-            <a:extLst>
-              <a:ext uri="{28A0092B-C50C-407E-A947-70E740481C1C}">
-                <a14:useLocalDpi xmlns:a14="http://schemas.microsoft.com/office/drawing/2010/main" val="0"/>
-              </a:ext>
-              <a:ext uri="{96DAC541-7B7A-43D3-8B79-37D633B846F1}">
-                <asvg:svgBlip xmlns:asvg="http://schemas.microsoft.com/office/drawing/2016/SVG/main" r:embed="rId11"/>
-              </a:ext>
-            </a:extLst>
-          </a:blip>
-          <a:stretch>
-            <a:fillRect/>
-          </a:stretch>
-        </p:blipFill>
-        <p:spPr>
-          <a:xfrm>
-            <a:off x="1460188" y="4187368"/>
-            <a:ext cx="1236554" cy="1236554"/>
-          </a:xfrm>
-          <a:prstGeom prst="rect">
-            <a:avLst/>
-          </a:prstGeom>
-        </p:spPr>
-      </p:pic>
-      <p:sp>
-        <p:nvSpPr>
-          <p:cNvPr id="10" name="TextBox 9">
-            <a:extLst>
-              <a:ext uri="{FF2B5EF4-FFF2-40B4-BE49-F238E27FC236}">
-                <a16:creationId xmlns:a16="http://schemas.microsoft.com/office/drawing/2014/main" id="{866BBFB8-FBD0-6BC2-76E2-74AF08382FF5}"/>
-              </a:ext>
-            </a:extLst>
-          </p:cNvPr>
-          <p:cNvSpPr txBox="1"/>
-          <p:nvPr/>
-        </p:nvSpPr>
-        <p:spPr>
-          <a:xfrm>
-            <a:off x="4166550" y="2502892"/>
-            <a:ext cx="5015797" cy="369332"/>
-          </a:xfrm>
-          <a:prstGeom prst="rect">
-            <a:avLst/>
-          </a:prstGeom>
-          <a:noFill/>
-        </p:spPr>
-        <p:txBody>
-          <a:bodyPr wrap="square" rtlCol="0">
-            <a:spAutoFit/>
-          </a:bodyPr>
-          <a:lstStyle/>
-          <a:p>
-            <a:r>
-              <a:rPr lang="en-US" dirty="0"/>
-              <a:t>Each tile has 2 attributes:</a:t>
-            </a:r>
-          </a:p>
-        </p:txBody>
-      </p:sp>
-      <p:sp>
-        <p:nvSpPr>
-          <p:cNvPr id="11" name="TextBox 10">
-            <a:extLst>
-              <a:ext uri="{FF2B5EF4-FFF2-40B4-BE49-F238E27FC236}">
-                <a16:creationId xmlns:a16="http://schemas.microsoft.com/office/drawing/2014/main" id="{E5CE3D7D-8103-DCD7-93AA-36D470DFE62A}"/>
-              </a:ext>
-            </a:extLst>
-          </p:cNvPr>
-          <p:cNvSpPr txBox="1"/>
-          <p:nvPr/>
-        </p:nvSpPr>
-        <p:spPr>
-          <a:xfrm>
-            <a:off x="724371" y="5692560"/>
-            <a:ext cx="8133191" cy="769441"/>
-          </a:xfrm>
-          <a:prstGeom prst="rect">
-            <a:avLst/>
-          </a:prstGeom>
-          <a:noFill/>
-        </p:spPr>
-        <p:txBody>
-          <a:bodyPr wrap="square" rtlCol="0">
-            <a:spAutoFit/>
-          </a:bodyPr>
-          <a:lstStyle/>
-          <a:p>
-            <a:r>
-              <a:rPr lang="en-US" sz="2200" b="1" dirty="0"/>
-              <a:t>LETTER:</a:t>
-            </a:r>
-            <a:r>
-              <a:rPr lang="en-US" sz="2200" dirty="0"/>
-              <a:t>  Each essence is randomly generated with a letter A-F, </a:t>
-            </a:r>
-          </a:p>
-          <a:p>
-            <a:r>
-              <a:rPr lang="en-US" sz="2200" dirty="0"/>
-              <a:t>There is no guaranteed amount for any letter</a:t>
-            </a:r>
-          </a:p>
-        </p:txBody>
-      </p:sp>
-      <p:pic>
-        <p:nvPicPr>
-          <p:cNvPr id="12" name="Picture 11">
-            <a:extLst>
-              <a:ext uri="{FF2B5EF4-FFF2-40B4-BE49-F238E27FC236}">
-                <a16:creationId xmlns:a16="http://schemas.microsoft.com/office/drawing/2014/main" id="{E758F92E-EA60-450F-3D31-E724B3706E6B}"/>
-              </a:ext>
-            </a:extLst>
-          </p:cNvPr>
-          <p:cNvPicPr>
-            <a:picLocks noChangeAspect="1"/>
-          </p:cNvPicPr>
-          <p:nvPr/>
-        </p:nvPicPr>
-        <p:blipFill>
-          <a:blip r:embed="rId12"/>
-          <a:stretch>
-            <a:fillRect/>
-          </a:stretch>
-        </p:blipFill>
-        <p:spPr>
-          <a:xfrm>
-            <a:off x="2390723" y="44231"/>
-            <a:ext cx="1084123" cy="1061537"/>
-          </a:xfrm>
-          <a:prstGeom prst="rect">
-            <a:avLst/>
-          </a:prstGeom>
-        </p:spPr>
-      </p:pic>
-      <p:sp>
-        <p:nvSpPr>
-          <p:cNvPr id="13" name="TextBox 12">
-            <a:extLst>
-              <a:ext uri="{FF2B5EF4-FFF2-40B4-BE49-F238E27FC236}">
-                <a16:creationId xmlns:a16="http://schemas.microsoft.com/office/drawing/2014/main" id="{575EA97B-BBE4-2935-93CC-AFB03DFD3544}"/>
-              </a:ext>
-            </a:extLst>
-          </p:cNvPr>
-          <p:cNvSpPr txBox="1"/>
-          <p:nvPr/>
-        </p:nvSpPr>
-        <p:spPr>
-          <a:xfrm>
-            <a:off x="1019787" y="3617835"/>
-            <a:ext cx="8487770" cy="461665"/>
-          </a:xfrm>
-          <a:prstGeom prst="rect">
-            <a:avLst/>
-          </a:prstGeom>
-          <a:noFill/>
-        </p:spPr>
-        <p:txBody>
-          <a:bodyPr wrap="square" rtlCol="0">
-            <a:spAutoFit/>
-          </a:bodyPr>
-          <a:lstStyle/>
-          <a:p>
-            <a:pPr algn="ctr"/>
-            <a:r>
-              <a:rPr lang="en-US" sz="2400" dirty="0"/>
-              <a:t>Element Types</a:t>
-            </a:r>
-          </a:p>
-        </p:txBody>
-      </p:sp>
-      <p:sp>
-        <p:nvSpPr>
-          <p:cNvPr id="14" name="Rectangle 13">
-            <a:extLst>
-              <a:ext uri="{FF2B5EF4-FFF2-40B4-BE49-F238E27FC236}">
-                <a16:creationId xmlns:a16="http://schemas.microsoft.com/office/drawing/2014/main" id="{78C4DE15-1EC0-F753-2751-2A1F529D8683}"/>
-              </a:ext>
-            </a:extLst>
-          </p:cNvPr>
-          <p:cNvSpPr/>
-          <p:nvPr/>
-        </p:nvSpPr>
-        <p:spPr>
-          <a:xfrm>
-            <a:off x="4572924" y="-25686"/>
-            <a:ext cx="2026517" cy="1200329"/>
-          </a:xfrm>
-          <a:prstGeom prst="rect">
-            <a:avLst/>
-          </a:prstGeom>
-          <a:noFill/>
-        </p:spPr>
-        <p:txBody>
-          <a:bodyPr wrap="none" lIns="91440" tIns="45720" rIns="91440" bIns="45720">
-            <a:spAutoFit/>
-          </a:bodyPr>
-          <a:lstStyle/>
-          <a:p>
-            <a:pPr algn="ctr"/>
-            <a:r>
-              <a:rPr lang="en-US" sz="7200" b="1" cap="none" spc="0" dirty="0">
-                <a:ln w="12700">
-                  <a:solidFill>
-                    <a:schemeClr val="accent3">
-                      <a:lumMod val="50000"/>
-                    </a:schemeClr>
-                  </a:solidFill>
-                  <a:prstDash val="solid"/>
-                </a:ln>
-                <a:solidFill>
-                  <a:srgbClr val="FFFF00"/>
-                </a:solidFill>
-                <a:effectLst>
-                  <a:innerShdw blurRad="177800">
-                    <a:schemeClr val="accent3">
-                      <a:lumMod val="50000"/>
-                    </a:schemeClr>
-                  </a:innerShdw>
-                </a:effectLst>
-              </a:rPr>
-              <a:t>Tiles </a:t>
-            </a:r>
-          </a:p>
-        </p:txBody>
-      </p:sp>
-      <p:sp>
-        <p:nvSpPr>
-          <p:cNvPr id="15" name="TextBox 14">
-            <a:extLst>
-              <a:ext uri="{FF2B5EF4-FFF2-40B4-BE49-F238E27FC236}">
-                <a16:creationId xmlns:a16="http://schemas.microsoft.com/office/drawing/2014/main" id="{5F025C5E-E25A-EDE1-CEC0-DCFCD37B070A}"/>
-              </a:ext>
-            </a:extLst>
-          </p:cNvPr>
-          <p:cNvSpPr txBox="1"/>
-          <p:nvPr/>
-        </p:nvSpPr>
-        <p:spPr>
-          <a:xfrm>
-            <a:off x="724371" y="3131924"/>
-            <a:ext cx="11710930" cy="461665"/>
-          </a:xfrm>
-          <a:prstGeom prst="rect">
-            <a:avLst/>
-          </a:prstGeom>
-          <a:noFill/>
-        </p:spPr>
-        <p:txBody>
-          <a:bodyPr wrap="square" rtlCol="0">
-            <a:spAutoFit/>
-          </a:bodyPr>
-          <a:lstStyle/>
-          <a:p>
-            <a:r>
-              <a:rPr lang="en-US" sz="2400" b="1" dirty="0"/>
-              <a:t>ELEMENT</a:t>
-            </a:r>
-            <a:r>
-              <a:rPr lang="en-US" sz="2400" dirty="0"/>
-              <a:t>:</a:t>
-            </a:r>
-          </a:p>
-        </p:txBody>
-      </p:sp>
-      <p:pic>
-        <p:nvPicPr>
-          <p:cNvPr id="17" name="Picture 16">
-            <a:extLst>
-              <a:ext uri="{FF2B5EF4-FFF2-40B4-BE49-F238E27FC236}">
-                <a16:creationId xmlns:a16="http://schemas.microsoft.com/office/drawing/2014/main" id="{F631760B-8642-24CE-030F-E5FAE11A901D}"/>
-              </a:ext>
-            </a:extLst>
-          </p:cNvPr>
-          <p:cNvPicPr>
-            <a:picLocks noChangeAspect="1"/>
-          </p:cNvPicPr>
-          <p:nvPr/>
-        </p:nvPicPr>
-        <p:blipFill>
-          <a:blip r:embed="rId13"/>
-          <a:stretch>
-            <a:fillRect/>
-          </a:stretch>
-        </p:blipFill>
-        <p:spPr>
-          <a:xfrm>
-            <a:off x="10379628" y="58647"/>
-            <a:ext cx="1052789" cy="1072285"/>
-          </a:xfrm>
-          <a:prstGeom prst="rect">
-            <a:avLst/>
-          </a:prstGeom>
-        </p:spPr>
-      </p:pic>
-      <p:pic>
-        <p:nvPicPr>
-          <p:cNvPr id="19" name="Picture 18">
-            <a:extLst>
-              <a:ext uri="{FF2B5EF4-FFF2-40B4-BE49-F238E27FC236}">
-                <a16:creationId xmlns:a16="http://schemas.microsoft.com/office/drawing/2014/main" id="{90CC6CB2-C5A7-02EC-27B8-5DA0A008376D}"/>
-              </a:ext>
-            </a:extLst>
-          </p:cNvPr>
-          <p:cNvPicPr>
-            <a:picLocks noChangeAspect="1"/>
-          </p:cNvPicPr>
-          <p:nvPr/>
-        </p:nvPicPr>
-        <p:blipFill>
-          <a:blip r:embed="rId14"/>
-          <a:stretch>
-            <a:fillRect/>
-          </a:stretch>
-        </p:blipFill>
-        <p:spPr>
-          <a:xfrm>
-            <a:off x="200636" y="85083"/>
-            <a:ext cx="1110927" cy="1110927"/>
-          </a:xfrm>
-          <a:prstGeom prst="rect">
-            <a:avLst/>
-          </a:prstGeom>
-        </p:spPr>
-      </p:pic>
-      <p:pic>
-        <p:nvPicPr>
-          <p:cNvPr id="9" name="Picture 8">
-            <a:extLst>
-              <a:ext uri="{FF2B5EF4-FFF2-40B4-BE49-F238E27FC236}">
-                <a16:creationId xmlns:a16="http://schemas.microsoft.com/office/drawing/2014/main" id="{862D1BA1-5AC0-080A-3E6F-05F5A3CACC8C}"/>
-              </a:ext>
-            </a:extLst>
-          </p:cNvPr>
-          <p:cNvPicPr>
-            <a:picLocks noChangeAspect="1"/>
-          </p:cNvPicPr>
-          <p:nvPr/>
-        </p:nvPicPr>
-        <p:blipFill>
-          <a:blip r:embed="rId15"/>
-          <a:stretch>
-            <a:fillRect/>
-          </a:stretch>
-        </p:blipFill>
-        <p:spPr>
-          <a:xfrm>
-            <a:off x="7749466" y="43190"/>
-            <a:ext cx="1073763" cy="1062578"/>
-          </a:xfrm>
-          <a:prstGeom prst="rect">
-            <a:avLst/>
-          </a:prstGeom>
-        </p:spPr>
-      </p:pic>
-    </p:spTree>
-    <p:extLst>
-      <p:ext uri="{BB962C8B-B14F-4D97-AF65-F5344CB8AC3E}">
-        <p14:creationId xmlns:p14="http://schemas.microsoft.com/office/powerpoint/2010/main" val="770881210"/>
       </p:ext>
     </p:extLst>
   </p:cSld>

</xml_diff>

<commit_message>
finished new player introduction rework
</commit_message>
<xml_diff>
--- a/Assets/How to Play/Instructions.pptx
+++ b/Assets/How to Play/Instructions.pptx
@@ -272,7 +272,7 @@
           <a:p>
             <a:fld id="{62B14E49-696A-4F24-B720-C8B44559A9DA}" type="datetimeFigureOut">
               <a:rPr lang="en-US" smtClean="0"/>
-              <a:t>10/2/2023</a:t>
+              <a:t>10/4/2023</a:t>
             </a:fld>
             <a:endParaRPr lang="en-US"/>
           </a:p>
@@ -442,7 +442,7 @@
           <a:p>
             <a:fld id="{62B14E49-696A-4F24-B720-C8B44559A9DA}" type="datetimeFigureOut">
               <a:rPr lang="en-US" smtClean="0"/>
-              <a:t>10/2/2023</a:t>
+              <a:t>10/4/2023</a:t>
             </a:fld>
             <a:endParaRPr lang="en-US"/>
           </a:p>
@@ -622,7 +622,7 @@
           <a:p>
             <a:fld id="{62B14E49-696A-4F24-B720-C8B44559A9DA}" type="datetimeFigureOut">
               <a:rPr lang="en-US" smtClean="0"/>
-              <a:t>10/2/2023</a:t>
+              <a:t>10/4/2023</a:t>
             </a:fld>
             <a:endParaRPr lang="en-US"/>
           </a:p>
@@ -792,7 +792,7 @@
           <a:p>
             <a:fld id="{62B14E49-696A-4F24-B720-C8B44559A9DA}" type="datetimeFigureOut">
               <a:rPr lang="en-US" smtClean="0"/>
-              <a:t>10/2/2023</a:t>
+              <a:t>10/4/2023</a:t>
             </a:fld>
             <a:endParaRPr lang="en-US"/>
           </a:p>
@@ -1056,7 +1056,7 @@
           <a:p>
             <a:fld id="{62B14E49-696A-4F24-B720-C8B44559A9DA}" type="datetimeFigureOut">
               <a:rPr lang="en-US" smtClean="0"/>
-              <a:t>10/2/2023</a:t>
+              <a:t>10/4/2023</a:t>
             </a:fld>
             <a:endParaRPr lang="en-US"/>
           </a:p>
@@ -1344,7 +1344,7 @@
           <a:p>
             <a:fld id="{62B14E49-696A-4F24-B720-C8B44559A9DA}" type="datetimeFigureOut">
               <a:rPr lang="en-US" smtClean="0"/>
-              <a:t>10/2/2023</a:t>
+              <a:t>10/4/2023</a:t>
             </a:fld>
             <a:endParaRPr lang="en-US"/>
           </a:p>
@@ -1773,7 +1773,7 @@
           <a:p>
             <a:fld id="{62B14E49-696A-4F24-B720-C8B44559A9DA}" type="datetimeFigureOut">
               <a:rPr lang="en-US" smtClean="0"/>
-              <a:t>10/2/2023</a:t>
+              <a:t>10/4/2023</a:t>
             </a:fld>
             <a:endParaRPr lang="en-US"/>
           </a:p>
@@ -1891,7 +1891,7 @@
           <a:p>
             <a:fld id="{62B14E49-696A-4F24-B720-C8B44559A9DA}" type="datetimeFigureOut">
               <a:rPr lang="en-US" smtClean="0"/>
-              <a:t>10/2/2023</a:t>
+              <a:t>10/4/2023</a:t>
             </a:fld>
             <a:endParaRPr lang="en-US"/>
           </a:p>
@@ -1986,7 +1986,7 @@
           <a:p>
             <a:fld id="{62B14E49-696A-4F24-B720-C8B44559A9DA}" type="datetimeFigureOut">
               <a:rPr lang="en-US" smtClean="0"/>
-              <a:t>10/2/2023</a:t>
+              <a:t>10/4/2023</a:t>
             </a:fld>
             <a:endParaRPr lang="en-US"/>
           </a:p>
@@ -2342,7 +2342,7 @@
           <a:p>
             <a:fld id="{62B14E49-696A-4F24-B720-C8B44559A9DA}" type="datetimeFigureOut">
               <a:rPr lang="en-US" smtClean="0"/>
-              <a:t>10/2/2023</a:t>
+              <a:t>10/4/2023</a:t>
             </a:fld>
             <a:endParaRPr lang="en-US"/>
           </a:p>
@@ -2645,7 +2645,7 @@
           <a:p>
             <a:fld id="{62B14E49-696A-4F24-B720-C8B44559A9DA}" type="datetimeFigureOut">
               <a:rPr lang="en-US" smtClean="0"/>
-              <a:t>10/2/2023</a:t>
+              <a:t>10/4/2023</a:t>
             </a:fld>
             <a:endParaRPr lang="en-US"/>
           </a:p>
@@ -2858,7 +2858,7 @@
           <a:p>
             <a:fld id="{62B14E49-696A-4F24-B720-C8B44559A9DA}" type="datetimeFigureOut">
               <a:rPr lang="en-US" smtClean="0"/>
-              <a:t>10/2/2023</a:t>
+              <a:t>10/4/2023</a:t>
             </a:fld>
             <a:endParaRPr lang="en-US"/>
           </a:p>
@@ -4275,7 +4275,7 @@
         </p:nvSpPr>
         <p:spPr>
           <a:xfrm>
-            <a:off x="1418582" y="5262038"/>
+            <a:off x="1068324" y="4814326"/>
             <a:ext cx="6097836" cy="954107"/>
           </a:xfrm>
           <a:prstGeom prst="rect">
@@ -4331,7 +4331,7 @@
         </p:blipFill>
         <p:spPr>
           <a:xfrm>
-            <a:off x="484421" y="5262038"/>
+            <a:off x="274801" y="4814326"/>
             <a:ext cx="892366" cy="892366"/>
           </a:xfrm>
           <a:prstGeom prst="rect">
@@ -4506,7 +4506,7 @@
         </p:nvSpPr>
         <p:spPr>
           <a:xfrm>
-            <a:off x="478110" y="1125188"/>
+            <a:off x="293383" y="923330"/>
             <a:ext cx="10106985" cy="4371049"/>
           </a:xfrm>
           <a:prstGeom prst="rect">
@@ -4706,7 +4706,7 @@
             </a:lvl9pPr>
           </a:lstStyle>
           <a:p>
-            <a:endParaRPr lang="en-US"/>
+            <a:endParaRPr lang="en-US" dirty="0"/>
           </a:p>
           <a:p>
             <a:pPr marL="457200" indent="-457200">
@@ -4714,7 +4714,7 @@
               <a:buChar char="•"/>
             </a:pPr>
             <a:r>
-              <a:rPr lang="en-US"/>
+              <a:rPr lang="en-US" dirty="0"/>
               <a:t>Tiles can be freely placed into  or out of storage.</a:t>
             </a:r>
           </a:p>
@@ -4724,7 +4724,7 @@
               <a:buChar char="•"/>
             </a:pPr>
             <a:r>
-              <a:rPr lang="en-US"/>
+              <a:rPr lang="en-US" dirty="0"/>
               <a:t>Storage is never subject to alchemic laws</a:t>
             </a:r>
           </a:p>
@@ -4734,7 +4734,7 @@
               <a:buChar char="•"/>
             </a:pPr>
             <a:r>
-              <a:rPr lang="en-US"/>
+              <a:rPr lang="en-US" dirty="0"/>
               <a:t>Storage has a capacity of 8</a:t>
             </a:r>
           </a:p>
@@ -4744,81 +4744,9 @@
               <a:buChar char="•"/>
             </a:pPr>
             <a:r>
-              <a:rPr lang="en-US"/>
+              <a:rPr lang="en-US" dirty="0"/>
               <a:t>Storage starts with 2 random tiles</a:t>
             </a:r>
-            <a:endParaRPr lang="en-US" dirty="0"/>
-          </a:p>
-        </p:txBody>
-      </p:sp>
-      <p:sp>
-        <p:nvSpPr>
-          <p:cNvPr id="4" name="Rectangle 3">
-            <a:extLst>
-              <a:ext uri="{FF2B5EF4-FFF2-40B4-BE49-F238E27FC236}">
-                <a16:creationId xmlns:a16="http://schemas.microsoft.com/office/drawing/2014/main" id="{E2369CB6-C899-ECEE-7629-78643EDC8962}"/>
-              </a:ext>
-            </a:extLst>
-          </p:cNvPr>
-          <p:cNvSpPr/>
-          <p:nvPr/>
-        </p:nvSpPr>
-        <p:spPr>
-          <a:xfrm>
-            <a:off x="1677679" y="0"/>
-            <a:ext cx="2252861" cy="923330"/>
-          </a:xfrm>
-          <a:prstGeom prst="rect">
-            <a:avLst/>
-          </a:prstGeom>
-          <a:noFill/>
-        </p:spPr>
-        <p:txBody>
-          <a:bodyPr wrap="none" lIns="91440" tIns="45720" rIns="91440" bIns="45720">
-            <a:spAutoFit/>
-          </a:bodyPr>
-          <a:lstStyle/>
-          <a:p>
-            <a:pPr algn="ctr"/>
-            <a:r>
-              <a:rPr lang="en-US" sz="5400" b="1" cap="none" spc="0">
-                <a:ln w="9525">
-                  <a:solidFill>
-                    <a:schemeClr val="bg1"/>
-                  </a:solidFill>
-                  <a:prstDash val="solid"/>
-                </a:ln>
-                <a:solidFill>
-                  <a:schemeClr val="tx1"/>
-                </a:solidFill>
-                <a:effectLst>
-                  <a:outerShdw blurRad="12700" dist="38100" dir="2700000" algn="tl" rotWithShape="0">
-                    <a:schemeClr val="bg1">
-                      <a:lumMod val="50000"/>
-                    </a:schemeClr>
-                  </a:outerShdw>
-                </a:effectLst>
-              </a:rPr>
-              <a:t>Storage</a:t>
-            </a:r>
-            <a:endParaRPr lang="en-US" sz="5400" b="1" cap="none" spc="0" dirty="0">
-              <a:ln w="9525">
-                <a:solidFill>
-                  <a:schemeClr val="bg1"/>
-                </a:solidFill>
-                <a:prstDash val="solid"/>
-              </a:ln>
-              <a:solidFill>
-                <a:schemeClr val="tx1"/>
-              </a:solidFill>
-              <a:effectLst>
-                <a:outerShdw blurRad="12700" dist="38100" dir="2700000" algn="tl" rotWithShape="0">
-                  <a:schemeClr val="bg1">
-                    <a:lumMod val="50000"/>
-                  </a:schemeClr>
-                </a:outerShdw>
-              </a:effectLst>
-            </a:endParaRPr>
           </a:p>
         </p:txBody>
       </p:sp>
@@ -4836,22 +4764,84 @@
           </p:cNvPicPr>
           <p:nvPr/>
         </p:nvPicPr>
-        <p:blipFill>
+        <p:blipFill rotWithShape="1">
           <a:blip r:embed="rId2"/>
-          <a:stretch>
-            <a:fillRect/>
-          </a:stretch>
+          <a:srcRect l="7293" r="2998" b="9310"/>
+          <a:stretch/>
         </p:blipFill>
         <p:spPr>
           <a:xfrm>
-            <a:off x="7327862" y="3657601"/>
-            <a:ext cx="4386028" cy="2914938"/>
+            <a:off x="7629236" y="2650838"/>
+            <a:ext cx="3934692" cy="2643541"/>
           </a:xfrm>
           <a:prstGeom prst="rect">
             <a:avLst/>
           </a:prstGeom>
         </p:spPr>
       </p:pic>
+      <p:sp>
+        <p:nvSpPr>
+          <p:cNvPr id="5" name="Rectangle 4">
+            <a:extLst>
+              <a:ext uri="{FF2B5EF4-FFF2-40B4-BE49-F238E27FC236}">
+                <a16:creationId xmlns:a16="http://schemas.microsoft.com/office/drawing/2014/main" id="{769E9B51-1A5F-953F-5297-5F3C5F10AB94}"/>
+              </a:ext>
+            </a:extLst>
+          </p:cNvPr>
+          <p:cNvSpPr/>
+          <p:nvPr/>
+        </p:nvSpPr>
+        <p:spPr>
+          <a:xfrm>
+            <a:off x="1201265" y="323606"/>
+            <a:ext cx="2252861" cy="923330"/>
+          </a:xfrm>
+          <a:prstGeom prst="rect">
+            <a:avLst/>
+          </a:prstGeom>
+          <a:noFill/>
+        </p:spPr>
+        <p:txBody>
+          <a:bodyPr wrap="none" lIns="91440" tIns="45720" rIns="91440" bIns="45720">
+            <a:spAutoFit/>
+          </a:bodyPr>
+          <a:lstStyle/>
+          <a:p>
+            <a:pPr algn="ctr"/>
+            <a:r>
+              <a:rPr lang="en-US" sz="5400" b="1" cap="none" spc="0" dirty="0">
+                <a:ln w="12700">
+                  <a:solidFill>
+                    <a:schemeClr val="accent3">
+                      <a:lumMod val="50000"/>
+                    </a:schemeClr>
+                  </a:solidFill>
+                  <a:prstDash val="solid"/>
+                </a:ln>
+                <a:pattFill prst="narHorz">
+                  <a:fgClr>
+                    <a:schemeClr val="accent3"/>
+                  </a:fgClr>
+                  <a:bgClr>
+                    <a:schemeClr val="accent3">
+                      <a:lumMod val="40000"/>
+                      <a:lumOff val="60000"/>
+                    </a:schemeClr>
+                  </a:bgClr>
+                </a:pattFill>
+                <a:effectLst>
+                  <a:innerShdw blurRad="177800">
+                    <a:schemeClr val="accent3">
+                      <a:lumMod val="50000"/>
+                    </a:schemeClr>
+                  </a:innerShdw>
+                </a:effectLst>
+              </a:rPr>
+              <a:t>Storage</a:t>
+            </a:r>
+          </a:p>
+        </p:txBody>
+      </p:sp>
     </p:spTree>
     <p:extLst>
       <p:ext uri="{BB962C8B-B14F-4D97-AF65-F5344CB8AC3E}">
@@ -4945,7 +4935,7 @@
         </p:nvSpPr>
         <p:spPr>
           <a:xfrm>
-            <a:off x="310332" y="3062477"/>
+            <a:off x="310332" y="2868515"/>
             <a:ext cx="7855027" cy="523220"/>
           </a:xfrm>
           <a:prstGeom prst="rect">
@@ -5076,7 +5066,7 @@
         <p:spPr>
           <a:xfrm>
             <a:off x="749675" y="928423"/>
-            <a:ext cx="9038671" cy="707886"/>
+            <a:ext cx="9038671" cy="769441"/>
           </a:xfrm>
           <a:prstGeom prst="rect">
             <a:avLst/>
@@ -5094,7 +5084,7 @@
               <a:buChar char="•"/>
             </a:pPr>
             <a:r>
-              <a:rPr lang="en-US" sz="2000" dirty="0"/>
+              <a:rPr lang="en-US" sz="2200" dirty="0"/>
               <a:t>You have 5 experiments that can each hold any number of tiles</a:t>
             </a:r>
           </a:p>
@@ -5104,7 +5094,7 @@
               <a:buChar char="•"/>
             </a:pPr>
             <a:r>
-              <a:rPr lang="en-US" sz="2000" dirty="0"/>
+              <a:rPr lang="en-US" sz="2200" dirty="0"/>
               <a:t>Tiles can be moved between experiments freely</a:t>
             </a:r>
           </a:p>
@@ -5124,7 +5114,7 @@
         </p:nvSpPr>
         <p:spPr>
           <a:xfrm>
-            <a:off x="666548" y="3585697"/>
+            <a:off x="666548" y="3428680"/>
             <a:ext cx="9835197" cy="2462213"/>
           </a:xfrm>
           <a:prstGeom prst="rect">

</xml_diff>